<commit_message>
added a video tutorial
</commit_message>
<xml_diff>
--- a/General Software Engineering/Levels of Software Projects.pptx
+++ b/General Software Engineering/Levels of Software Projects.pptx
@@ -2,15 +2,14 @@
 <file path=ppt/presentation.xml><?xml version="1.0" encoding="utf-8"?>
 <p:presentation xmlns:a="http://schemas.openxmlformats.org/drawingml/2006/main" xmlns:r="http://schemas.openxmlformats.org/officeDocument/2006/relationships" xmlns:p="http://schemas.openxmlformats.org/presentationml/2006/main" saveSubsetFonts="1">
   <p:sldMasterIdLst>
-    <p:sldMasterId id="2147483648" r:id="rId1"/>
+    <p:sldMasterId id="2147483648" r:id="rId4"/>
   </p:sldMasterIdLst>
   <p:sldIdLst>
-    <p:sldId id="256" r:id="rId2"/>
-    <p:sldId id="257" r:id="rId3"/>
-    <p:sldId id="258" r:id="rId4"/>
-    <p:sldId id="259" r:id="rId5"/>
-    <p:sldId id="260" r:id="rId6"/>
-    <p:sldId id="261" r:id="rId7"/>
+    <p:sldId id="256" r:id="rId5"/>
+    <p:sldId id="258" r:id="rId6"/>
+    <p:sldId id="260" r:id="rId7"/>
+    <p:sldId id="261" r:id="rId8"/>
+    <p:sldId id="262" r:id="rId9"/>
   </p:sldIdLst>
   <p:sldSz cx="12192000" cy="6858000"/>
   <p:notesSz cx="6858000" cy="9144000"/>
@@ -109,7 +108,951 @@
       </a:defRPr>
     </a:lvl9pPr>
   </p:defaultTextStyle>
+  <p:extLst>
+    <p:ext uri="{EFAFB233-063F-42B5-8137-9DF3F51BA10A}">
+      <p15:sldGuideLst xmlns:p15="http://schemas.microsoft.com/office/powerpoint/2012/main"/>
+    </p:ext>
+  </p:extLst>
 </p:presentation>
+</file>
+
+<file path=ppt/authors.xml><?xml version="1.0" encoding="utf-8"?>
+<p188:authorLst xmlns:a="http://schemas.openxmlformats.org/drawingml/2006/main" xmlns:r="http://schemas.openxmlformats.org/officeDocument/2006/relationships" xmlns:p188="http://schemas.microsoft.com/office/powerpoint/2018/8/main">
+  <p188:author id="{FFB56F3A-366E-2DE6-2CED-611F6F4E9C66}" name="Ralph Brecheisen" initials="RB" userId="S::ralph.brecheisen@maastro.nl::f298dded-971f-4e96-9402-5708bf72887d" providerId="AD"/>
+  <p188:author id="{B256294C-DD53-F337-F51F-ACE5E06D4639}" name="Aiara Lobo Gomes" initials="AG" userId="S::aiara.lobogomes@maastro.nl::ea21328a-303d-4bcd-846f-41db275cad9a" providerId="AD"/>
+  <p188:author id="{11D22365-B884-C6A6-E2B4-0A866AFBF2A1}" name="Florian van Daalen" initials="FD" userId="S::florian.vandaalen@maastro.nl::1ac26d17-1f5c-4d44-b06d-8bd5da1f8df2" providerId="AD"/>
+  <p188:author id="{E5A977C6-2DD4-581A-08EE-FA3FC9773623}" name="Johan van Soest" initials="JS" userId="S::johan.vansoest@maastro.nl::5d43486e-a276-4906-87cf-dbb33a00d581" providerId="AD"/>
+</p188:authorLst>
+</file>
+
+<file path=ppt/revisionInfo.xml><?xml version="1.0" encoding="utf-8"?>
+<p1510:revInfo xmlns:a="http://schemas.openxmlformats.org/drawingml/2006/main" xmlns:r="http://schemas.openxmlformats.org/officeDocument/2006/relationships" xmlns:p1510="http://schemas.microsoft.com/office/powerpoint/2015/10/main">
+  <p1510:revLst>
+    <p1510:client id="{082125E5-F61D-4829-9B55-53C54F3237D0}" v="13" dt="2023-02-15T10:55:19.745"/>
+    <p1510:client id="{29875D5A-6871-1D66-240D-4D5AB09B6B9A}" v="5" dt="2023-02-16T09:05:07.885"/>
+    <p1510:client id="{5EDC057B-B6C5-FC3F-F5E9-55FFC1ED0C5C}" v="16" dt="2023-02-16T09:21:48.449"/>
+    <p1510:client id="{7A2C8AFE-14A3-36FE-EA1E-CFE24650E0FB}" v="115" dt="2023-03-16T13:18:34.413"/>
+    <p1510:client id="{A4F7040E-2BF2-62C2-6453-36419E2581B2}" v="3" dt="2023-02-15T13:02:27.843"/>
+    <p1510:client id="{C5DEF346-22B5-56BB-18A2-99582CBCA6DE}" v="16" dt="2023-02-16T12:57:34.980"/>
+  </p1510:revLst>
+</p1510:revInfo>
+</file>
+
+<file path=ppt/changesInfos/changesInfo1.xml><?xml version="1.0" encoding="utf-8"?>
+<pc:chgInfo xmlns:a="http://schemas.openxmlformats.org/drawingml/2006/main" xmlns:r="http://schemas.openxmlformats.org/officeDocument/2006/relationships" xmlns:ac="http://schemas.microsoft.com/office/drawing/2013/main/command" xmlns:pc="http://schemas.microsoft.com/office/powerpoint/2013/main/command">
+  <pc:docChgLst>
+    <pc:chgData name="Johan van Soest" userId="S::johan.vansoest@maastro.nl::5d43486e-a276-4906-87cf-dbb33a00d581" providerId="AD" clId="Web-{5EDC057B-B6C5-FC3F-F5E9-55FFC1ED0C5C}"/>
+    <pc:docChg chg="mod modSld">
+      <pc:chgData name="Johan van Soest" userId="S::johan.vansoest@maastro.nl::5d43486e-a276-4906-87cf-dbb33a00d581" providerId="AD" clId="Web-{5EDC057B-B6C5-FC3F-F5E9-55FFC1ED0C5C}" dt="2023-02-16T09:21:48.449" v="13"/>
+      <pc:docMkLst>
+        <pc:docMk/>
+      </pc:docMkLst>
+      <pc:sldChg chg="addCm">
+        <pc:chgData name="Johan van Soest" userId="S::johan.vansoest@maastro.nl::5d43486e-a276-4906-87cf-dbb33a00d581" providerId="AD" clId="Web-{5EDC057B-B6C5-FC3F-F5E9-55FFC1ED0C5C}" dt="2023-02-16T09:21:48.449" v="13"/>
+        <pc:sldMkLst>
+          <pc:docMk/>
+          <pc:sldMk cId="2305509078" sldId="257"/>
+        </pc:sldMkLst>
+        <pc:extLst>
+          <p:ext xmlns:p="http://schemas.openxmlformats.org/presentationml/2006/main" uri="{D6D511B9-2390-475A-947B-AFAB55BFBCF1}">
+            <pc226:cmChg xmlns:pc226="http://schemas.microsoft.com/office/powerpoint/2022/06/main/command" chg="add">
+              <pc226:chgData name="Johan van Soest" userId="S::johan.vansoest@maastro.nl::5d43486e-a276-4906-87cf-dbb33a00d581" providerId="AD" clId="Web-{5EDC057B-B6C5-FC3F-F5E9-55FFC1ED0C5C}" dt="2023-02-16T09:21:48.449" v="13"/>
+              <pc2:cmMkLst xmlns:pc2="http://schemas.microsoft.com/office/powerpoint/2019/9/main/command">
+                <pc:docMk/>
+                <pc:sldMk cId="2305509078" sldId="257"/>
+                <pc2:cmMk id="{A59DD9A1-0FBA-41E0-9162-4D0DB987C4FB}"/>
+              </pc2:cmMkLst>
+            </pc226:cmChg>
+          </p:ext>
+        </pc:extLst>
+      </pc:sldChg>
+      <pc:sldChg chg="addCm">
+        <pc:chgData name="Johan van Soest" userId="S::johan.vansoest@maastro.nl::5d43486e-a276-4906-87cf-dbb33a00d581" providerId="AD" clId="Web-{5EDC057B-B6C5-FC3F-F5E9-55FFC1ED0C5C}" dt="2023-02-16T09:17:40.956" v="1"/>
+        <pc:sldMkLst>
+          <pc:docMk/>
+          <pc:sldMk cId="2730087503" sldId="259"/>
+        </pc:sldMkLst>
+        <pc:extLst>
+          <p:ext xmlns:p="http://schemas.openxmlformats.org/presentationml/2006/main" uri="{D6D511B9-2390-475A-947B-AFAB55BFBCF1}">
+            <pc226:cmChg xmlns:pc226="http://schemas.microsoft.com/office/powerpoint/2022/06/main/command" chg="add">
+              <pc226:chgData name="Johan van Soest" userId="S::johan.vansoest@maastro.nl::5d43486e-a276-4906-87cf-dbb33a00d581" providerId="AD" clId="Web-{5EDC057B-B6C5-FC3F-F5E9-55FFC1ED0C5C}" dt="2023-02-16T09:17:40.956" v="1"/>
+              <pc2:cmMkLst xmlns:pc2="http://schemas.microsoft.com/office/powerpoint/2019/9/main/command">
+                <pc:docMk/>
+                <pc:sldMk cId="2730087503" sldId="259"/>
+                <pc2:cmMk id="{330C25A0-FB7F-4192-9E8E-27888CA86C48}"/>
+              </pc2:cmMkLst>
+            </pc226:cmChg>
+          </p:ext>
+        </pc:extLst>
+      </pc:sldChg>
+      <pc:sldChg chg="modSp addCm">
+        <pc:chgData name="Johan van Soest" userId="S::johan.vansoest@maastro.nl::5d43486e-a276-4906-87cf-dbb33a00d581" providerId="AD" clId="Web-{5EDC057B-B6C5-FC3F-F5E9-55FFC1ED0C5C}" dt="2023-02-16T09:19:15.163" v="7" actId="20577"/>
+        <pc:sldMkLst>
+          <pc:docMk/>
+          <pc:sldMk cId="3421541061" sldId="260"/>
+        </pc:sldMkLst>
+        <pc:spChg chg="mod">
+          <ac:chgData name="Johan van Soest" userId="S::johan.vansoest@maastro.nl::5d43486e-a276-4906-87cf-dbb33a00d581" providerId="AD" clId="Web-{5EDC057B-B6C5-FC3F-F5E9-55FFC1ED0C5C}" dt="2023-02-16T09:19:15.163" v="7" actId="20577"/>
+          <ac:spMkLst>
+            <pc:docMk/>
+            <pc:sldMk cId="3421541061" sldId="260"/>
+            <ac:spMk id="2" creationId="{00000000-0000-0000-0000-000000000000}"/>
+          </ac:spMkLst>
+        </pc:spChg>
+        <pc:extLst>
+          <p:ext xmlns:p="http://schemas.openxmlformats.org/presentationml/2006/main" uri="{D6D511B9-2390-475A-947B-AFAB55BFBCF1}">
+            <pc226:cmChg xmlns:pc226="http://schemas.microsoft.com/office/powerpoint/2022/06/main/command" chg="add">
+              <pc226:chgData name="Johan van Soest" userId="S::johan.vansoest@maastro.nl::5d43486e-a276-4906-87cf-dbb33a00d581" providerId="AD" clId="Web-{5EDC057B-B6C5-FC3F-F5E9-55FFC1ED0C5C}" dt="2023-02-16T09:19:07.600" v="2"/>
+              <pc2:cmMkLst xmlns:pc2="http://schemas.microsoft.com/office/powerpoint/2019/9/main/command">
+                <pc:docMk/>
+                <pc:sldMk cId="3421541061" sldId="260"/>
+                <pc2:cmMk id="{67D22CE5-C95A-4416-AE42-0F85FF62E748}"/>
+              </pc2:cmMkLst>
+            </pc226:cmChg>
+          </p:ext>
+        </pc:extLst>
+      </pc:sldChg>
+      <pc:sldChg chg="modSp addCm modCm">
+        <pc:chgData name="Johan van Soest" userId="S::johan.vansoest@maastro.nl::5d43486e-a276-4906-87cf-dbb33a00d581" providerId="AD" clId="Web-{5EDC057B-B6C5-FC3F-F5E9-55FFC1ED0C5C}" dt="2023-02-16T09:21:00.432" v="12"/>
+        <pc:sldMkLst>
+          <pc:docMk/>
+          <pc:sldMk cId="26091957" sldId="261"/>
+        </pc:sldMkLst>
+        <pc:spChg chg="mod">
+          <ac:chgData name="Johan van Soest" userId="S::johan.vansoest@maastro.nl::5d43486e-a276-4906-87cf-dbb33a00d581" providerId="AD" clId="Web-{5EDC057B-B6C5-FC3F-F5E9-55FFC1ED0C5C}" dt="2023-02-16T09:19:24.444" v="10" actId="20577"/>
+          <ac:spMkLst>
+            <pc:docMk/>
+            <pc:sldMk cId="26091957" sldId="261"/>
+            <ac:spMk id="2" creationId="{00000000-0000-0000-0000-000000000000}"/>
+          </ac:spMkLst>
+        </pc:spChg>
+        <pc:extLst>
+          <p:ext xmlns:p="http://schemas.openxmlformats.org/presentationml/2006/main" uri="{D6D511B9-2390-475A-947B-AFAB55BFBCF1}">
+            <pc226:cmChg xmlns:pc226="http://schemas.microsoft.com/office/powerpoint/2022/06/main/command" chg="add">
+              <pc226:chgData name="Johan van Soest" userId="S::johan.vansoest@maastro.nl::5d43486e-a276-4906-87cf-dbb33a00d581" providerId="AD" clId="Web-{5EDC057B-B6C5-FC3F-F5E9-55FFC1ED0C5C}" dt="2023-02-16T09:21:00.432" v="12"/>
+              <pc2:cmMkLst xmlns:pc2="http://schemas.microsoft.com/office/powerpoint/2019/9/main/command">
+                <pc:docMk/>
+                <pc:sldMk cId="26091957" sldId="261"/>
+                <pc2:cmMk id="{0E4B270B-6710-4613-A942-E3E86E83C36E}"/>
+              </pc2:cmMkLst>
+              <pc226:cmRplyChg chg="add">
+                <pc226:chgData name="Johan van Soest" userId="S::johan.vansoest@maastro.nl::5d43486e-a276-4906-87cf-dbb33a00d581" providerId="AD" clId="Web-{5EDC057B-B6C5-FC3F-F5E9-55FFC1ED0C5C}" dt="2023-02-16T09:21:00.432" v="12"/>
+                <pc2:cmRplyMkLst xmlns:pc2="http://schemas.microsoft.com/office/powerpoint/2019/9/main/command">
+                  <pc:docMk/>
+                  <pc:sldMk cId="26091957" sldId="261"/>
+                  <pc2:cmMk id="{0E4B270B-6710-4613-A942-E3E86E83C36E}"/>
+                  <pc2:cmRplyMk id="{2428F1D2-D677-46C5-BA98-4F9EFAD660E0}"/>
+                </pc2:cmRplyMkLst>
+              </pc226:cmRplyChg>
+            </pc226:cmChg>
+          </p:ext>
+        </pc:extLst>
+      </pc:sldChg>
+    </pc:docChg>
+  </pc:docChgLst>
+  <pc:docChgLst>
+    <pc:chgData name="Aiara Lobo Gomes" userId="S::aiara.lobogomes@maastro.nl::ea21328a-303d-4bcd-846f-41db275cad9a" providerId="AD" clId="Web-{082125E5-F61D-4829-9B55-53C54F3237D0}"/>
+    <pc:docChg chg="mod modSld">
+      <pc:chgData name="Aiara Lobo Gomes" userId="S::aiara.lobogomes@maastro.nl::ea21328a-303d-4bcd-846f-41db275cad9a" providerId="AD" clId="Web-{082125E5-F61D-4829-9B55-53C54F3237D0}" dt="2023-02-15T10:55:19.417" v="44" actId="20577"/>
+      <pc:docMkLst>
+        <pc:docMk/>
+      </pc:docMkLst>
+      <pc:sldChg chg="addCm">
+        <pc:chgData name="Aiara Lobo Gomes" userId="S::aiara.lobogomes@maastro.nl::ea21328a-303d-4bcd-846f-41db275cad9a" providerId="AD" clId="Web-{082125E5-F61D-4829-9B55-53C54F3237D0}" dt="2023-02-15T10:48:42.810" v="1"/>
+        <pc:sldMkLst>
+          <pc:docMk/>
+          <pc:sldMk cId="2430399406" sldId="258"/>
+        </pc:sldMkLst>
+        <pc:extLst>
+          <p:ext xmlns:p="http://schemas.openxmlformats.org/presentationml/2006/main" uri="{D6D511B9-2390-475A-947B-AFAB55BFBCF1}">
+            <pc226:cmChg xmlns:pc226="http://schemas.microsoft.com/office/powerpoint/2022/06/main/command" chg="add">
+              <pc226:chgData name="Aiara Lobo Gomes" userId="S::aiara.lobogomes@maastro.nl::ea21328a-303d-4bcd-846f-41db275cad9a" providerId="AD" clId="Web-{082125E5-F61D-4829-9B55-53C54F3237D0}" dt="2023-02-15T10:48:42.810" v="1"/>
+              <pc2:cmMkLst xmlns:pc2="http://schemas.microsoft.com/office/powerpoint/2019/9/main/command">
+                <pc:docMk/>
+                <pc:sldMk cId="2430399406" sldId="258"/>
+                <pc2:cmMk id="{FA93F46C-F03A-437B-883A-E9DFE763400E}"/>
+              </pc2:cmMkLst>
+            </pc226:cmChg>
+          </p:ext>
+        </pc:extLst>
+      </pc:sldChg>
+      <pc:sldChg chg="modSp addCm modCm">
+        <pc:chgData name="Aiara Lobo Gomes" userId="S::aiara.lobogomes@maastro.nl::ea21328a-303d-4bcd-846f-41db275cad9a" providerId="AD" clId="Web-{082125E5-F61D-4829-9B55-53C54F3237D0}" dt="2023-02-15T10:52:10.004" v="20" actId="20577"/>
+        <pc:sldMkLst>
+          <pc:docMk/>
+          <pc:sldMk cId="2730087503" sldId="259"/>
+        </pc:sldMkLst>
+        <pc:spChg chg="mod">
+          <ac:chgData name="Aiara Lobo Gomes" userId="S::aiara.lobogomes@maastro.nl::ea21328a-303d-4bcd-846f-41db275cad9a" providerId="AD" clId="Web-{082125E5-F61D-4829-9B55-53C54F3237D0}" dt="2023-02-15T10:52:10.004" v="20" actId="20577"/>
+          <ac:spMkLst>
+            <pc:docMk/>
+            <pc:sldMk cId="2730087503" sldId="259"/>
+            <ac:spMk id="3" creationId="{00000000-0000-0000-0000-000000000000}"/>
+          </ac:spMkLst>
+        </pc:spChg>
+        <pc:extLst>
+          <p:ext xmlns:p="http://schemas.openxmlformats.org/presentationml/2006/main" uri="{D6D511B9-2390-475A-947B-AFAB55BFBCF1}">
+            <pc226:cmChg xmlns:pc226="http://schemas.microsoft.com/office/powerpoint/2022/06/main/command" chg="add mod">
+              <pc226:chgData name="Aiara Lobo Gomes" userId="S::aiara.lobogomes@maastro.nl::ea21328a-303d-4bcd-846f-41db275cad9a" providerId="AD" clId="Web-{082125E5-F61D-4829-9B55-53C54F3237D0}" dt="2023-02-15T10:52:05.207" v="19" actId="20577"/>
+              <pc2:cmMkLst xmlns:pc2="http://schemas.microsoft.com/office/powerpoint/2019/9/main/command">
+                <pc:docMk/>
+                <pc:sldMk cId="2730087503" sldId="259"/>
+                <pc2:cmMk id="{CC0D42B8-4CC3-442F-AA6C-5448F5A07969}"/>
+              </pc2:cmMkLst>
+            </pc226:cmChg>
+          </p:ext>
+        </pc:extLst>
+      </pc:sldChg>
+      <pc:sldChg chg="modSp addCm modCm">
+        <pc:chgData name="Aiara Lobo Gomes" userId="S::aiara.lobogomes@maastro.nl::ea21328a-303d-4bcd-846f-41db275cad9a" providerId="AD" clId="Web-{082125E5-F61D-4829-9B55-53C54F3237D0}" dt="2023-02-15T10:54:00.836" v="40" actId="20577"/>
+        <pc:sldMkLst>
+          <pc:docMk/>
+          <pc:sldMk cId="3421541061" sldId="260"/>
+        </pc:sldMkLst>
+        <pc:spChg chg="mod">
+          <ac:chgData name="Aiara Lobo Gomes" userId="S::aiara.lobogomes@maastro.nl::ea21328a-303d-4bcd-846f-41db275cad9a" providerId="AD" clId="Web-{082125E5-F61D-4829-9B55-53C54F3237D0}" dt="2023-02-15T10:54:00.836" v="40" actId="20577"/>
+          <ac:spMkLst>
+            <pc:docMk/>
+            <pc:sldMk cId="3421541061" sldId="260"/>
+            <ac:spMk id="3" creationId="{00000000-0000-0000-0000-000000000000}"/>
+          </ac:spMkLst>
+        </pc:spChg>
+        <pc:extLst>
+          <p:ext xmlns:p="http://schemas.openxmlformats.org/presentationml/2006/main" uri="{D6D511B9-2390-475A-947B-AFAB55BFBCF1}">
+            <pc226:cmChg xmlns:pc226="http://schemas.microsoft.com/office/powerpoint/2022/06/main/command" chg="add mod">
+              <pc226:chgData name="Aiara Lobo Gomes" userId="S::aiara.lobogomes@maastro.nl::ea21328a-303d-4bcd-846f-41db275cad9a" providerId="AD" clId="Web-{082125E5-F61D-4829-9B55-53C54F3237D0}" dt="2023-02-15T10:53:59.602" v="39" actId="20577"/>
+              <pc2:cmMkLst xmlns:pc2="http://schemas.microsoft.com/office/powerpoint/2019/9/main/command">
+                <pc:docMk/>
+                <pc:sldMk cId="3421541061" sldId="260"/>
+                <pc2:cmMk id="{ABCC8D7C-2BFC-4A01-B73D-5B468B13EA2D}"/>
+              </pc2:cmMkLst>
+            </pc226:cmChg>
+          </p:ext>
+        </pc:extLst>
+      </pc:sldChg>
+      <pc:sldChg chg="modSp">
+        <pc:chgData name="Aiara Lobo Gomes" userId="S::aiara.lobogomes@maastro.nl::ea21328a-303d-4bcd-846f-41db275cad9a" providerId="AD" clId="Web-{082125E5-F61D-4829-9B55-53C54F3237D0}" dt="2023-02-15T10:55:19.417" v="44" actId="20577"/>
+        <pc:sldMkLst>
+          <pc:docMk/>
+          <pc:sldMk cId="26091957" sldId="261"/>
+        </pc:sldMkLst>
+        <pc:spChg chg="mod">
+          <ac:chgData name="Aiara Lobo Gomes" userId="S::aiara.lobogomes@maastro.nl::ea21328a-303d-4bcd-846f-41db275cad9a" providerId="AD" clId="Web-{082125E5-F61D-4829-9B55-53C54F3237D0}" dt="2023-02-15T10:55:19.417" v="44" actId="20577"/>
+          <ac:spMkLst>
+            <pc:docMk/>
+            <pc:sldMk cId="26091957" sldId="261"/>
+            <ac:spMk id="3" creationId="{00000000-0000-0000-0000-000000000000}"/>
+          </ac:spMkLst>
+        </pc:spChg>
+      </pc:sldChg>
+    </pc:docChg>
+  </pc:docChgLst>
+  <pc:docChgLst>
+    <pc:chgData name="Ralph Brecheisen" userId="S::ralph.brecheisen@maastro.nl::f298dded-971f-4e96-9402-5708bf72887d" providerId="AD" clId="Web-{29875D5A-6871-1D66-240D-4D5AB09B6B9A}"/>
+    <pc:docChg chg="mod">
+      <pc:chgData name="Ralph Brecheisen" userId="S::ralph.brecheisen@maastro.nl::f298dded-971f-4e96-9402-5708bf72887d" providerId="AD" clId="Web-{29875D5A-6871-1D66-240D-4D5AB09B6B9A}" dt="2023-02-16T09:05:07.885" v="4"/>
+      <pc:docMkLst>
+        <pc:docMk/>
+      </pc:docMkLst>
+      <pc:sldChg chg="modCm">
+        <pc:chgData name="Ralph Brecheisen" userId="S::ralph.brecheisen@maastro.nl::f298dded-971f-4e96-9402-5708bf72887d" providerId="AD" clId="Web-{29875D5A-6871-1D66-240D-4D5AB09B6B9A}" dt="2023-02-16T08:27:21.209" v="3"/>
+        <pc:sldMkLst>
+          <pc:docMk/>
+          <pc:sldMk cId="2430399406" sldId="258"/>
+        </pc:sldMkLst>
+        <pc:extLst>
+          <p:ext xmlns:p="http://schemas.openxmlformats.org/presentationml/2006/main" uri="{D6D511B9-2390-475A-947B-AFAB55BFBCF1}">
+            <pc226:cmChg xmlns:pc226="http://schemas.microsoft.com/office/powerpoint/2022/06/main/command" chg="">
+              <pc226:chgData name="Ralph Brecheisen" userId="S::ralph.brecheisen@maastro.nl::f298dded-971f-4e96-9402-5708bf72887d" providerId="AD" clId="Web-{29875D5A-6871-1D66-240D-4D5AB09B6B9A}" dt="2023-02-16T08:27:21.209" v="3"/>
+              <pc2:cmMkLst xmlns:pc2="http://schemas.microsoft.com/office/powerpoint/2019/9/main/command">
+                <pc:docMk/>
+                <pc:sldMk cId="2430399406" sldId="258"/>
+                <pc2:cmMk id="{FA93F46C-F03A-437B-883A-E9DFE763400E}"/>
+              </pc2:cmMkLst>
+              <pc226:cmRplyChg chg="add">
+                <pc226:chgData name="Ralph Brecheisen" userId="S::ralph.brecheisen@maastro.nl::f298dded-971f-4e96-9402-5708bf72887d" providerId="AD" clId="Web-{29875D5A-6871-1D66-240D-4D5AB09B6B9A}" dt="2023-02-16T08:20:31.853" v="1"/>
+                <pc2:cmRplyMkLst xmlns:pc2="http://schemas.microsoft.com/office/powerpoint/2019/9/main/command">
+                  <pc:docMk/>
+                  <pc:sldMk cId="2430399406" sldId="258"/>
+                  <pc2:cmMk id="{FA93F46C-F03A-437B-883A-E9DFE763400E}"/>
+                  <pc2:cmRplyMk id="{2FE12924-1353-4B62-A47E-831DDDB87C17}"/>
+                </pc2:cmRplyMkLst>
+              </pc226:cmRplyChg>
+              <pc226:cmRplyChg chg="add">
+                <pc226:chgData name="Ralph Brecheisen" userId="S::ralph.brecheisen@maastro.nl::f298dded-971f-4e96-9402-5708bf72887d" providerId="AD" clId="Web-{29875D5A-6871-1D66-240D-4D5AB09B6B9A}" dt="2023-02-16T08:27:21.209" v="3"/>
+                <pc2:cmRplyMkLst xmlns:pc2="http://schemas.microsoft.com/office/powerpoint/2019/9/main/command">
+                  <pc:docMk/>
+                  <pc:sldMk cId="2430399406" sldId="258"/>
+                  <pc2:cmMk id="{FA93F46C-F03A-437B-883A-E9DFE763400E}"/>
+                  <pc2:cmRplyMk id="{7A955960-8845-4E97-B9AB-DB4A86861C9D}"/>
+                </pc2:cmRplyMkLst>
+              </pc226:cmRplyChg>
+            </pc226:cmChg>
+          </p:ext>
+        </pc:extLst>
+      </pc:sldChg>
+      <pc:sldChg chg="modCm">
+        <pc:chgData name="Ralph Brecheisen" userId="S::ralph.brecheisen@maastro.nl::f298dded-971f-4e96-9402-5708bf72887d" providerId="AD" clId="Web-{29875D5A-6871-1D66-240D-4D5AB09B6B9A}" dt="2023-02-16T08:25:03.065" v="2"/>
+        <pc:sldMkLst>
+          <pc:docMk/>
+          <pc:sldMk cId="2730087503" sldId="259"/>
+        </pc:sldMkLst>
+        <pc:extLst>
+          <p:ext xmlns:p="http://schemas.openxmlformats.org/presentationml/2006/main" uri="{D6D511B9-2390-475A-947B-AFAB55BFBCF1}">
+            <pc226:cmChg xmlns:pc226="http://schemas.microsoft.com/office/powerpoint/2022/06/main/command" chg="">
+              <pc226:chgData name="Ralph Brecheisen" userId="S::ralph.brecheisen@maastro.nl::f298dded-971f-4e96-9402-5708bf72887d" providerId="AD" clId="Web-{29875D5A-6871-1D66-240D-4D5AB09B6B9A}" dt="2023-02-16T08:25:03.065" v="2"/>
+              <pc2:cmMkLst xmlns:pc2="http://schemas.microsoft.com/office/powerpoint/2019/9/main/command">
+                <pc:docMk/>
+                <pc:sldMk cId="2730087503" sldId="259"/>
+                <pc2:cmMk id="{CC0D42B8-4CC3-442F-AA6C-5448F5A07969}"/>
+              </pc2:cmMkLst>
+              <pc226:cmRplyChg chg="add">
+                <pc226:chgData name="Ralph Brecheisen" userId="S::ralph.brecheisen@maastro.nl::f298dded-971f-4e96-9402-5708bf72887d" providerId="AD" clId="Web-{29875D5A-6871-1D66-240D-4D5AB09B6B9A}" dt="2023-02-16T08:25:03.065" v="2"/>
+                <pc2:cmRplyMkLst xmlns:pc2="http://schemas.microsoft.com/office/powerpoint/2019/9/main/command">
+                  <pc:docMk/>
+                  <pc:sldMk cId="2730087503" sldId="259"/>
+                  <pc2:cmMk id="{CC0D42B8-4CC3-442F-AA6C-5448F5A07969}"/>
+                  <pc2:cmRplyMk id="{01D9701E-6032-4176-98C6-891EB8765AD1}"/>
+                </pc2:cmRplyMkLst>
+              </pc226:cmRplyChg>
+            </pc226:cmChg>
+          </p:ext>
+        </pc:extLst>
+      </pc:sldChg>
+      <pc:sldChg chg="addCm">
+        <pc:chgData name="Ralph Brecheisen" userId="S::ralph.brecheisen@maastro.nl::f298dded-971f-4e96-9402-5708bf72887d" providerId="AD" clId="Web-{29875D5A-6871-1D66-240D-4D5AB09B6B9A}" dt="2023-02-16T09:05:07.885" v="4"/>
+        <pc:sldMkLst>
+          <pc:docMk/>
+          <pc:sldMk cId="26091957" sldId="261"/>
+        </pc:sldMkLst>
+        <pc:extLst>
+          <p:ext xmlns:p="http://schemas.openxmlformats.org/presentationml/2006/main" uri="{D6D511B9-2390-475A-947B-AFAB55BFBCF1}">
+            <pc226:cmChg xmlns:pc226="http://schemas.microsoft.com/office/powerpoint/2022/06/main/command" chg="add">
+              <pc226:chgData name="Ralph Brecheisen" userId="S::ralph.brecheisen@maastro.nl::f298dded-971f-4e96-9402-5708bf72887d" providerId="AD" clId="Web-{29875D5A-6871-1D66-240D-4D5AB09B6B9A}" dt="2023-02-16T09:05:07.885" v="4"/>
+              <pc2:cmMkLst xmlns:pc2="http://schemas.microsoft.com/office/powerpoint/2019/9/main/command">
+                <pc:docMk/>
+                <pc:sldMk cId="26091957" sldId="261"/>
+                <pc2:cmMk id="{F6F54081-1CF3-4166-B33C-D0C7286F711A}"/>
+              </pc2:cmMkLst>
+            </pc226:cmChg>
+          </p:ext>
+        </pc:extLst>
+      </pc:sldChg>
+    </pc:docChg>
+  </pc:docChgLst>
+  <pc:docChgLst>
+    <pc:chgData name="Florian van Daalen" userId="S::florian.vandaalen@maastro.nl::1ac26d17-1f5c-4d44-b06d-8bd5da1f8df2" providerId="AD" clId="Web-{A4F7040E-2BF2-62C2-6453-36419E2581B2}"/>
+    <pc:docChg chg="mod">
+      <pc:chgData name="Florian van Daalen" userId="S::florian.vandaalen@maastro.nl::1ac26d17-1f5c-4d44-b06d-8bd5da1f8df2" providerId="AD" clId="Web-{A4F7040E-2BF2-62C2-6453-36419E2581B2}" dt="2023-02-15T13:02:27.843" v="2"/>
+      <pc:docMkLst>
+        <pc:docMk/>
+      </pc:docMkLst>
+      <pc:sldChg chg="modCm">
+        <pc:chgData name="Florian van Daalen" userId="S::florian.vandaalen@maastro.nl::1ac26d17-1f5c-4d44-b06d-8bd5da1f8df2" providerId="AD" clId="Web-{A4F7040E-2BF2-62C2-6453-36419E2581B2}" dt="2023-02-15T13:00:45.386" v="1"/>
+        <pc:sldMkLst>
+          <pc:docMk/>
+          <pc:sldMk cId="2730087503" sldId="259"/>
+        </pc:sldMkLst>
+        <pc:extLst>
+          <p:ext xmlns:p="http://schemas.openxmlformats.org/presentationml/2006/main" uri="{D6D511B9-2390-475A-947B-AFAB55BFBCF1}">
+            <pc226:cmChg xmlns:pc226="http://schemas.microsoft.com/office/powerpoint/2022/06/main/command" chg="">
+              <pc226:chgData name="Florian van Daalen" userId="S::florian.vandaalen@maastro.nl::1ac26d17-1f5c-4d44-b06d-8bd5da1f8df2" providerId="AD" clId="Web-{A4F7040E-2BF2-62C2-6453-36419E2581B2}" dt="2023-02-15T13:00:45.386" v="1"/>
+              <pc2:cmMkLst xmlns:pc2="http://schemas.microsoft.com/office/powerpoint/2019/9/main/command">
+                <pc:docMk/>
+                <pc:sldMk cId="2730087503" sldId="259"/>
+                <pc2:cmMk id="{CC0D42B8-4CC3-442F-AA6C-5448F5A07969}"/>
+              </pc2:cmMkLst>
+              <pc226:cmRplyChg chg="add">
+                <pc226:chgData name="Florian van Daalen" userId="S::florian.vandaalen@maastro.nl::1ac26d17-1f5c-4d44-b06d-8bd5da1f8df2" providerId="AD" clId="Web-{A4F7040E-2BF2-62C2-6453-36419E2581B2}" dt="2023-02-15T13:00:45.386" v="1"/>
+                <pc2:cmRplyMkLst xmlns:pc2="http://schemas.microsoft.com/office/powerpoint/2019/9/main/command">
+                  <pc:docMk/>
+                  <pc:sldMk cId="2730087503" sldId="259"/>
+                  <pc2:cmMk id="{CC0D42B8-4CC3-442F-AA6C-5448F5A07969}"/>
+                  <pc2:cmRplyMk id="{D40FB1D2-1021-44EA-9928-9E2ABBE53303}"/>
+                </pc2:cmRplyMkLst>
+              </pc226:cmRplyChg>
+            </pc226:cmChg>
+          </p:ext>
+        </pc:extLst>
+      </pc:sldChg>
+      <pc:sldChg chg="modCm">
+        <pc:chgData name="Florian van Daalen" userId="S::florian.vandaalen@maastro.nl::1ac26d17-1f5c-4d44-b06d-8bd5da1f8df2" providerId="AD" clId="Web-{A4F7040E-2BF2-62C2-6453-36419E2581B2}" dt="2023-02-15T13:02:27.843" v="2"/>
+        <pc:sldMkLst>
+          <pc:docMk/>
+          <pc:sldMk cId="3421541061" sldId="260"/>
+        </pc:sldMkLst>
+        <pc:extLst>
+          <p:ext xmlns:p="http://schemas.openxmlformats.org/presentationml/2006/main" uri="{D6D511B9-2390-475A-947B-AFAB55BFBCF1}">
+            <pc226:cmChg xmlns:pc226="http://schemas.microsoft.com/office/powerpoint/2022/06/main/command" chg="">
+              <pc226:chgData name="Florian van Daalen" userId="S::florian.vandaalen@maastro.nl::1ac26d17-1f5c-4d44-b06d-8bd5da1f8df2" providerId="AD" clId="Web-{A4F7040E-2BF2-62C2-6453-36419E2581B2}" dt="2023-02-15T13:02:27.843" v="2"/>
+              <pc2:cmMkLst xmlns:pc2="http://schemas.microsoft.com/office/powerpoint/2019/9/main/command">
+                <pc:docMk/>
+                <pc:sldMk cId="3421541061" sldId="260"/>
+                <pc2:cmMk id="{ABCC8D7C-2BFC-4A01-B73D-5B468B13EA2D}"/>
+              </pc2:cmMkLst>
+              <pc226:cmRplyChg chg="add">
+                <pc226:chgData name="Florian van Daalen" userId="S::florian.vandaalen@maastro.nl::1ac26d17-1f5c-4d44-b06d-8bd5da1f8df2" providerId="AD" clId="Web-{A4F7040E-2BF2-62C2-6453-36419E2581B2}" dt="2023-02-15T13:02:27.843" v="2"/>
+                <pc2:cmRplyMkLst xmlns:pc2="http://schemas.microsoft.com/office/powerpoint/2019/9/main/command">
+                  <pc:docMk/>
+                  <pc:sldMk cId="3421541061" sldId="260"/>
+                  <pc2:cmMk id="{ABCC8D7C-2BFC-4A01-B73D-5B468B13EA2D}"/>
+                  <pc2:cmRplyMk id="{EEEB32D1-EF61-4177-B7D8-FA7C651570EA}"/>
+                </pc2:cmRplyMkLst>
+              </pc226:cmRplyChg>
+            </pc226:cmChg>
+          </p:ext>
+        </pc:extLst>
+      </pc:sldChg>
+    </pc:docChg>
+  </pc:docChgLst>
+  <pc:docChgLst>
+    <pc:chgData name="Florian van Daalen" userId="S::florian.vandaalen@maastro.nl::1ac26d17-1f5c-4d44-b06d-8bd5da1f8df2" providerId="AD" clId="Web-{7A2C8AFE-14A3-36FE-EA1E-CFE24650E0FB}"/>
+    <pc:docChg chg="addSld delSld modSld">
+      <pc:chgData name="Florian van Daalen" userId="S::florian.vandaalen@maastro.nl::1ac26d17-1f5c-4d44-b06d-8bd5da1f8df2" providerId="AD" clId="Web-{7A2C8AFE-14A3-36FE-EA1E-CFE24650E0FB}" dt="2023-03-16T13:18:33.257" v="694" actId="20577"/>
+      <pc:docMkLst>
+        <pc:docMk/>
+      </pc:docMkLst>
+      <pc:sldChg chg="del">
+        <pc:chgData name="Florian van Daalen" userId="S::florian.vandaalen@maastro.nl::1ac26d17-1f5c-4d44-b06d-8bd5da1f8df2" providerId="AD" clId="Web-{7A2C8AFE-14A3-36FE-EA1E-CFE24650E0FB}" dt="2023-03-16T13:06:08.941" v="95"/>
+        <pc:sldMkLst>
+          <pc:docMk/>
+          <pc:sldMk cId="2305509078" sldId="257"/>
+        </pc:sldMkLst>
+      </pc:sldChg>
+      <pc:sldChg chg="modSp addCm delCm modCm">
+        <pc:chgData name="Florian van Daalen" userId="S::florian.vandaalen@maastro.nl::1ac26d17-1f5c-4d44-b06d-8bd5da1f8df2" providerId="AD" clId="Web-{7A2C8AFE-14A3-36FE-EA1E-CFE24650E0FB}" dt="2023-03-16T13:16:33.939" v="547" actId="20577"/>
+        <pc:sldMkLst>
+          <pc:docMk/>
+          <pc:sldMk cId="2430399406" sldId="258"/>
+        </pc:sldMkLst>
+        <pc:spChg chg="mod">
+          <ac:chgData name="Florian van Daalen" userId="S::florian.vandaalen@maastro.nl::1ac26d17-1f5c-4d44-b06d-8bd5da1f8df2" providerId="AD" clId="Web-{7A2C8AFE-14A3-36FE-EA1E-CFE24650E0FB}" dt="2023-03-16T13:16:33.939" v="547" actId="20577"/>
+          <ac:spMkLst>
+            <pc:docMk/>
+            <pc:sldMk cId="2430399406" sldId="258"/>
+            <ac:spMk id="3" creationId="{00000000-0000-0000-0000-000000000000}"/>
+          </ac:spMkLst>
+        </pc:spChg>
+        <pc:extLst>
+          <p:ext xmlns:p="http://schemas.openxmlformats.org/presentationml/2006/main" uri="{D6D511B9-2390-475A-947B-AFAB55BFBCF1}">
+            <pc226:cmChg xmlns:pc226="http://schemas.microsoft.com/office/powerpoint/2022/06/main/command" chg="add del mod">
+              <pc226:chgData name="Florian van Daalen" userId="S::florian.vandaalen@maastro.nl::1ac26d17-1f5c-4d44-b06d-8bd5da1f8df2" providerId="AD" clId="Web-{7A2C8AFE-14A3-36FE-EA1E-CFE24650E0FB}" dt="2023-03-16T13:16:18.485" v="545" actId="20577"/>
+              <pc2:cmMkLst xmlns:pc2="http://schemas.microsoft.com/office/powerpoint/2019/9/main/command">
+                <pc:docMk/>
+                <pc:sldMk cId="2430399406" sldId="258"/>
+                <pc2:cmMk id="{FA93F46C-F03A-437B-883A-E9DFE763400E}"/>
+              </pc2:cmMkLst>
+            </pc226:cmChg>
+          </p:ext>
+        </pc:extLst>
+      </pc:sldChg>
+      <pc:sldChg chg="add del">
+        <pc:chgData name="Florian van Daalen" userId="S::florian.vandaalen@maastro.nl::1ac26d17-1f5c-4d44-b06d-8bd5da1f8df2" providerId="AD" clId="Web-{7A2C8AFE-14A3-36FE-EA1E-CFE24650E0FB}" dt="2023-03-16T13:03:31.699" v="92"/>
+        <pc:sldMkLst>
+          <pc:docMk/>
+          <pc:sldMk cId="2730087503" sldId="259"/>
+        </pc:sldMkLst>
+      </pc:sldChg>
+      <pc:sldChg chg="modSp addCm delCm modCm">
+        <pc:chgData name="Florian van Daalen" userId="S::florian.vandaalen@maastro.nl::1ac26d17-1f5c-4d44-b06d-8bd5da1f8df2" providerId="AD" clId="Web-{7A2C8AFE-14A3-36FE-EA1E-CFE24650E0FB}" dt="2023-03-16T13:17:56.349" v="650" actId="20577"/>
+        <pc:sldMkLst>
+          <pc:docMk/>
+          <pc:sldMk cId="3421541061" sldId="260"/>
+        </pc:sldMkLst>
+        <pc:spChg chg="mod">
+          <ac:chgData name="Florian van Daalen" userId="S::florian.vandaalen@maastro.nl::1ac26d17-1f5c-4d44-b06d-8bd5da1f8df2" providerId="AD" clId="Web-{7A2C8AFE-14A3-36FE-EA1E-CFE24650E0FB}" dt="2023-03-16T13:10:29.969" v="313" actId="20577"/>
+          <ac:spMkLst>
+            <pc:docMk/>
+            <pc:sldMk cId="3421541061" sldId="260"/>
+            <ac:spMk id="2" creationId="{00000000-0000-0000-0000-000000000000}"/>
+          </ac:spMkLst>
+        </pc:spChg>
+        <pc:spChg chg="mod">
+          <ac:chgData name="Florian van Daalen" userId="S::florian.vandaalen@maastro.nl::1ac26d17-1f5c-4d44-b06d-8bd5da1f8df2" providerId="AD" clId="Web-{7A2C8AFE-14A3-36FE-EA1E-CFE24650E0FB}" dt="2023-03-16T13:17:56.349" v="650" actId="20577"/>
+          <ac:spMkLst>
+            <pc:docMk/>
+            <pc:sldMk cId="3421541061" sldId="260"/>
+            <ac:spMk id="3" creationId="{00000000-0000-0000-0000-000000000000}"/>
+          </ac:spMkLst>
+        </pc:spChg>
+        <pc:extLst>
+          <p:ext xmlns:p="http://schemas.openxmlformats.org/presentationml/2006/main" uri="{D6D511B9-2390-475A-947B-AFAB55BFBCF1}">
+            <pc226:cmChg xmlns:pc226="http://schemas.microsoft.com/office/powerpoint/2022/06/main/command" chg="add del mod">
+              <pc226:chgData name="Florian van Daalen" userId="S::florian.vandaalen@maastro.nl::1ac26d17-1f5c-4d44-b06d-8bd5da1f8df2" providerId="AD" clId="Web-{7A2C8AFE-14A3-36FE-EA1E-CFE24650E0FB}" dt="2023-03-16T13:17:50.536" v="648" actId="20577"/>
+              <pc2:cmMkLst xmlns:pc2="http://schemas.microsoft.com/office/powerpoint/2019/9/main/command">
+                <pc:docMk/>
+                <pc:sldMk cId="3421541061" sldId="260"/>
+                <pc2:cmMk id="{ABCC8D7C-2BFC-4A01-B73D-5B468B13EA2D}"/>
+              </pc2:cmMkLst>
+            </pc226:cmChg>
+            <pc226:cmChg xmlns:pc226="http://schemas.microsoft.com/office/powerpoint/2022/06/main/command" chg="add del mod">
+              <pc226:chgData name="Florian van Daalen" userId="S::florian.vandaalen@maastro.nl::1ac26d17-1f5c-4d44-b06d-8bd5da1f8df2" providerId="AD" clId="Web-{7A2C8AFE-14A3-36FE-EA1E-CFE24650E0FB}" dt="2023-03-16T13:12:42.100" v="413"/>
+              <pc2:cmMkLst xmlns:pc2="http://schemas.microsoft.com/office/powerpoint/2019/9/main/command">
+                <pc:docMk/>
+                <pc:sldMk cId="3421541061" sldId="260"/>
+                <pc2:cmMk id="{67D22CE5-C95A-4416-AE42-0F85FF62E748}"/>
+              </pc2:cmMkLst>
+            </pc226:cmChg>
+          </p:ext>
+        </pc:extLst>
+      </pc:sldChg>
+      <pc:sldChg chg="modSp modCm">
+        <pc:chgData name="Florian van Daalen" userId="S::florian.vandaalen@maastro.nl::1ac26d17-1f5c-4d44-b06d-8bd5da1f8df2" providerId="AD" clId="Web-{7A2C8AFE-14A3-36FE-EA1E-CFE24650E0FB}" dt="2023-03-16T13:18:33.257" v="694" actId="20577"/>
+        <pc:sldMkLst>
+          <pc:docMk/>
+          <pc:sldMk cId="26091957" sldId="261"/>
+        </pc:sldMkLst>
+        <pc:spChg chg="mod">
+          <ac:chgData name="Florian van Daalen" userId="S::florian.vandaalen@maastro.nl::1ac26d17-1f5c-4d44-b06d-8bd5da1f8df2" providerId="AD" clId="Web-{7A2C8AFE-14A3-36FE-EA1E-CFE24650E0FB}" dt="2023-03-16T13:03:41.121" v="94" actId="20577"/>
+          <ac:spMkLst>
+            <pc:docMk/>
+            <pc:sldMk cId="26091957" sldId="261"/>
+            <ac:spMk id="2" creationId="{00000000-0000-0000-0000-000000000000}"/>
+          </ac:spMkLst>
+        </pc:spChg>
+        <pc:spChg chg="mod">
+          <ac:chgData name="Florian van Daalen" userId="S::florian.vandaalen@maastro.nl::1ac26d17-1f5c-4d44-b06d-8bd5da1f8df2" providerId="AD" clId="Web-{7A2C8AFE-14A3-36FE-EA1E-CFE24650E0FB}" dt="2023-03-16T13:18:33.257" v="694" actId="20577"/>
+          <ac:spMkLst>
+            <pc:docMk/>
+            <pc:sldMk cId="26091957" sldId="261"/>
+            <ac:spMk id="3" creationId="{00000000-0000-0000-0000-000000000000}"/>
+          </ac:spMkLst>
+        </pc:spChg>
+        <pc:extLst>
+          <p:ext xmlns:p="http://schemas.openxmlformats.org/presentationml/2006/main" uri="{D6D511B9-2390-475A-947B-AFAB55BFBCF1}">
+            <pc226:cmChg xmlns:pc226="http://schemas.microsoft.com/office/powerpoint/2022/06/main/command" chg="mod">
+              <pc226:chgData name="Florian van Daalen" userId="S::florian.vandaalen@maastro.nl::1ac26d17-1f5c-4d44-b06d-8bd5da1f8df2" providerId="AD" clId="Web-{7A2C8AFE-14A3-36FE-EA1E-CFE24650E0FB}" dt="2023-03-16T13:18:33.257" v="694" actId="20577"/>
+              <pc2:cmMkLst xmlns:pc2="http://schemas.microsoft.com/office/powerpoint/2019/9/main/command">
+                <pc:docMk/>
+                <pc:sldMk cId="26091957" sldId="261"/>
+                <pc2:cmMk id="{0E4B270B-6710-4613-A942-E3E86E83C36E}"/>
+              </pc2:cmMkLst>
+            </pc226:cmChg>
+            <pc226:cmChg xmlns:pc226="http://schemas.microsoft.com/office/powerpoint/2022/06/main/command" chg="mod">
+              <pc226:chgData name="Florian van Daalen" userId="S::florian.vandaalen@maastro.nl::1ac26d17-1f5c-4d44-b06d-8bd5da1f8df2" providerId="AD" clId="Web-{7A2C8AFE-14A3-36FE-EA1E-CFE24650E0FB}" dt="2023-03-16T13:13:45.462" v="490"/>
+              <pc2:cmMkLst xmlns:pc2="http://schemas.microsoft.com/office/powerpoint/2019/9/main/command">
+                <pc:docMk/>
+                <pc:sldMk cId="26091957" sldId="261"/>
+                <pc2:cmMk id="{F6F54081-1CF3-4166-B33C-D0C7286F711A}"/>
+              </pc2:cmMkLst>
+            </pc226:cmChg>
+          </p:ext>
+        </pc:extLst>
+      </pc:sldChg>
+    </pc:docChg>
+  </pc:docChgLst>
+  <pc:docChgLst>
+    <pc:chgData name="Florian van Daalen" userId="S::florian.vandaalen@maastro.nl::1ac26d17-1f5c-4d44-b06d-8bd5da1f8df2" providerId="AD" clId="Web-{C5DEF346-22B5-56BB-18A2-99582CBCA6DE}"/>
+    <pc:docChg chg="modSld">
+      <pc:chgData name="Florian van Daalen" userId="S::florian.vandaalen@maastro.nl::1ac26d17-1f5c-4d44-b06d-8bd5da1f8df2" providerId="AD" clId="Web-{C5DEF346-22B5-56BB-18A2-99582CBCA6DE}" dt="2023-02-16T12:57:34.980" v="39"/>
+      <pc:docMkLst>
+        <pc:docMk/>
+      </pc:docMkLst>
+      <pc:sldChg chg="modCm">
+        <pc:chgData name="Florian van Daalen" userId="S::florian.vandaalen@maastro.nl::1ac26d17-1f5c-4d44-b06d-8bd5da1f8df2" providerId="AD" clId="Web-{C5DEF346-22B5-56BB-18A2-99582CBCA6DE}" dt="2023-02-16T12:49:13.761" v="35"/>
+        <pc:sldMkLst>
+          <pc:docMk/>
+          <pc:sldMk cId="2305509078" sldId="257"/>
+        </pc:sldMkLst>
+        <pc:extLst>
+          <p:ext xmlns:p="http://schemas.openxmlformats.org/presentationml/2006/main" uri="{D6D511B9-2390-475A-947B-AFAB55BFBCF1}">
+            <pc226:cmChg xmlns:pc226="http://schemas.microsoft.com/office/powerpoint/2022/06/main/command" chg="">
+              <pc226:chgData name="Florian van Daalen" userId="S::florian.vandaalen@maastro.nl::1ac26d17-1f5c-4d44-b06d-8bd5da1f8df2" providerId="AD" clId="Web-{C5DEF346-22B5-56BB-18A2-99582CBCA6DE}" dt="2023-02-16T12:49:13.761" v="35"/>
+              <pc2:cmMkLst xmlns:pc2="http://schemas.microsoft.com/office/powerpoint/2019/9/main/command">
+                <pc:docMk/>
+                <pc:sldMk cId="2305509078" sldId="257"/>
+                <pc2:cmMk id="{A59DD9A1-0FBA-41E0-9162-4D0DB987C4FB}"/>
+              </pc2:cmMkLst>
+              <pc226:cmRplyChg chg="add">
+                <pc226:chgData name="Florian van Daalen" userId="S::florian.vandaalen@maastro.nl::1ac26d17-1f5c-4d44-b06d-8bd5da1f8df2" providerId="AD" clId="Web-{C5DEF346-22B5-56BB-18A2-99582CBCA6DE}" dt="2023-02-16T12:49:13.761" v="35"/>
+                <pc2:cmRplyMkLst xmlns:pc2="http://schemas.microsoft.com/office/powerpoint/2019/9/main/command">
+                  <pc:docMk/>
+                  <pc:sldMk cId="2305509078" sldId="257"/>
+                  <pc2:cmMk id="{A59DD9A1-0FBA-41E0-9162-4D0DB987C4FB}"/>
+                  <pc2:cmRplyMk id="{9495CF13-03C7-4CEC-B9B8-5949F10AF7BA}"/>
+                </pc2:cmRplyMkLst>
+              </pc226:cmRplyChg>
+            </pc226:cmChg>
+          </p:ext>
+        </pc:extLst>
+      </pc:sldChg>
+      <pc:sldChg chg="modSp modCm">
+        <pc:chgData name="Florian van Daalen" userId="S::florian.vandaalen@maastro.nl::1ac26d17-1f5c-4d44-b06d-8bd5da1f8df2" providerId="AD" clId="Web-{C5DEF346-22B5-56BB-18A2-99582CBCA6DE}" dt="2023-02-16T12:44:13.361" v="22" actId="20577"/>
+        <pc:sldMkLst>
+          <pc:docMk/>
+          <pc:sldMk cId="2430399406" sldId="258"/>
+        </pc:sldMkLst>
+        <pc:spChg chg="mod">
+          <ac:chgData name="Florian van Daalen" userId="S::florian.vandaalen@maastro.nl::1ac26d17-1f5c-4d44-b06d-8bd5da1f8df2" providerId="AD" clId="Web-{C5DEF346-22B5-56BB-18A2-99582CBCA6DE}" dt="2023-02-16T12:44:13.361" v="22" actId="20577"/>
+          <ac:spMkLst>
+            <pc:docMk/>
+            <pc:sldMk cId="2430399406" sldId="258"/>
+            <ac:spMk id="3" creationId="{00000000-0000-0000-0000-000000000000}"/>
+          </ac:spMkLst>
+        </pc:spChg>
+        <pc:extLst>
+          <p:ext xmlns:p="http://schemas.openxmlformats.org/presentationml/2006/main" uri="{D6D511B9-2390-475A-947B-AFAB55BFBCF1}">
+            <pc226:cmChg xmlns:pc226="http://schemas.microsoft.com/office/powerpoint/2022/06/main/command" chg="mod">
+              <pc226:chgData name="Florian van Daalen" userId="S::florian.vandaalen@maastro.nl::1ac26d17-1f5c-4d44-b06d-8bd5da1f8df2" providerId="AD" clId="Web-{C5DEF346-22B5-56BB-18A2-99582CBCA6DE}" dt="2023-02-16T12:44:08.798" v="21" actId="20577"/>
+              <pc2:cmMkLst xmlns:pc2="http://schemas.microsoft.com/office/powerpoint/2019/9/main/command">
+                <pc:docMk/>
+                <pc:sldMk cId="2430399406" sldId="258"/>
+                <pc2:cmMk id="{FA93F46C-F03A-437B-883A-E9DFE763400E}"/>
+              </pc2:cmMkLst>
+              <pc226:cmRplyChg chg="add">
+                <pc226:chgData name="Florian van Daalen" userId="S::florian.vandaalen@maastro.nl::1ac26d17-1f5c-4d44-b06d-8bd5da1f8df2" providerId="AD" clId="Web-{C5DEF346-22B5-56BB-18A2-99582CBCA6DE}" dt="2023-02-16T12:40:22.651" v="0"/>
+                <pc2:cmRplyMkLst xmlns:pc2="http://schemas.microsoft.com/office/powerpoint/2019/9/main/command">
+                  <pc:docMk/>
+                  <pc:sldMk cId="2430399406" sldId="258"/>
+                  <pc2:cmMk id="{FA93F46C-F03A-437B-883A-E9DFE763400E}"/>
+                  <pc2:cmRplyMk id="{CEDD0CAC-0A5E-4E85-A2E4-2B51D8817A75}"/>
+                </pc2:cmRplyMkLst>
+              </pc226:cmRplyChg>
+            </pc226:cmChg>
+          </p:ext>
+        </pc:extLst>
+      </pc:sldChg>
+      <pc:sldChg chg="modSp modCm">
+        <pc:chgData name="Florian van Daalen" userId="S::florian.vandaalen@maastro.nl::1ac26d17-1f5c-4d44-b06d-8bd5da1f8df2" providerId="AD" clId="Web-{C5DEF346-22B5-56BB-18A2-99582CBCA6DE}" dt="2023-02-16T12:49:20.808" v="37" actId="20577"/>
+        <pc:sldMkLst>
+          <pc:docMk/>
+          <pc:sldMk cId="2730087503" sldId="259"/>
+        </pc:sldMkLst>
+        <pc:spChg chg="mod">
+          <ac:chgData name="Florian van Daalen" userId="S::florian.vandaalen@maastro.nl::1ac26d17-1f5c-4d44-b06d-8bd5da1f8df2" providerId="AD" clId="Web-{C5DEF346-22B5-56BB-18A2-99582CBCA6DE}" dt="2023-02-16T12:49:20.808" v="37" actId="20577"/>
+          <ac:spMkLst>
+            <pc:docMk/>
+            <pc:sldMk cId="2730087503" sldId="259"/>
+            <ac:spMk id="3" creationId="{00000000-0000-0000-0000-000000000000}"/>
+          </ac:spMkLst>
+        </pc:spChg>
+        <pc:extLst>
+          <p:ext xmlns:p="http://schemas.openxmlformats.org/presentationml/2006/main" uri="{D6D511B9-2390-475A-947B-AFAB55BFBCF1}">
+            <pc226:cmChg xmlns:pc226="http://schemas.microsoft.com/office/powerpoint/2022/06/main/command" chg="">
+              <pc226:chgData name="Florian van Daalen" userId="S::florian.vandaalen@maastro.nl::1ac26d17-1f5c-4d44-b06d-8bd5da1f8df2" providerId="AD" clId="Web-{C5DEF346-22B5-56BB-18A2-99582CBCA6DE}" dt="2023-02-16T12:42:24.811" v="1"/>
+              <pc2:cmMkLst xmlns:pc2="http://schemas.microsoft.com/office/powerpoint/2019/9/main/command">
+                <pc:docMk/>
+                <pc:sldMk cId="2730087503" sldId="259"/>
+                <pc2:cmMk id="{330C25A0-FB7F-4192-9E8E-27888CA86C48}"/>
+              </pc2:cmMkLst>
+              <pc226:cmRplyChg chg="add">
+                <pc226:chgData name="Florian van Daalen" userId="S::florian.vandaalen@maastro.nl::1ac26d17-1f5c-4d44-b06d-8bd5da1f8df2" providerId="AD" clId="Web-{C5DEF346-22B5-56BB-18A2-99582CBCA6DE}" dt="2023-02-16T12:42:24.811" v="1"/>
+                <pc2:cmRplyMkLst xmlns:pc2="http://schemas.microsoft.com/office/powerpoint/2019/9/main/command">
+                  <pc:docMk/>
+                  <pc:sldMk cId="2730087503" sldId="259"/>
+                  <pc2:cmMk id="{330C25A0-FB7F-4192-9E8E-27888CA86C48}"/>
+                  <pc2:cmRplyMk id="{658AB9C3-F933-4AE0-94E5-838B82F2C77A}"/>
+                </pc2:cmRplyMkLst>
+              </pc226:cmRplyChg>
+            </pc226:cmChg>
+            <pc226:cmChg xmlns:pc226="http://schemas.microsoft.com/office/powerpoint/2022/06/main/command" chg="mod">
+              <pc226:chgData name="Florian van Daalen" userId="S::florian.vandaalen@maastro.nl::1ac26d17-1f5c-4d44-b06d-8bd5da1f8df2" providerId="AD" clId="Web-{C5DEF346-22B5-56BB-18A2-99582CBCA6DE}" dt="2023-02-16T12:44:17.611" v="25" actId="20577"/>
+              <pc2:cmMkLst xmlns:pc2="http://schemas.microsoft.com/office/powerpoint/2019/9/main/command">
+                <pc:docMk/>
+                <pc:sldMk cId="2730087503" sldId="259"/>
+                <pc2:cmMk id="{CC0D42B8-4CC3-442F-AA6C-5448F5A07969}"/>
+              </pc2:cmMkLst>
+              <pc226:cmRplyChg chg="add">
+                <pc226:chgData name="Florian van Daalen" userId="S::florian.vandaalen@maastro.nl::1ac26d17-1f5c-4d44-b06d-8bd5da1f8df2" providerId="AD" clId="Web-{C5DEF346-22B5-56BB-18A2-99582CBCA6DE}" dt="2023-02-16T12:43:43.407" v="2"/>
+                <pc2:cmRplyMkLst xmlns:pc2="http://schemas.microsoft.com/office/powerpoint/2019/9/main/command">
+                  <pc:docMk/>
+                  <pc:sldMk cId="2730087503" sldId="259"/>
+                  <pc2:cmMk id="{CC0D42B8-4CC3-442F-AA6C-5448F5A07969}"/>
+                  <pc2:cmRplyMk id="{8B0FACFD-3549-40C2-BCB9-C43350E05249}"/>
+                </pc2:cmRplyMkLst>
+              </pc226:cmRplyChg>
+            </pc226:cmChg>
+          </p:ext>
+        </pc:extLst>
+      </pc:sldChg>
+      <pc:sldChg chg="modSp modCm">
+        <pc:chgData name="Florian van Daalen" userId="S::florian.vandaalen@maastro.nl::1ac26d17-1f5c-4d44-b06d-8bd5da1f8df2" providerId="AD" clId="Web-{C5DEF346-22B5-56BB-18A2-99582CBCA6DE}" dt="2023-02-16T12:44:24.377" v="30" actId="20577"/>
+        <pc:sldMkLst>
+          <pc:docMk/>
+          <pc:sldMk cId="3421541061" sldId="260"/>
+        </pc:sldMkLst>
+        <pc:spChg chg="mod">
+          <ac:chgData name="Florian van Daalen" userId="S::florian.vandaalen@maastro.nl::1ac26d17-1f5c-4d44-b06d-8bd5da1f8df2" providerId="AD" clId="Web-{C5DEF346-22B5-56BB-18A2-99582CBCA6DE}" dt="2023-02-16T12:44:24.377" v="30" actId="20577"/>
+          <ac:spMkLst>
+            <pc:docMk/>
+            <pc:sldMk cId="3421541061" sldId="260"/>
+            <ac:spMk id="3" creationId="{00000000-0000-0000-0000-000000000000}"/>
+          </ac:spMkLst>
+        </pc:spChg>
+        <pc:extLst>
+          <p:ext xmlns:p="http://schemas.openxmlformats.org/presentationml/2006/main" uri="{D6D511B9-2390-475A-947B-AFAB55BFBCF1}">
+            <pc226:cmChg xmlns:pc226="http://schemas.microsoft.com/office/powerpoint/2022/06/main/command" chg="mod">
+              <pc226:chgData name="Florian van Daalen" userId="S::florian.vandaalen@maastro.nl::1ac26d17-1f5c-4d44-b06d-8bd5da1f8df2" providerId="AD" clId="Web-{C5DEF346-22B5-56BB-18A2-99582CBCA6DE}" dt="2023-02-16T12:44:23.252" v="29" actId="20577"/>
+              <pc2:cmMkLst xmlns:pc2="http://schemas.microsoft.com/office/powerpoint/2019/9/main/command">
+                <pc:docMk/>
+                <pc:sldMk cId="3421541061" sldId="260"/>
+                <pc2:cmMk id="{ABCC8D7C-2BFC-4A01-B73D-5B468B13EA2D}"/>
+              </pc2:cmMkLst>
+            </pc226:cmChg>
+          </p:ext>
+        </pc:extLst>
+      </pc:sldChg>
+      <pc:sldChg chg="modSp modCm">
+        <pc:chgData name="Florian van Daalen" userId="S::florian.vandaalen@maastro.nl::1ac26d17-1f5c-4d44-b06d-8bd5da1f8df2" providerId="AD" clId="Web-{C5DEF346-22B5-56BB-18A2-99582CBCA6DE}" dt="2023-02-16T12:57:34.980" v="39"/>
+        <pc:sldMkLst>
+          <pc:docMk/>
+          <pc:sldMk cId="26091957" sldId="261"/>
+        </pc:sldMkLst>
+        <pc:spChg chg="mod">
+          <ac:chgData name="Florian van Daalen" userId="S::florian.vandaalen@maastro.nl::1ac26d17-1f5c-4d44-b06d-8bd5da1f8df2" providerId="AD" clId="Web-{C5DEF346-22B5-56BB-18A2-99582CBCA6DE}" dt="2023-02-16T12:44:28.768" v="34" actId="20577"/>
+          <ac:spMkLst>
+            <pc:docMk/>
+            <pc:sldMk cId="26091957" sldId="261"/>
+            <ac:spMk id="3" creationId="{00000000-0000-0000-0000-000000000000}"/>
+          </ac:spMkLst>
+        </pc:spChg>
+        <pc:extLst>
+          <p:ext xmlns:p="http://schemas.openxmlformats.org/presentationml/2006/main" uri="{D6D511B9-2390-475A-947B-AFAB55BFBCF1}">
+            <pc226:cmChg xmlns:pc226="http://schemas.microsoft.com/office/powerpoint/2022/06/main/command" chg="mod">
+              <pc226:chgData name="Florian van Daalen" userId="S::florian.vandaalen@maastro.nl::1ac26d17-1f5c-4d44-b06d-8bd5da1f8df2" providerId="AD" clId="Web-{C5DEF346-22B5-56BB-18A2-99582CBCA6DE}" dt="2023-02-16T12:57:34.980" v="39"/>
+              <pc2:cmMkLst xmlns:pc2="http://schemas.microsoft.com/office/powerpoint/2019/9/main/command">
+                <pc:docMk/>
+                <pc:sldMk cId="26091957" sldId="261"/>
+                <pc2:cmMk id="{0E4B270B-6710-4613-A942-E3E86E83C36E}"/>
+              </pc2:cmMkLst>
+              <pc226:cmRplyChg chg="add">
+                <pc226:chgData name="Florian van Daalen" userId="S::florian.vandaalen@maastro.nl::1ac26d17-1f5c-4d44-b06d-8bd5da1f8df2" providerId="AD" clId="Web-{C5DEF346-22B5-56BB-18A2-99582CBCA6DE}" dt="2023-02-16T12:57:34.980" v="39"/>
+                <pc2:cmRplyMkLst xmlns:pc2="http://schemas.microsoft.com/office/powerpoint/2019/9/main/command">
+                  <pc:docMk/>
+                  <pc:sldMk cId="26091957" sldId="261"/>
+                  <pc2:cmMk id="{0E4B270B-6710-4613-A942-E3E86E83C36E}"/>
+                  <pc2:cmRplyMk id="{4F7F2BD1-C6DF-408D-B7E3-3B5C0AC96245}"/>
+                </pc2:cmRplyMkLst>
+              </pc226:cmRplyChg>
+            </pc226:cmChg>
+            <pc226:cmChg xmlns:pc226="http://schemas.microsoft.com/office/powerpoint/2022/06/main/command" chg="">
+              <pc226:chgData name="Florian van Daalen" userId="S::florian.vandaalen@maastro.nl::1ac26d17-1f5c-4d44-b06d-8bd5da1f8df2" providerId="AD" clId="Web-{C5DEF346-22B5-56BB-18A2-99582CBCA6DE}" dt="2023-02-16T12:53:14.269" v="38"/>
+              <pc2:cmMkLst xmlns:pc2="http://schemas.microsoft.com/office/powerpoint/2019/9/main/command">
+                <pc:docMk/>
+                <pc:sldMk cId="26091957" sldId="261"/>
+                <pc2:cmMk id="{F6F54081-1CF3-4166-B33C-D0C7286F711A}"/>
+              </pc2:cmMkLst>
+              <pc226:cmRplyChg chg="add">
+                <pc226:chgData name="Florian van Daalen" userId="S::florian.vandaalen@maastro.nl::1ac26d17-1f5c-4d44-b06d-8bd5da1f8df2" providerId="AD" clId="Web-{C5DEF346-22B5-56BB-18A2-99582CBCA6DE}" dt="2023-02-16T12:53:14.269" v="38"/>
+                <pc2:cmRplyMkLst xmlns:pc2="http://schemas.microsoft.com/office/powerpoint/2019/9/main/command">
+                  <pc:docMk/>
+                  <pc:sldMk cId="26091957" sldId="261"/>
+                  <pc2:cmMk id="{F6F54081-1CF3-4166-B33C-D0C7286F711A}"/>
+                  <pc2:cmRplyMk id="{F6198F11-777F-4F3A-A30B-280B719183AE}"/>
+                </pc2:cmRplyMkLst>
+              </pc226:cmRplyChg>
+            </pc226:cmChg>
+          </p:ext>
+        </pc:extLst>
+      </pc:sldChg>
+    </pc:docChg>
+  </pc:docChgLst>
+</pc:chgInfo>
+</file>
+
+<file path=ppt/comments/modernComment_102_90DCF3AE.xml><?xml version="1.0" encoding="utf-8"?>
+<p188:cmLst xmlns:a="http://schemas.openxmlformats.org/drawingml/2006/main" xmlns:r="http://schemas.openxmlformats.org/officeDocument/2006/relationships" xmlns:p188="http://schemas.microsoft.com/office/powerpoint/2018/8/main">
+  <p188:cm id="{FA93F46C-F03A-437B-883A-E9DFE763400E}" authorId="{B256294C-DD53-F337-F51F-ACE5E06D4639}" status="resolved" created="2023-02-15T10:48:42.810" complete="100000">
+    <ac:txMkLst xmlns:ac="http://schemas.microsoft.com/office/drawing/2013/main/command">
+      <pc:docMk xmlns:pc="http://schemas.microsoft.com/office/powerpoint/2013/main/command"/>
+      <pc:sldMk xmlns:pc="http://schemas.microsoft.com/office/powerpoint/2013/main/command" cId="2430399406" sldId="258"/>
+      <ac:spMk id="3" creationId="{00000000-0000-0000-0000-000000000000}"/>
+      <ac:txMk cp="365" len="13">
+        <ac:context len="650" hash="1408040475"/>
+      </ac:txMk>
+    </ac:txMkLst>
+    <p188:pos x="1905000" y="2143125"/>
+    <p188:replyLst>
+      <p188:reply id="{2FE12924-1353-4B62-A47E-831DDDB87C17}" authorId="{FFB56F3A-366E-2DE6-2CED-611F6F4E9C66}" created="2023-02-16T08:20:31.853">
+        <p188:txBody>
+          <a:bodyPr/>
+          <a:lstStyle/>
+          <a:p>
+            <a:r>
+              <a:rPr lang="nl-NL"/>
+              <a:t>I agree, #lines does not map 1-to-1 to complexity</a:t>
+            </a:r>
+          </a:p>
+        </p188:txBody>
+      </p188:reply>
+      <p188:reply id="{7A955960-8845-4E97-B9AB-DB4A86861C9D}" authorId="{FFB56F3A-366E-2DE6-2CED-611F6F4E9C66}" created="2023-02-16T08:27:21.209">
+        <p188:txBody>
+          <a:bodyPr/>
+          <a:lstStyle/>
+          <a:p>
+            <a:r>
+              <a:rPr lang="nl-NL"/>
+              <a:t>Question is what's "experimental" and what is not, or no longer. I think a better description for level 1 scripts is that they are purely for personal use, to gain deeper insight into something without being bogged down by software dev considerations. That can sometimes limit creative thinking in my opinion. Once you've figured out the ins and outs, you rethink the problem, redesign, refactor, etc, and move on to levels 2 and up</a:t>
+            </a:r>
+          </a:p>
+        </p188:txBody>
+      </p188:reply>
+      <p188:reply id="{CEDD0CAC-0A5E-4E85-A2E4-2B51D8817A75}" authorId="{11D22365-B884-C6A6-E2B4-0A866AFBF2A1}" created="2023-02-16T12:40:22.651">
+        <p188:txBody>
+          <a:bodyPr/>
+          <a:lstStyle/>
+          <a:p>
+            <a:r>
+              <a:rPr lang="en-US"/>
+              <a:t>Main intent behind the # of lines is the idea that at a certain point it stops being a bit of personal experimental toy code.
+I definitly agree this needs a clear definition for everyone. </a:t>
+            </a:r>
+          </a:p>
+        </p188:txBody>
+      </p188:reply>
+    </p188:replyLst>
+    <p188:txBody>
+      <a:bodyPr/>
+      <a:lstStyle/>
+      <a:p>
+        <a:r>
+          <a:rPr lang="en-GB"/>
+          <a:t>We might want to rephrase as it is difficult to give a max number of lines.</a:t>
+        </a:r>
+      </a:p>
+    </p188:txBody>
+  </p188:cm>
+</p188:cmLst>
+</file>
+
+<file path=ppt/comments/modernComment_104_CBF092C5.xml><?xml version="1.0" encoding="utf-8"?>
+<p188:cmLst xmlns:a="http://schemas.openxmlformats.org/drawingml/2006/main" xmlns:r="http://schemas.openxmlformats.org/officeDocument/2006/relationships" xmlns:p188="http://schemas.microsoft.com/office/powerpoint/2018/8/main">
+  <p188:cm id="{ABCC8D7C-2BFC-4A01-B73D-5B468B13EA2D}" authorId="{B256294C-DD53-F337-F51F-ACE5E06D4639}" status="resolved" created="2023-02-15T10:53:35.351" complete="100000">
+    <ac:txMkLst xmlns:ac="http://schemas.microsoft.com/office/drawing/2013/main/command">
+      <pc:docMk xmlns:pc="http://schemas.microsoft.com/office/powerpoint/2013/main/command"/>
+      <pc:sldMk xmlns:pc="http://schemas.microsoft.com/office/powerpoint/2013/main/command" cId="3421541061" sldId="260"/>
+      <ac:spMk id="3" creationId="{00000000-0000-0000-0000-000000000000}"/>
+      <ac:txMk cp="717" len="7">
+        <ac:context len="1077" hash="1974828479"/>
+      </ac:txMk>
+    </ac:txMkLst>
+    <p188:pos x="2019300" y="2952750"/>
+    <p188:replyLst>
+      <p188:reply id="{EEEB32D1-EF61-4177-B7D8-FA7C651570EA}" authorId="{11D22365-B884-C6A6-E2B4-0A866AFBF2A1}" created="2023-02-15T13:02:27.843">
+        <p188:txBody>
+          <a:bodyPr/>
+          <a:lstStyle/>
+          <a:p>
+            <a:r>
+              <a:rPr lang="en-US"/>
+              <a:t>I would've expected level 2 to still be self-documenting enough that a seperate readme file might not be necesary.
+For clarity/simplicity it might be easier to just always demand it though.</a:t>
+            </a:r>
+          </a:p>
+        </p188:txBody>
+      </p188:reply>
+    </p188:replyLst>
+    <p188:txBody>
+      <a:bodyPr/>
+      <a:lstStyle/>
+      <a:p>
+        <a:r>
+          <a:rPr lang="en-GB"/>
+          <a:t>I expect a readme to be present in every repo. The level of info in the readme might vary.</a:t>
+        </a:r>
+      </a:p>
+    </p188:txBody>
+  </p188:cm>
+  <p188:cm id="{67D22CE5-C95A-4416-AE42-0F85FF62E748}" authorId="{E5A977C6-2DD4-581A-08EE-FA3FC9773623}" status="resolved" created="2023-02-16T09:19:07.600" complete="100000">
+    <pc:sldMkLst xmlns:pc="http://schemas.microsoft.com/office/powerpoint/2013/main/command">
+      <pc:docMk/>
+      <pc:sldMk cId="3421541061" sldId="260"/>
+    </pc:sldMkLst>
+    <p188:txBody>
+      <a:bodyPr/>
+      <a:lstStyle/>
+      <a:p>
+        <a:r>
+          <a:rPr lang="en-US"/>
+          <a:t>Difference between level 3 and 4 is large. Small internal project or externally used library are two different things.</a:t>
+        </a:r>
+      </a:p>
+    </p188:txBody>
+  </p188:cm>
+</p188:cmLst>
+</file>
+
+<file path=ppt/comments/modernComment_105_18E21B5.xml><?xml version="1.0" encoding="utf-8"?>
+<p188:cmLst xmlns:a="http://schemas.openxmlformats.org/drawingml/2006/main" xmlns:r="http://schemas.openxmlformats.org/officeDocument/2006/relationships" xmlns:p188="http://schemas.microsoft.com/office/powerpoint/2018/8/main">
+  <p188:cm id="{F6F54081-1CF3-4166-B33C-D0C7286F711A}" authorId="{FFB56F3A-366E-2DE6-2CED-611F6F4E9C66}" status="resolved" created="2023-02-16T09:05:07.885" complete="100000">
+    <pc:sldMkLst xmlns:pc="http://schemas.microsoft.com/office/powerpoint/2013/main/command">
+      <pc:docMk/>
+      <pc:sldMk cId="26091957" sldId="261"/>
+    </pc:sldMkLst>
+    <p188:replyLst>
+      <p188:reply id="{F6198F11-777F-4F3A-A30B-280B719183AE}" authorId="{11D22365-B884-C6A6-E2B4-0A866AFBF2A1}" created="2023-02-16T12:53:14.269">
+        <p188:txBody>
+          <a:bodyPr/>
+          <a:lstStyle/>
+          <a:p>
+            <a:r>
+              <a:rPr lang="en-US"/>
+              <a:t>Agreed, I don't expect every PhD to produce code at every level. But I do think it's important that everyone knows the various levels so that everyone knows when they should start asking for (external) help.</a:t>
+            </a:r>
+          </a:p>
+        </p188:txBody>
+      </p188:reply>
+    </p188:replyLst>
+    <p188:txBody>
+      <a:bodyPr/>
+      <a:lstStyle/>
+      <a:p>
+        <a:r>
+          <a:rPr lang="nl-NL"/>
+          <a:t>I'm not convinced that the person going from level 0/1 to level 4 should all be the same person. There are definitely all these different levels in the software maturity process but I'm not sure it should be the same person </a:t>
+        </a:r>
+      </a:p>
+    </p188:txBody>
+  </p188:cm>
+  <p188:cm id="{0E4B270B-6710-4613-A942-E3E86E83C36E}" authorId="{E5A977C6-2DD4-581A-08EE-FA3FC9773623}" status="resolved" created="2023-02-16T09:20:18.696" complete="100000">
+    <ac:txMkLst xmlns:ac="http://schemas.microsoft.com/office/drawing/2013/main/command">
+      <pc:docMk xmlns:pc="http://schemas.microsoft.com/office/powerpoint/2013/main/command"/>
+      <pc:sldMk xmlns:pc="http://schemas.microsoft.com/office/powerpoint/2013/main/command" cId="26091957" sldId="261"/>
+      <ac:spMk id="3" creationId="{00000000-0000-0000-0000-000000000000}"/>
+      <ac:txMk cp="806" len="35">
+        <ac:context len="1149" hash="3434587267"/>
+      </ac:txMk>
+    </ac:txMkLst>
+    <p188:pos x="2382591" y="3402169"/>
+    <p188:replyLst>
+      <p188:reply id="{2428F1D2-D677-46C5-BA98-4F9EFAD660E0}" authorId="{E5A977C6-2DD4-581A-08EE-FA3FC9773623}" created="2023-02-16T09:21:00.432">
+        <p188:txBody>
+          <a:bodyPr/>
+          <a:lstStyle/>
+          <a:p>
+            <a:r>
+              <a:rPr lang="en-US"/>
+              <a:t>Meaning: maybe we have a level 5 (software product) which is different form library/single repo project</a:t>
+            </a:r>
+          </a:p>
+        </p188:txBody>
+      </p188:reply>
+      <p188:reply id="{4F7F2BD1-C6DF-408D-B7E3-3B5C0AC96245}" authorId="{11D22365-B884-C6A6-E2B4-0A866AFBF2A1}" created="2023-02-16T12:57:34.980">
+        <p188:txBody>
+          <a:bodyPr/>
+          <a:lstStyle/>
+          <a:p>
+            <a:r>
+              <a:rPr lang="en-US"/>
+              <a:t>I would say that should be covered under seperation of functionalities/general architecture, and is something that becomes relevant once a project goes beyond a single self-contained script.
+This means it's also possibly relevant at level 3. So I wouldn't add a seperate level for it.</a:t>
+            </a:r>
+          </a:p>
+        </p188:txBody>
+      </p188:reply>
+    </p188:replyLst>
+    <p188:txBody>
+      <a:bodyPr/>
+      <a:lstStyle/>
+      <a:p>
+        <a:r>
+          <a:rPr lang="en-US"/>
+          <a:t>This might be in a different repo. do we have recommendations there? (API backend service, front-end separation)</a:t>
+        </a:r>
+      </a:p>
+    </p188:txBody>
+  </p188:cm>
+</p188:cmLst>
 </file>
 
 <file path=ppt/slideLayouts/slideLayout1.xml><?xml version="1.0" encoding="utf-8"?>
@@ -154,7 +1097,7 @@
           </a:lstStyle>
           <a:p>
             <a:r>
-              <a:rPr lang="en-US" smtClean="0"/>
+              <a:rPr lang="en-US"/>
               <a:t>Click to edit Master title style</a:t>
             </a:r>
             <a:endParaRPr lang="nl-NL"/>
@@ -219,7 +1162,7 @@
           </a:lstStyle>
           <a:p>
             <a:r>
-              <a:rPr lang="en-US" smtClean="0"/>
+              <a:rPr lang="en-US"/>
               <a:t>Click to edit Master subtitle style</a:t>
             </a:r>
             <a:endParaRPr lang="nl-NL"/>
@@ -243,9 +1186,9 @@
           <a:p>
             <a:fld id="{E46D095C-D59B-49DA-8F7C-96519F635374}" type="datetimeFigureOut">
               <a:rPr lang="nl-NL" smtClean="0"/>
-              <a:t>14-2-2023</a:t>
+              <a:t>20-3-2023</a:t>
             </a:fld>
-            <a:endParaRPr lang="nl-NL" dirty="0"/>
+            <a:endParaRPr lang="nl-NL"/>
           </a:p>
         </p:txBody>
       </p:sp>
@@ -264,7 +1207,7 @@
           <a:bodyPr/>
           <a:lstStyle/>
           <a:p>
-            <a:endParaRPr lang="nl-NL" dirty="0"/>
+            <a:endParaRPr lang="nl-NL"/>
           </a:p>
         </p:txBody>
       </p:sp>
@@ -287,7 +1230,7 @@
               <a:rPr lang="nl-NL" smtClean="0"/>
               <a:t>‹#›</a:t>
             </a:fld>
-            <a:endParaRPr lang="nl-NL" dirty="0"/>
+            <a:endParaRPr lang="nl-NL"/>
           </a:p>
         </p:txBody>
       </p:sp>
@@ -337,7 +1280,7 @@
           <a:lstStyle/>
           <a:p>
             <a:r>
-              <a:rPr lang="en-US" smtClean="0"/>
+              <a:rPr lang="en-US"/>
               <a:t>Click to edit Master title style</a:t>
             </a:r>
             <a:endParaRPr lang="nl-NL"/>
@@ -361,35 +1304,35 @@
           <a:p>
             <a:pPr lvl="0"/>
             <a:r>
-              <a:rPr lang="en-US" smtClean="0"/>
+              <a:rPr lang="en-US"/>
               <a:t>Edit Master text styles</a:t>
             </a:r>
           </a:p>
           <a:p>
             <a:pPr lvl="1"/>
             <a:r>
-              <a:rPr lang="en-US" smtClean="0"/>
+              <a:rPr lang="en-US"/>
               <a:t>Second level</a:t>
             </a:r>
           </a:p>
           <a:p>
             <a:pPr lvl="2"/>
             <a:r>
-              <a:rPr lang="en-US" smtClean="0"/>
+              <a:rPr lang="en-US"/>
               <a:t>Third level</a:t>
             </a:r>
           </a:p>
           <a:p>
             <a:pPr lvl="3"/>
             <a:r>
-              <a:rPr lang="en-US" smtClean="0"/>
+              <a:rPr lang="en-US"/>
               <a:t>Fourth level</a:t>
             </a:r>
           </a:p>
           <a:p>
             <a:pPr lvl="4"/>
             <a:r>
-              <a:rPr lang="en-US" smtClean="0"/>
+              <a:rPr lang="en-US"/>
               <a:t>Fifth level</a:t>
             </a:r>
             <a:endParaRPr lang="nl-NL"/>
@@ -413,9 +1356,9 @@
           <a:p>
             <a:fld id="{E46D095C-D59B-49DA-8F7C-96519F635374}" type="datetimeFigureOut">
               <a:rPr lang="nl-NL" smtClean="0"/>
-              <a:t>14-2-2023</a:t>
+              <a:t>20-3-2023</a:t>
             </a:fld>
-            <a:endParaRPr lang="nl-NL" dirty="0"/>
+            <a:endParaRPr lang="nl-NL"/>
           </a:p>
         </p:txBody>
       </p:sp>
@@ -434,7 +1377,7 @@
           <a:bodyPr/>
           <a:lstStyle/>
           <a:p>
-            <a:endParaRPr lang="nl-NL" dirty="0"/>
+            <a:endParaRPr lang="nl-NL"/>
           </a:p>
         </p:txBody>
       </p:sp>
@@ -457,7 +1400,7 @@
               <a:rPr lang="nl-NL" smtClean="0"/>
               <a:t>‹#›</a:t>
             </a:fld>
-            <a:endParaRPr lang="nl-NL" dirty="0"/>
+            <a:endParaRPr lang="nl-NL"/>
           </a:p>
         </p:txBody>
       </p:sp>
@@ -512,7 +1455,7 @@
           <a:lstStyle/>
           <a:p>
             <a:r>
-              <a:rPr lang="en-US" smtClean="0"/>
+              <a:rPr lang="en-US"/>
               <a:t>Click to edit Master title style</a:t>
             </a:r>
             <a:endParaRPr lang="nl-NL"/>
@@ -541,35 +1484,35 @@
           <a:p>
             <a:pPr lvl="0"/>
             <a:r>
-              <a:rPr lang="en-US" smtClean="0"/>
+              <a:rPr lang="en-US"/>
               <a:t>Edit Master text styles</a:t>
             </a:r>
           </a:p>
           <a:p>
             <a:pPr lvl="1"/>
             <a:r>
-              <a:rPr lang="en-US" smtClean="0"/>
+              <a:rPr lang="en-US"/>
               <a:t>Second level</a:t>
             </a:r>
           </a:p>
           <a:p>
             <a:pPr lvl="2"/>
             <a:r>
-              <a:rPr lang="en-US" smtClean="0"/>
+              <a:rPr lang="en-US"/>
               <a:t>Third level</a:t>
             </a:r>
           </a:p>
           <a:p>
             <a:pPr lvl="3"/>
             <a:r>
-              <a:rPr lang="en-US" smtClean="0"/>
+              <a:rPr lang="en-US"/>
               <a:t>Fourth level</a:t>
             </a:r>
           </a:p>
           <a:p>
             <a:pPr lvl="4"/>
             <a:r>
-              <a:rPr lang="en-US" smtClean="0"/>
+              <a:rPr lang="en-US"/>
               <a:t>Fifth level</a:t>
             </a:r>
             <a:endParaRPr lang="nl-NL"/>
@@ -593,9 +1536,9 @@
           <a:p>
             <a:fld id="{E46D095C-D59B-49DA-8F7C-96519F635374}" type="datetimeFigureOut">
               <a:rPr lang="nl-NL" smtClean="0"/>
-              <a:t>14-2-2023</a:t>
+              <a:t>20-3-2023</a:t>
             </a:fld>
-            <a:endParaRPr lang="nl-NL" dirty="0"/>
+            <a:endParaRPr lang="nl-NL"/>
           </a:p>
         </p:txBody>
       </p:sp>
@@ -614,7 +1557,7 @@
           <a:bodyPr/>
           <a:lstStyle/>
           <a:p>
-            <a:endParaRPr lang="nl-NL" dirty="0"/>
+            <a:endParaRPr lang="nl-NL"/>
           </a:p>
         </p:txBody>
       </p:sp>
@@ -637,7 +1580,7 @@
               <a:rPr lang="nl-NL" smtClean="0"/>
               <a:t>‹#›</a:t>
             </a:fld>
-            <a:endParaRPr lang="nl-NL" dirty="0"/>
+            <a:endParaRPr lang="nl-NL"/>
           </a:p>
         </p:txBody>
       </p:sp>
@@ -687,7 +1630,7 @@
           <a:lstStyle/>
           <a:p>
             <a:r>
-              <a:rPr lang="en-US" smtClean="0"/>
+              <a:rPr lang="en-US"/>
               <a:t>Click to edit Master title style</a:t>
             </a:r>
             <a:endParaRPr lang="nl-NL"/>
@@ -711,35 +1654,35 @@
           <a:p>
             <a:pPr lvl="0"/>
             <a:r>
-              <a:rPr lang="en-US" smtClean="0"/>
+              <a:rPr lang="en-US"/>
               <a:t>Edit Master text styles</a:t>
             </a:r>
           </a:p>
           <a:p>
             <a:pPr lvl="1"/>
             <a:r>
-              <a:rPr lang="en-US" smtClean="0"/>
+              <a:rPr lang="en-US"/>
               <a:t>Second level</a:t>
             </a:r>
           </a:p>
           <a:p>
             <a:pPr lvl="2"/>
             <a:r>
-              <a:rPr lang="en-US" smtClean="0"/>
+              <a:rPr lang="en-US"/>
               <a:t>Third level</a:t>
             </a:r>
           </a:p>
           <a:p>
             <a:pPr lvl="3"/>
             <a:r>
-              <a:rPr lang="en-US" smtClean="0"/>
+              <a:rPr lang="en-US"/>
               <a:t>Fourth level</a:t>
             </a:r>
           </a:p>
           <a:p>
             <a:pPr lvl="4"/>
             <a:r>
-              <a:rPr lang="en-US" smtClean="0"/>
+              <a:rPr lang="en-US"/>
               <a:t>Fifth level</a:t>
             </a:r>
             <a:endParaRPr lang="nl-NL"/>
@@ -763,9 +1706,9 @@
           <a:p>
             <a:fld id="{E46D095C-D59B-49DA-8F7C-96519F635374}" type="datetimeFigureOut">
               <a:rPr lang="nl-NL" smtClean="0"/>
-              <a:t>14-2-2023</a:t>
+              <a:t>20-3-2023</a:t>
             </a:fld>
-            <a:endParaRPr lang="nl-NL" dirty="0"/>
+            <a:endParaRPr lang="nl-NL"/>
           </a:p>
         </p:txBody>
       </p:sp>
@@ -784,7 +1727,7 @@
           <a:bodyPr/>
           <a:lstStyle/>
           <a:p>
-            <a:endParaRPr lang="nl-NL" dirty="0"/>
+            <a:endParaRPr lang="nl-NL"/>
           </a:p>
         </p:txBody>
       </p:sp>
@@ -807,7 +1750,7 @@
               <a:rPr lang="nl-NL" smtClean="0"/>
               <a:t>‹#›</a:t>
             </a:fld>
-            <a:endParaRPr lang="nl-NL" dirty="0"/>
+            <a:endParaRPr lang="nl-NL"/>
           </a:p>
         </p:txBody>
       </p:sp>
@@ -866,7 +1809,7 @@
           </a:lstStyle>
           <a:p>
             <a:r>
-              <a:rPr lang="en-US" smtClean="0"/>
+              <a:rPr lang="en-US"/>
               <a:t>Click to edit Master title style</a:t>
             </a:r>
             <a:endParaRPr lang="nl-NL"/>
@@ -986,7 +1929,7 @@
           <a:p>
             <a:pPr lvl="0"/>
             <a:r>
-              <a:rPr lang="en-US" smtClean="0"/>
+              <a:rPr lang="en-US"/>
               <a:t>Edit Master text styles</a:t>
             </a:r>
           </a:p>
@@ -1009,9 +1952,9 @@
           <a:p>
             <a:fld id="{E46D095C-D59B-49DA-8F7C-96519F635374}" type="datetimeFigureOut">
               <a:rPr lang="nl-NL" smtClean="0"/>
-              <a:t>14-2-2023</a:t>
+              <a:t>20-3-2023</a:t>
             </a:fld>
-            <a:endParaRPr lang="nl-NL" dirty="0"/>
+            <a:endParaRPr lang="nl-NL"/>
           </a:p>
         </p:txBody>
       </p:sp>
@@ -1030,7 +1973,7 @@
           <a:bodyPr/>
           <a:lstStyle/>
           <a:p>
-            <a:endParaRPr lang="nl-NL" dirty="0"/>
+            <a:endParaRPr lang="nl-NL"/>
           </a:p>
         </p:txBody>
       </p:sp>
@@ -1053,7 +1996,7 @@
               <a:rPr lang="nl-NL" smtClean="0"/>
               <a:t>‹#›</a:t>
             </a:fld>
-            <a:endParaRPr lang="nl-NL" dirty="0"/>
+            <a:endParaRPr lang="nl-NL"/>
           </a:p>
         </p:txBody>
       </p:sp>
@@ -1103,7 +2046,7 @@
           <a:lstStyle/>
           <a:p>
             <a:r>
-              <a:rPr lang="en-US" smtClean="0"/>
+              <a:rPr lang="en-US"/>
               <a:t>Click to edit Master title style</a:t>
             </a:r>
             <a:endParaRPr lang="nl-NL"/>
@@ -1132,35 +2075,35 @@
           <a:p>
             <a:pPr lvl="0"/>
             <a:r>
-              <a:rPr lang="en-US" smtClean="0"/>
+              <a:rPr lang="en-US"/>
               <a:t>Edit Master text styles</a:t>
             </a:r>
           </a:p>
           <a:p>
             <a:pPr lvl="1"/>
             <a:r>
-              <a:rPr lang="en-US" smtClean="0"/>
+              <a:rPr lang="en-US"/>
               <a:t>Second level</a:t>
             </a:r>
           </a:p>
           <a:p>
             <a:pPr lvl="2"/>
             <a:r>
-              <a:rPr lang="en-US" smtClean="0"/>
+              <a:rPr lang="en-US"/>
               <a:t>Third level</a:t>
             </a:r>
           </a:p>
           <a:p>
             <a:pPr lvl="3"/>
             <a:r>
-              <a:rPr lang="en-US" smtClean="0"/>
+              <a:rPr lang="en-US"/>
               <a:t>Fourth level</a:t>
             </a:r>
           </a:p>
           <a:p>
             <a:pPr lvl="4"/>
             <a:r>
-              <a:rPr lang="en-US" smtClean="0"/>
+              <a:rPr lang="en-US"/>
               <a:t>Fifth level</a:t>
             </a:r>
             <a:endParaRPr lang="nl-NL"/>
@@ -1189,35 +2132,35 @@
           <a:p>
             <a:pPr lvl="0"/>
             <a:r>
-              <a:rPr lang="en-US" smtClean="0"/>
+              <a:rPr lang="en-US"/>
               <a:t>Edit Master text styles</a:t>
             </a:r>
           </a:p>
           <a:p>
             <a:pPr lvl="1"/>
             <a:r>
-              <a:rPr lang="en-US" smtClean="0"/>
+              <a:rPr lang="en-US"/>
               <a:t>Second level</a:t>
             </a:r>
           </a:p>
           <a:p>
             <a:pPr lvl="2"/>
             <a:r>
-              <a:rPr lang="en-US" smtClean="0"/>
+              <a:rPr lang="en-US"/>
               <a:t>Third level</a:t>
             </a:r>
           </a:p>
           <a:p>
             <a:pPr lvl="3"/>
             <a:r>
-              <a:rPr lang="en-US" smtClean="0"/>
+              <a:rPr lang="en-US"/>
               <a:t>Fourth level</a:t>
             </a:r>
           </a:p>
           <a:p>
             <a:pPr lvl="4"/>
             <a:r>
-              <a:rPr lang="en-US" smtClean="0"/>
+              <a:rPr lang="en-US"/>
               <a:t>Fifth level</a:t>
             </a:r>
             <a:endParaRPr lang="nl-NL"/>
@@ -1241,9 +2184,9 @@
           <a:p>
             <a:fld id="{E46D095C-D59B-49DA-8F7C-96519F635374}" type="datetimeFigureOut">
               <a:rPr lang="nl-NL" smtClean="0"/>
-              <a:t>14-2-2023</a:t>
+              <a:t>20-3-2023</a:t>
             </a:fld>
-            <a:endParaRPr lang="nl-NL" dirty="0"/>
+            <a:endParaRPr lang="nl-NL"/>
           </a:p>
         </p:txBody>
       </p:sp>
@@ -1262,7 +2205,7 @@
           <a:bodyPr/>
           <a:lstStyle/>
           <a:p>
-            <a:endParaRPr lang="nl-NL" dirty="0"/>
+            <a:endParaRPr lang="nl-NL"/>
           </a:p>
         </p:txBody>
       </p:sp>
@@ -1285,7 +2228,7 @@
               <a:rPr lang="nl-NL" smtClean="0"/>
               <a:t>‹#›</a:t>
             </a:fld>
-            <a:endParaRPr lang="nl-NL" dirty="0"/>
+            <a:endParaRPr lang="nl-NL"/>
           </a:p>
         </p:txBody>
       </p:sp>
@@ -1340,7 +2283,7 @@
           <a:lstStyle/>
           <a:p>
             <a:r>
-              <a:rPr lang="en-US" smtClean="0"/>
+              <a:rPr lang="en-US"/>
               <a:t>Click to edit Master title style</a:t>
             </a:r>
             <a:endParaRPr lang="nl-NL"/>
@@ -1406,7 +2349,7 @@
           <a:p>
             <a:pPr lvl="0"/>
             <a:r>
-              <a:rPr lang="en-US" smtClean="0"/>
+              <a:rPr lang="en-US"/>
               <a:t>Edit Master text styles</a:t>
             </a:r>
           </a:p>
@@ -1434,35 +2377,35 @@
           <a:p>
             <a:pPr lvl="0"/>
             <a:r>
-              <a:rPr lang="en-US" smtClean="0"/>
+              <a:rPr lang="en-US"/>
               <a:t>Edit Master text styles</a:t>
             </a:r>
           </a:p>
           <a:p>
             <a:pPr lvl="1"/>
             <a:r>
-              <a:rPr lang="en-US" smtClean="0"/>
+              <a:rPr lang="en-US"/>
               <a:t>Second level</a:t>
             </a:r>
           </a:p>
           <a:p>
             <a:pPr lvl="2"/>
             <a:r>
-              <a:rPr lang="en-US" smtClean="0"/>
+              <a:rPr lang="en-US"/>
               <a:t>Third level</a:t>
             </a:r>
           </a:p>
           <a:p>
             <a:pPr lvl="3"/>
             <a:r>
-              <a:rPr lang="en-US" smtClean="0"/>
+              <a:rPr lang="en-US"/>
               <a:t>Fourth level</a:t>
             </a:r>
           </a:p>
           <a:p>
             <a:pPr lvl="4"/>
             <a:r>
-              <a:rPr lang="en-US" smtClean="0"/>
+              <a:rPr lang="en-US"/>
               <a:t>Fifth level</a:t>
             </a:r>
             <a:endParaRPr lang="nl-NL"/>
@@ -1528,7 +2471,7 @@
           <a:p>
             <a:pPr lvl="0"/>
             <a:r>
-              <a:rPr lang="en-US" smtClean="0"/>
+              <a:rPr lang="en-US"/>
               <a:t>Edit Master text styles</a:t>
             </a:r>
           </a:p>
@@ -1556,35 +2499,35 @@
           <a:p>
             <a:pPr lvl="0"/>
             <a:r>
-              <a:rPr lang="en-US" smtClean="0"/>
+              <a:rPr lang="en-US"/>
               <a:t>Edit Master text styles</a:t>
             </a:r>
           </a:p>
           <a:p>
             <a:pPr lvl="1"/>
             <a:r>
-              <a:rPr lang="en-US" smtClean="0"/>
+              <a:rPr lang="en-US"/>
               <a:t>Second level</a:t>
             </a:r>
           </a:p>
           <a:p>
             <a:pPr lvl="2"/>
             <a:r>
-              <a:rPr lang="en-US" smtClean="0"/>
+              <a:rPr lang="en-US"/>
               <a:t>Third level</a:t>
             </a:r>
           </a:p>
           <a:p>
             <a:pPr lvl="3"/>
             <a:r>
-              <a:rPr lang="en-US" smtClean="0"/>
+              <a:rPr lang="en-US"/>
               <a:t>Fourth level</a:t>
             </a:r>
           </a:p>
           <a:p>
             <a:pPr lvl="4"/>
             <a:r>
-              <a:rPr lang="en-US" smtClean="0"/>
+              <a:rPr lang="en-US"/>
               <a:t>Fifth level</a:t>
             </a:r>
             <a:endParaRPr lang="nl-NL"/>
@@ -1608,9 +2551,9 @@
           <a:p>
             <a:fld id="{E46D095C-D59B-49DA-8F7C-96519F635374}" type="datetimeFigureOut">
               <a:rPr lang="nl-NL" smtClean="0"/>
-              <a:t>14-2-2023</a:t>
+              <a:t>20-3-2023</a:t>
             </a:fld>
-            <a:endParaRPr lang="nl-NL" dirty="0"/>
+            <a:endParaRPr lang="nl-NL"/>
           </a:p>
         </p:txBody>
       </p:sp>
@@ -1629,7 +2572,7 @@
           <a:bodyPr/>
           <a:lstStyle/>
           <a:p>
-            <a:endParaRPr lang="nl-NL" dirty="0"/>
+            <a:endParaRPr lang="nl-NL"/>
           </a:p>
         </p:txBody>
       </p:sp>
@@ -1652,7 +2595,7 @@
               <a:rPr lang="nl-NL" smtClean="0"/>
               <a:t>‹#›</a:t>
             </a:fld>
-            <a:endParaRPr lang="nl-NL" dirty="0"/>
+            <a:endParaRPr lang="nl-NL"/>
           </a:p>
         </p:txBody>
       </p:sp>
@@ -1702,7 +2645,7 @@
           <a:lstStyle/>
           <a:p>
             <a:r>
-              <a:rPr lang="en-US" smtClean="0"/>
+              <a:rPr lang="en-US"/>
               <a:t>Click to edit Master title style</a:t>
             </a:r>
             <a:endParaRPr lang="nl-NL"/>
@@ -1726,9 +2669,9 @@
           <a:p>
             <a:fld id="{E46D095C-D59B-49DA-8F7C-96519F635374}" type="datetimeFigureOut">
               <a:rPr lang="nl-NL" smtClean="0"/>
-              <a:t>14-2-2023</a:t>
+              <a:t>20-3-2023</a:t>
             </a:fld>
-            <a:endParaRPr lang="nl-NL" dirty="0"/>
+            <a:endParaRPr lang="nl-NL"/>
           </a:p>
         </p:txBody>
       </p:sp>
@@ -1747,7 +2690,7 @@
           <a:bodyPr/>
           <a:lstStyle/>
           <a:p>
-            <a:endParaRPr lang="nl-NL" dirty="0"/>
+            <a:endParaRPr lang="nl-NL"/>
           </a:p>
         </p:txBody>
       </p:sp>
@@ -1770,7 +2713,7 @@
               <a:rPr lang="nl-NL" smtClean="0"/>
               <a:t>‹#›</a:t>
             </a:fld>
-            <a:endParaRPr lang="nl-NL" dirty="0"/>
+            <a:endParaRPr lang="nl-NL"/>
           </a:p>
         </p:txBody>
       </p:sp>
@@ -1821,9 +2764,9 @@
           <a:p>
             <a:fld id="{E46D095C-D59B-49DA-8F7C-96519F635374}" type="datetimeFigureOut">
               <a:rPr lang="nl-NL" smtClean="0"/>
-              <a:t>14-2-2023</a:t>
+              <a:t>20-3-2023</a:t>
             </a:fld>
-            <a:endParaRPr lang="nl-NL" dirty="0"/>
+            <a:endParaRPr lang="nl-NL"/>
           </a:p>
         </p:txBody>
       </p:sp>
@@ -1842,7 +2785,7 @@
           <a:bodyPr/>
           <a:lstStyle/>
           <a:p>
-            <a:endParaRPr lang="nl-NL" dirty="0"/>
+            <a:endParaRPr lang="nl-NL"/>
           </a:p>
         </p:txBody>
       </p:sp>
@@ -1865,7 +2808,7 @@
               <a:rPr lang="nl-NL" smtClean="0"/>
               <a:t>‹#›</a:t>
             </a:fld>
-            <a:endParaRPr lang="nl-NL" dirty="0"/>
+            <a:endParaRPr lang="nl-NL"/>
           </a:p>
         </p:txBody>
       </p:sp>
@@ -1924,7 +2867,7 @@
           </a:lstStyle>
           <a:p>
             <a:r>
-              <a:rPr lang="en-US" smtClean="0"/>
+              <a:rPr lang="en-US"/>
               <a:t>Click to edit Master title style</a:t>
             </a:r>
             <a:endParaRPr lang="nl-NL"/>
@@ -1981,35 +2924,35 @@
           <a:p>
             <a:pPr lvl="0"/>
             <a:r>
-              <a:rPr lang="en-US" smtClean="0"/>
+              <a:rPr lang="en-US"/>
               <a:t>Edit Master text styles</a:t>
             </a:r>
           </a:p>
           <a:p>
             <a:pPr lvl="1"/>
             <a:r>
-              <a:rPr lang="en-US" smtClean="0"/>
+              <a:rPr lang="en-US"/>
               <a:t>Second level</a:t>
             </a:r>
           </a:p>
           <a:p>
             <a:pPr lvl="2"/>
             <a:r>
-              <a:rPr lang="en-US" smtClean="0"/>
+              <a:rPr lang="en-US"/>
               <a:t>Third level</a:t>
             </a:r>
           </a:p>
           <a:p>
             <a:pPr lvl="3"/>
             <a:r>
-              <a:rPr lang="en-US" smtClean="0"/>
+              <a:rPr lang="en-US"/>
               <a:t>Fourth level</a:t>
             </a:r>
           </a:p>
           <a:p>
             <a:pPr lvl="4"/>
             <a:r>
-              <a:rPr lang="en-US" smtClean="0"/>
+              <a:rPr lang="en-US"/>
               <a:t>Fifth level</a:t>
             </a:r>
             <a:endParaRPr lang="nl-NL"/>
@@ -2075,7 +3018,7 @@
           <a:p>
             <a:pPr lvl="0"/>
             <a:r>
-              <a:rPr lang="en-US" smtClean="0"/>
+              <a:rPr lang="en-US"/>
               <a:t>Edit Master text styles</a:t>
             </a:r>
           </a:p>
@@ -2098,9 +3041,9 @@
           <a:p>
             <a:fld id="{E46D095C-D59B-49DA-8F7C-96519F635374}" type="datetimeFigureOut">
               <a:rPr lang="nl-NL" smtClean="0"/>
-              <a:t>14-2-2023</a:t>
+              <a:t>20-3-2023</a:t>
             </a:fld>
-            <a:endParaRPr lang="nl-NL" dirty="0"/>
+            <a:endParaRPr lang="nl-NL"/>
           </a:p>
         </p:txBody>
       </p:sp>
@@ -2119,7 +3062,7 @@
           <a:bodyPr/>
           <a:lstStyle/>
           <a:p>
-            <a:endParaRPr lang="nl-NL" dirty="0"/>
+            <a:endParaRPr lang="nl-NL"/>
           </a:p>
         </p:txBody>
       </p:sp>
@@ -2142,7 +3085,7 @@
               <a:rPr lang="nl-NL" smtClean="0"/>
               <a:t>‹#›</a:t>
             </a:fld>
-            <a:endParaRPr lang="nl-NL" dirty="0"/>
+            <a:endParaRPr lang="nl-NL"/>
           </a:p>
         </p:txBody>
       </p:sp>
@@ -2201,7 +3144,7 @@
           </a:lstStyle>
           <a:p>
             <a:r>
-              <a:rPr lang="en-US" smtClean="0"/>
+              <a:rPr lang="en-US"/>
               <a:t>Click to edit Master title style</a:t>
             </a:r>
             <a:endParaRPr lang="nl-NL"/>
@@ -2265,7 +3208,7 @@
             </a:lvl9pPr>
           </a:lstStyle>
           <a:p>
-            <a:endParaRPr lang="nl-NL" dirty="0"/>
+            <a:endParaRPr lang="nl-NL"/>
           </a:p>
         </p:txBody>
       </p:sp>
@@ -2328,7 +3271,7 @@
           <a:p>
             <a:pPr lvl="0"/>
             <a:r>
-              <a:rPr lang="en-US" smtClean="0"/>
+              <a:rPr lang="en-US"/>
               <a:t>Edit Master text styles</a:t>
             </a:r>
           </a:p>
@@ -2351,9 +3294,9 @@
           <a:p>
             <a:fld id="{E46D095C-D59B-49DA-8F7C-96519F635374}" type="datetimeFigureOut">
               <a:rPr lang="nl-NL" smtClean="0"/>
-              <a:t>14-2-2023</a:t>
+              <a:t>20-3-2023</a:t>
             </a:fld>
-            <a:endParaRPr lang="nl-NL" dirty="0"/>
+            <a:endParaRPr lang="nl-NL"/>
           </a:p>
         </p:txBody>
       </p:sp>
@@ -2372,7 +3315,7 @@
           <a:bodyPr/>
           <a:lstStyle/>
           <a:p>
-            <a:endParaRPr lang="nl-NL" dirty="0"/>
+            <a:endParaRPr lang="nl-NL"/>
           </a:p>
         </p:txBody>
       </p:sp>
@@ -2395,7 +3338,7 @@
               <a:rPr lang="nl-NL" smtClean="0"/>
               <a:t>‹#›</a:t>
             </a:fld>
-            <a:endParaRPr lang="nl-NL" dirty="0"/>
+            <a:endParaRPr lang="nl-NL"/>
           </a:p>
         </p:txBody>
       </p:sp>
@@ -2460,7 +3403,7 @@
           <a:lstStyle/>
           <a:p>
             <a:r>
-              <a:rPr lang="en-US" smtClean="0"/>
+              <a:rPr lang="en-US"/>
               <a:t>Click to edit Master title style</a:t>
             </a:r>
             <a:endParaRPr lang="nl-NL"/>
@@ -2494,35 +3437,35 @@
           <a:p>
             <a:pPr lvl="0"/>
             <a:r>
-              <a:rPr lang="en-US" smtClean="0"/>
+              <a:rPr lang="en-US"/>
               <a:t>Edit Master text styles</a:t>
             </a:r>
           </a:p>
           <a:p>
             <a:pPr lvl="1"/>
             <a:r>
-              <a:rPr lang="en-US" smtClean="0"/>
+              <a:rPr lang="en-US"/>
               <a:t>Second level</a:t>
             </a:r>
           </a:p>
           <a:p>
             <a:pPr lvl="2"/>
             <a:r>
-              <a:rPr lang="en-US" smtClean="0"/>
+              <a:rPr lang="en-US"/>
               <a:t>Third level</a:t>
             </a:r>
           </a:p>
           <a:p>
             <a:pPr lvl="3"/>
             <a:r>
-              <a:rPr lang="en-US" smtClean="0"/>
+              <a:rPr lang="en-US"/>
               <a:t>Fourth level</a:t>
             </a:r>
           </a:p>
           <a:p>
             <a:pPr lvl="4"/>
             <a:r>
-              <a:rPr lang="en-US" smtClean="0"/>
+              <a:rPr lang="en-US"/>
               <a:t>Fifth level</a:t>
             </a:r>
             <a:endParaRPr lang="nl-NL"/>
@@ -2564,9 +3507,9 @@
           <a:p>
             <a:fld id="{E46D095C-D59B-49DA-8F7C-96519F635374}" type="datetimeFigureOut">
               <a:rPr lang="nl-NL" smtClean="0"/>
-              <a:t>14-2-2023</a:t>
+              <a:t>20-3-2023</a:t>
             </a:fld>
-            <a:endParaRPr lang="nl-NL" dirty="0"/>
+            <a:endParaRPr lang="nl-NL"/>
           </a:p>
         </p:txBody>
       </p:sp>
@@ -2603,7 +3546,7 @@
             </a:lvl1pPr>
           </a:lstStyle>
           <a:p>
-            <a:endParaRPr lang="nl-NL" dirty="0"/>
+            <a:endParaRPr lang="nl-NL"/>
           </a:p>
         </p:txBody>
       </p:sp>
@@ -2644,7 +3587,7 @@
               <a:rPr lang="nl-NL" smtClean="0"/>
               <a:t>‹#›</a:t>
             </a:fld>
-            <a:endParaRPr lang="nl-NL" dirty="0"/>
+            <a:endParaRPr lang="nl-NL"/>
           </a:p>
         </p:txBody>
       </p:sp>
@@ -2985,10 +3928,10 @@
           <a:lstStyle/>
           <a:p>
             <a:r>
-              <a:rPr lang="en-US" dirty="0" smtClean="0"/>
+              <a:rPr lang="en-US"/>
               <a:t>Levels of Software Projects</a:t>
             </a:r>
-            <a:endParaRPr lang="nl-NL" dirty="0"/>
+            <a:endParaRPr lang="nl-NL"/>
           </a:p>
         </p:txBody>
       </p:sp>
@@ -3008,10 +3951,10 @@
           <a:lstStyle/>
           <a:p>
             <a:r>
-              <a:rPr lang="en-US" dirty="0" smtClean="0"/>
+              <a:rPr lang="en-US"/>
               <a:t>CDS informatics</a:t>
             </a:r>
-            <a:endParaRPr lang="nl-NL" dirty="0"/>
+            <a:endParaRPr lang="nl-NL"/>
           </a:p>
         </p:txBody>
       </p:sp>
@@ -3061,10 +4004,9 @@
           <a:lstStyle/>
           <a:p>
             <a:r>
-              <a:rPr lang="en-US" b="1" dirty="0" smtClean="0"/>
-              <a:t>Level 0: One-off scripts with no business logic</a:t>
-            </a:r>
-            <a:endParaRPr lang="nl-NL" dirty="0"/>
+              <a:rPr lang="en-US" b="1"/>
+              <a:t>Level 1: Short experimental scripts</a:t>
+            </a:r>
           </a:p>
         </p:txBody>
       </p:sp>
@@ -3080,8 +4022,8 @@
         </p:nvSpPr>
         <p:spPr/>
         <p:txBody>
-          <a:bodyPr>
-            <a:normAutofit fontScale="77500" lnSpcReduction="20000"/>
+          <a:bodyPr vert="horz" lIns="91440" tIns="45720" rIns="91440" bIns="45720" rtlCol="0" anchor="t">
+            <a:normAutofit fontScale="47500" lnSpcReduction="20000"/>
           </a:bodyPr>
           <a:lstStyle/>
           <a:p>
@@ -3089,7 +4031,7 @@
               <a:buNone/>
             </a:pPr>
             <a:r>
-              <a:rPr lang="en-US" b="1" dirty="0" smtClean="0"/>
+              <a:rPr lang="en-US" b="1" dirty="0"/>
               <a:t>Description:</a:t>
             </a:r>
           </a:p>
@@ -3098,85 +4040,159 @@
               <a:buNone/>
             </a:pPr>
             <a:r>
-              <a:rPr lang="en-US" dirty="0" smtClean="0"/>
-              <a:t>A single-use script that contains little to no business logic, it merely uses libraries to quickly do a small thing. Examples of this include a short script to quickly draw a graph based on data in a CSV, a script to generate a 100 random numbers, or hello world.</a:t>
-            </a:r>
+              <a:rPr lang="en-US" dirty="0"/>
+              <a:t>A script that is used to experiment with a library or a bit of business logic. These scripts are merely toy examples, but may eventually evolve into real use-cases.</a:t>
+            </a:r>
+            <a:endParaRPr lang="en-US" dirty="0">
+              <a:cs typeface="Calibri"/>
+            </a:endParaRPr>
           </a:p>
           <a:p>
             <a:pPr marL="0" indent="0">
               <a:buNone/>
             </a:pPr>
             <a:r>
-              <a:rPr lang="en-US" dirty="0" smtClean="0"/>
-              <a:t>As the most simple project there are no real requirements or expectations.</a:t>
-            </a:r>
+              <a:rPr lang="en-US" dirty="0"/>
+              <a:t>As this project level concerns only toy projects only the most basic of requirements are expected. Most of this will be automated or should be second nature to a developer.</a:t>
+            </a:r>
+            <a:endParaRPr lang="en-US" dirty="0">
+              <a:cs typeface="Calibri"/>
+            </a:endParaRPr>
           </a:p>
           <a:p>
             <a:pPr marL="0" indent="0">
               <a:buNone/>
             </a:pPr>
-            <a:endParaRPr lang="en-US" b="1" dirty="0" smtClean="0"/>
+            <a:r>
+              <a:rPr lang="en-US" b="1" dirty="0"/>
+              <a:t>Requirements:</a:t>
+            </a:r>
+            <a:endParaRPr lang="en-US" b="1" dirty="0">
+              <a:cs typeface="Calibri"/>
+            </a:endParaRPr>
+          </a:p>
+          <a:p>
+            <a:r>
+              <a:rPr lang="en-US" dirty="0"/>
+              <a:t>Max 100 lines</a:t>
+            </a:r>
+            <a:endParaRPr lang="en-US" dirty="0">
+              <a:cs typeface="Calibri"/>
+            </a:endParaRPr>
+          </a:p>
+          <a:p>
+            <a:r>
+              <a:rPr lang="en-US" dirty="0"/>
+              <a:t>Basic </a:t>
+            </a:r>
+            <a:r>
+              <a:rPr lang="en-US" dirty="0" err="1"/>
+              <a:t>codestyle</a:t>
+            </a:r>
+            <a:r>
+              <a:rPr lang="en-US" dirty="0"/>
+              <a:t>, naming conventions</a:t>
+            </a:r>
+            <a:endParaRPr lang="en-US" dirty="0">
+              <a:cs typeface="Calibri"/>
+            </a:endParaRPr>
+          </a:p>
+          <a:p>
+            <a:r>
+              <a:rPr lang="en-US" dirty="0"/>
+              <a:t>Inline comments explaining complicated business logic (e.g. nested loops)</a:t>
+            </a:r>
+            <a:endParaRPr lang="en-US" dirty="0">
+              <a:cs typeface="Calibri"/>
+            </a:endParaRPr>
+          </a:p>
+          <a:p>
+            <a:r>
+              <a:rPr lang="en-US" dirty="0">
+                <a:cs typeface="Calibri"/>
+              </a:rPr>
+              <a:t>Versions of libraries and languages used</a:t>
+            </a:r>
+          </a:p>
+          <a:p>
+            <a:r>
+              <a:rPr lang="en-US" dirty="0">
+                <a:cs typeface="Calibri"/>
+              </a:rPr>
+              <a:t>Possibly a git repo</a:t>
+            </a:r>
           </a:p>
           <a:p>
             <a:pPr marL="0" indent="0">
               <a:buNone/>
             </a:pPr>
-            <a:r>
-              <a:rPr lang="en-US" b="1" dirty="0" smtClean="0"/>
-              <a:t>Requirements:</a:t>
-            </a:r>
-          </a:p>
-          <a:p>
-            <a:r>
-              <a:rPr lang="en-US" dirty="0" smtClean="0"/>
-              <a:t>None</a:t>
-            </a:r>
+            <a:endParaRPr lang="en-US" b="1"/>
           </a:p>
           <a:p>
             <a:pPr marL="0" indent="0">
               <a:buNone/>
             </a:pPr>
             <a:r>
-              <a:rPr lang="en-US" b="1" dirty="0" smtClean="0"/>
+              <a:rPr lang="en-US" b="1" dirty="0"/>
               <a:t>Maintenance effort:</a:t>
             </a:r>
-          </a:p>
-          <a:p>
-            <a:r>
-              <a:rPr lang="en-US" dirty="0" smtClean="0"/>
-              <a:t>None</a:t>
-            </a:r>
+            <a:endParaRPr lang="en-US" b="1" dirty="0">
+              <a:cs typeface="Calibri"/>
+            </a:endParaRPr>
+          </a:p>
+          <a:p>
+            <a:r>
+              <a:rPr lang="en-US" dirty="0"/>
+              <a:t>Minimal, mostly automated</a:t>
+            </a:r>
+            <a:endParaRPr lang="en-US" dirty="0">
+              <a:cs typeface="Calibri"/>
+            </a:endParaRPr>
           </a:p>
           <a:p>
             <a:pPr marL="0" indent="0">
               <a:buNone/>
             </a:pPr>
-            <a:r>
-              <a:rPr lang="en-US" b="1" dirty="0" smtClean="0"/>
+            <a:endParaRPr lang="en-US" b="1"/>
+          </a:p>
+          <a:p>
+            <a:pPr marL="0" indent="0">
+              <a:buNone/>
+            </a:pPr>
+            <a:r>
+              <a:rPr lang="en-US" b="1" dirty="0"/>
               <a:t>Planned future use:</a:t>
             </a:r>
-          </a:p>
-          <a:p>
-            <a:r>
-              <a:rPr lang="en-US" dirty="0" smtClean="0"/>
-              <a:t>This will not be re-used or shared in any way shape or form</a:t>
-            </a:r>
-          </a:p>
-          <a:p>
-            <a:endParaRPr lang="nl-NL" dirty="0"/>
+            <a:endParaRPr lang="en-US" b="1" dirty="0">
+              <a:cs typeface="Calibri"/>
+            </a:endParaRPr>
+          </a:p>
+          <a:p>
+            <a:r>
+              <a:rPr lang="en-US" dirty="0"/>
+              <a:t>May evolve into real use-cases.</a:t>
+            </a:r>
+            <a:endParaRPr lang="en-US" dirty="0">
+              <a:cs typeface="Calibri"/>
+            </a:endParaRPr>
           </a:p>
         </p:txBody>
       </p:sp>
     </p:spTree>
     <p:extLst>
       <p:ext uri="{BB962C8B-B14F-4D97-AF65-F5344CB8AC3E}">
-        <p14:creationId xmlns:p14="http://schemas.microsoft.com/office/powerpoint/2010/main" val="2305509078"/>
+        <p14:creationId xmlns:p14="http://schemas.microsoft.com/office/powerpoint/2010/main" val="2430399406"/>
       </p:ext>
     </p:extLst>
   </p:cSld>
   <p:clrMapOvr>
     <a:masterClrMapping/>
   </p:clrMapOvr>
+  <p:extLst>
+    <p:ext uri="{6950BFC3-D8DA-4A85-94F7-54DA5524770B}">
+      <p188:commentRel xmlns="" xmlns:p188="http://schemas.microsoft.com/office/powerpoint/2018/8/main" r:id="rId2"/>
+    </p:ext>
+  </p:extLst>
 </p:sld>
 </file>
 
@@ -3213,10 +4229,12 @@
           <a:lstStyle/>
           <a:p>
             <a:r>
-              <a:rPr lang="en-US" b="1" dirty="0" smtClean="0"/>
-              <a:t>Level 1: Short experimental scripts</a:t>
-            </a:r>
-            <a:endParaRPr lang="en-US" b="1" dirty="0"/>
+              <a:rPr lang="en-US" b="1" dirty="0"/>
+              <a:t>Level 2: Stand-alone mature script/analysis</a:t>
+            </a:r>
+            <a:endParaRPr lang="en-US" b="1" dirty="0">
+              <a:cs typeface="Calibri Light"/>
+            </a:endParaRPr>
           </a:p>
         </p:txBody>
       </p:sp>
@@ -3232,8 +4250,8 @@
         </p:nvSpPr>
         <p:spPr/>
         <p:txBody>
-          <a:bodyPr>
-            <a:normAutofit fontScale="55000" lnSpcReduction="20000"/>
+          <a:bodyPr vert="horz" lIns="91440" tIns="45720" rIns="91440" bIns="45720" rtlCol="0" anchor="t">
+            <a:noAutofit/>
           </a:bodyPr>
           <a:lstStyle/>
           <a:p>
@@ -3241,26 +4259,34 @@
               <a:buNone/>
             </a:pPr>
             <a:r>
-              <a:rPr lang="en-US" b="1" dirty="0" smtClean="0"/>
+              <a:rPr lang="en-US" sz="1000" b="1" dirty="0"/>
               <a:t>Description:</a:t>
             </a:r>
+            <a:endParaRPr lang="en-US" sz="1000" b="1" dirty="0">
+              <a:cs typeface="Calibri"/>
+            </a:endParaRPr>
           </a:p>
           <a:p>
             <a:pPr marL="0" indent="0">
               <a:buNone/>
             </a:pPr>
             <a:r>
-              <a:rPr lang="en-US" dirty="0" smtClean="0"/>
-              <a:t>A script that is used to experiment with a library or a bit of business logic. These scripts are merely toy examples, but may eventually evolve into real use-cases.</a:t>
-            </a:r>
+              <a:rPr lang="en-US" sz="1000" dirty="0"/>
+              <a:t>The implementation of an analysis that is going to be published, or reusable scripts with generic functionality. This is a standalone publication that will not be further developed, but will need to be stored in case someone wants to reproduce or reuse the work.</a:t>
+            </a:r>
+            <a:endParaRPr lang="en-US" sz="1000" dirty="0">
+              <a:cs typeface="Calibri"/>
+            </a:endParaRPr>
           </a:p>
           <a:p>
             <a:pPr marL="0" indent="0">
               <a:buNone/>
             </a:pPr>
             <a:r>
-              <a:rPr lang="en-US" dirty="0" smtClean="0"/>
-              <a:t>As this project level concerns only toy projects only the most basic of requirements are expected. Most of this will be automated or should be second nature to a developer.</a:t>
+              <a:rPr lang="en-US" sz="1000" dirty="0">
+                <a:cs typeface="Calibri"/>
+              </a:rPr>
+              <a:t>75% of the work at CDS will fall into this category.</a:t>
             </a:r>
           </a:p>
           <a:p>
@@ -3268,83 +4294,182 @@
               <a:buNone/>
             </a:pPr>
             <a:r>
-              <a:rPr lang="en-US" b="1" dirty="0" smtClean="0"/>
+              <a:rPr lang="en-US" sz="1000" b="1" dirty="0"/>
               <a:t>Requirements:</a:t>
             </a:r>
-          </a:p>
-          <a:p>
-            <a:r>
-              <a:rPr lang="en-US" dirty="0" smtClean="0"/>
-              <a:t>Max 100 lines</a:t>
-            </a:r>
-          </a:p>
-          <a:p>
-            <a:r>
-              <a:rPr lang="en-US" dirty="0" smtClean="0"/>
-              <a:t>Basic codestyle, naming conventions</a:t>
-            </a:r>
-          </a:p>
-          <a:p>
-            <a:r>
-              <a:rPr lang="en-US" dirty="0" smtClean="0"/>
+            <a:endParaRPr lang="en-US" sz="1000" b="1" dirty="0">
+              <a:cs typeface="Calibri"/>
+            </a:endParaRPr>
+          </a:p>
+          <a:p>
+            <a:r>
+              <a:rPr lang="en-US" sz="1000" dirty="0"/>
+              <a:t>Organized file-structure with proper architecture and separation of functionalities</a:t>
+            </a:r>
+            <a:endParaRPr lang="en-US" sz="1000" dirty="0">
+              <a:cs typeface="Calibri"/>
+            </a:endParaRPr>
+          </a:p>
+          <a:p>
+            <a:r>
+              <a:rPr lang="en-US" sz="1000" dirty="0"/>
+              <a:t>Basic </a:t>
+            </a:r>
+            <a:r>
+              <a:rPr lang="en-US" sz="1000" dirty="0" err="1"/>
+              <a:t>codestyle</a:t>
+            </a:r>
+            <a:r>
+              <a:rPr lang="en-US" sz="1000" dirty="0"/>
+              <a:t>, naming conventions</a:t>
+            </a:r>
+            <a:endParaRPr lang="en-US" sz="1000" dirty="0">
+              <a:cs typeface="Calibri"/>
+            </a:endParaRPr>
+          </a:p>
+          <a:p>
+            <a:r>
+              <a:rPr lang="en-US" sz="1000" dirty="0"/>
               <a:t>Inline comments explaining complicated business logic (e.g. nested loops)</a:t>
             </a:r>
+            <a:endParaRPr lang="en-US" sz="1000" dirty="0">
+              <a:cs typeface="Calibri"/>
+            </a:endParaRPr>
+          </a:p>
+          <a:p>
+            <a:r>
+              <a:rPr lang="en-US" sz="1000" dirty="0">
+                <a:ea typeface="+mn-lt"/>
+                <a:cs typeface="+mn-lt"/>
+              </a:rPr>
+              <a:t>Versions of libraries and languages used</a:t>
+            </a:r>
+            <a:endParaRPr lang="en-US" sz="1000" dirty="0">
+              <a:cs typeface="Calibri"/>
+            </a:endParaRPr>
+          </a:p>
+          <a:p>
+            <a:r>
+              <a:rPr lang="en-US" sz="1000" dirty="0" smtClean="0"/>
+              <a:t>Test-cases </a:t>
+            </a:r>
+            <a:r>
+              <a:rPr lang="en-US" sz="1000" dirty="0"/>
+              <a:t>that can be run to check code-functionality, preferably automated unit-tests, </a:t>
+            </a:r>
+            <a:r>
+              <a:rPr lang="en-US" sz="1000" dirty="0" smtClean="0"/>
+              <a:t>more is better, especially for complex code. Include at least 1 example of the happy flow.</a:t>
+            </a:r>
+            <a:endParaRPr lang="en-US" sz="600" dirty="0">
+              <a:cs typeface="Calibri"/>
+            </a:endParaRPr>
+          </a:p>
+          <a:p>
+            <a:r>
+              <a:rPr lang="en-US" sz="1000" dirty="0"/>
+              <a:t>Git repo</a:t>
+            </a:r>
+            <a:endParaRPr lang="en-US" sz="1000" dirty="0">
+              <a:cs typeface="Calibri"/>
+            </a:endParaRPr>
+          </a:p>
+          <a:p>
+            <a:r>
+              <a:rPr lang="en-US" sz="1000" dirty="0"/>
+              <a:t>Separate readme with instructions</a:t>
+            </a:r>
+            <a:endParaRPr lang="en-US" sz="1000" dirty="0">
+              <a:cs typeface="Calibri"/>
+            </a:endParaRPr>
+          </a:p>
+          <a:p>
+            <a:r>
+              <a:rPr lang="en-US" sz="1000" dirty="0">
+                <a:cs typeface="Calibri"/>
+              </a:rPr>
+              <a:t>Focus is on making sure it can actually be re-used easily, but nothing will directly depend on this project.</a:t>
+            </a:r>
           </a:p>
           <a:p>
             <a:pPr marL="0" indent="0">
               <a:buNone/>
             </a:pPr>
-            <a:endParaRPr lang="en-US" b="1" dirty="0" smtClean="0"/>
+            <a:endParaRPr lang="en-US" sz="1000" b="1" dirty="0">
+              <a:cs typeface="Calibri"/>
+            </a:endParaRPr>
           </a:p>
           <a:p>
             <a:pPr marL="0" indent="0">
               <a:buNone/>
             </a:pPr>
             <a:r>
-              <a:rPr lang="en-US" b="1" dirty="0" smtClean="0"/>
+              <a:rPr lang="en-US" sz="1000" b="1" dirty="0"/>
               <a:t>Maintenance effort:</a:t>
             </a:r>
-          </a:p>
-          <a:p>
-            <a:r>
-              <a:rPr lang="en-US" dirty="0" smtClean="0"/>
-              <a:t>Minimal, mostly automated</a:t>
-            </a:r>
+            <a:endParaRPr lang="en-US" sz="1000" b="1" dirty="0">
+              <a:cs typeface="Calibri"/>
+            </a:endParaRPr>
+          </a:p>
+          <a:p>
+            <a:r>
+              <a:rPr lang="en-US" sz="1000" dirty="0"/>
+              <a:t>Medium, basic test cases &amp; instructions require some extra effort beyond just writing a quick script.</a:t>
+            </a:r>
+            <a:endParaRPr lang="en-US" sz="1000" dirty="0">
+              <a:cs typeface="Calibri"/>
+            </a:endParaRPr>
           </a:p>
           <a:p>
             <a:pPr marL="0" indent="0">
               <a:buNone/>
             </a:pPr>
-            <a:endParaRPr lang="en-US" b="1" dirty="0" smtClean="0"/>
+            <a:endParaRPr lang="en-US" sz="1000" b="1" dirty="0">
+              <a:cs typeface="Calibri"/>
+            </a:endParaRPr>
           </a:p>
           <a:p>
             <a:pPr marL="0" indent="0">
               <a:buNone/>
             </a:pPr>
             <a:r>
-              <a:rPr lang="en-US" b="1" dirty="0" smtClean="0"/>
+              <a:rPr lang="en-US" sz="1000" b="1" dirty="0"/>
               <a:t>Planned future use:</a:t>
             </a:r>
-          </a:p>
-          <a:p>
-            <a:r>
-              <a:rPr lang="en-US" dirty="0" smtClean="0"/>
-              <a:t>May evolve into real use-cases.</a:t>
-            </a:r>
-            <a:endParaRPr lang="en-US" dirty="0"/>
+            <a:endParaRPr lang="en-US" sz="1000" b="1" dirty="0">
+              <a:cs typeface="Calibri"/>
+            </a:endParaRPr>
+          </a:p>
+          <a:p>
+            <a:r>
+              <a:rPr lang="en-US" sz="1000" smtClean="0"/>
+              <a:t>Reuse </a:t>
+            </a:r>
+            <a:r>
+              <a:rPr lang="en-US" sz="1000" dirty="0"/>
+              <a:t>is expected, either because the script is generic, or to reproduce the work</a:t>
+            </a:r>
+            <a:endParaRPr lang="en-US" sz="1000" dirty="0">
+              <a:cs typeface="Calibri"/>
+            </a:endParaRPr>
           </a:p>
         </p:txBody>
       </p:sp>
     </p:spTree>
     <p:extLst>
       <p:ext uri="{BB962C8B-B14F-4D97-AF65-F5344CB8AC3E}">
-        <p14:creationId xmlns:p14="http://schemas.microsoft.com/office/powerpoint/2010/main" val="2430399406"/>
+        <p14:creationId xmlns:p14="http://schemas.microsoft.com/office/powerpoint/2010/main" val="3421541061"/>
       </p:ext>
     </p:extLst>
   </p:cSld>
   <p:clrMapOvr>
     <a:masterClrMapping/>
   </p:clrMapOvr>
+  <p:extLst mod="1">
+    <p:ext uri="{6950BFC3-D8DA-4A85-94F7-54DA5524770B}">
+      <p188:commentRel xmlns="" xmlns:p188="http://schemas.microsoft.com/office/powerpoint/2018/8/main" r:id="rId2"/>
+    </p:ext>
+  </p:extLst>
 </p:sld>
 </file>
 
@@ -3381,10 +4506,12 @@
           <a:lstStyle/>
           <a:p>
             <a:r>
-              <a:rPr lang="nl-NL" b="1" dirty="0" smtClean="0"/>
-              <a:t>Level 2: Short scripts</a:t>
-            </a:r>
-            <a:endParaRPr lang="nl-NL" b="1" dirty="0"/>
+              <a:rPr lang="en-US" b="1" dirty="0"/>
+              <a:t>Level 3: full-fledged software product / library</a:t>
+            </a:r>
+            <a:endParaRPr lang="en-US" b="1" dirty="0">
+              <a:cs typeface="Calibri Light"/>
+            </a:endParaRPr>
           </a:p>
         </p:txBody>
       </p:sp>
@@ -3400,8 +4527,8 @@
         </p:nvSpPr>
         <p:spPr/>
         <p:txBody>
-          <a:bodyPr>
-            <a:normAutofit fontScale="40000" lnSpcReduction="20000"/>
+          <a:bodyPr vert="horz" lIns="91440" tIns="45720" rIns="91440" bIns="45720" rtlCol="0" anchor="t">
+            <a:normAutofit fontScale="32500" lnSpcReduction="20000"/>
           </a:bodyPr>
           <a:lstStyle/>
           <a:p>
@@ -3409,7 +4536,7 @@
               <a:buNone/>
             </a:pPr>
             <a:r>
-              <a:rPr lang="en-US" b="1" dirty="0" smtClean="0"/>
+              <a:rPr lang="en-US" b="1" dirty="0"/>
               <a:t>Description:</a:t>
             </a:r>
           </a:p>
@@ -3418,119 +4545,213 @@
               <a:buNone/>
             </a:pPr>
             <a:r>
-              <a:rPr lang="en-US" dirty="0" smtClean="0"/>
-              <a:t>A reusable script for a specific function. This script is mature enough to reuse. Examples of this include exercises that can be re-used by different teachers during practicals, scripts for automatically transforming files into a different format, deployment scripts, scripts to apply a mask to data, scripts for training a model using a specific library, etc.</a:t>
-            </a:r>
+              <a:rPr lang="en-US" dirty="0"/>
+              <a:t>A library that is expected to be reused as a dependency in other work. This can be within the original project, within CDS as a whole, or even outside of CDS.</a:t>
+            </a:r>
+            <a:br>
+              <a:rPr lang="en-US" dirty="0"/>
+            </a:br>
+            <a:r>
+              <a:rPr lang="en-US" dirty="0"/>
+              <a:t>This requires proper software development.</a:t>
+            </a:r>
+            <a:endParaRPr lang="en-US" dirty="0">
+              <a:cs typeface="Calibri"/>
+            </a:endParaRPr>
           </a:p>
           <a:p>
             <a:pPr marL="0" indent="0">
               <a:buNone/>
             </a:pPr>
             <a:r>
-              <a:rPr lang="en-US" dirty="0" smtClean="0"/>
-              <a:t>This is the first level of project where it is expected to put some extra effort into the maintenance of your code. However, as these projects are still extremely small most of the code should still be self-documenting and the effort should still be limited.</a:t>
-            </a:r>
+              <a:rPr lang="en-US" b="1" dirty="0"/>
+              <a:t>Requirements:</a:t>
+            </a:r>
+            <a:endParaRPr lang="en-US" b="1" dirty="0">
+              <a:cs typeface="Calibri"/>
+            </a:endParaRPr>
+          </a:p>
+          <a:p>
+            <a:r>
+              <a:rPr lang="en-US" dirty="0"/>
+              <a:t>Organized file-structure, separation of functionalities</a:t>
+            </a:r>
+            <a:endParaRPr lang="en-US" dirty="0">
+              <a:cs typeface="Calibri"/>
+            </a:endParaRPr>
+          </a:p>
+          <a:p>
+            <a:r>
+              <a:rPr lang="en-US" dirty="0"/>
+              <a:t>Basic </a:t>
+            </a:r>
+            <a:r>
+              <a:rPr lang="en-US" dirty="0" err="1"/>
+              <a:t>codestyle</a:t>
+            </a:r>
+            <a:r>
+              <a:rPr lang="en-US" dirty="0"/>
+              <a:t>, naming conventions</a:t>
+            </a:r>
+            <a:endParaRPr lang="en-US" dirty="0">
+              <a:cs typeface="Calibri"/>
+            </a:endParaRPr>
+          </a:p>
+          <a:p>
+            <a:r>
+              <a:rPr lang="en-US" dirty="0"/>
+              <a:t>Inline comments explaining complicated business logic (e.g. nested loops)</a:t>
+            </a:r>
+            <a:endParaRPr lang="en-US" dirty="0">
+              <a:cs typeface="Calibri"/>
+            </a:endParaRPr>
+          </a:p>
+          <a:p>
+            <a:r>
+              <a:rPr lang="en-US" dirty="0">
+                <a:ea typeface="+mn-lt"/>
+                <a:cs typeface="+mn-lt"/>
+              </a:rPr>
+              <a:t>Versions of libraries and languages used</a:t>
+            </a:r>
+            <a:endParaRPr lang="en-US" dirty="0"/>
+          </a:p>
+          <a:p>
+            <a:r>
+              <a:rPr lang="en-US" dirty="0"/>
+              <a:t>Automated unit-tests with proper coverage</a:t>
+            </a:r>
+            <a:endParaRPr lang="en-US" dirty="0">
+              <a:cs typeface="Calibri"/>
+            </a:endParaRPr>
+          </a:p>
+          <a:p>
+            <a:r>
+              <a:rPr lang="en-US" dirty="0"/>
+              <a:t>Git repo</a:t>
+            </a:r>
+            <a:endParaRPr lang="en-US" dirty="0">
+              <a:cs typeface="Calibri"/>
+            </a:endParaRPr>
+          </a:p>
+          <a:p>
+            <a:r>
+              <a:rPr lang="en-US" dirty="0"/>
+              <a:t>Proper processes for deployment, maintenance, and code-quality have been set in place</a:t>
+            </a:r>
+            <a:endParaRPr lang="en-US" dirty="0">
+              <a:cs typeface="Calibri"/>
+            </a:endParaRPr>
+          </a:p>
+          <a:p>
+            <a:r>
+              <a:rPr lang="en-US" dirty="0"/>
+              <a:t>Code review by 2nd developer whenever possible</a:t>
+            </a:r>
+            <a:endParaRPr lang="en-US" dirty="0">
+              <a:cs typeface="Calibri"/>
+            </a:endParaRPr>
+          </a:p>
+          <a:p>
+            <a:r>
+              <a:rPr lang="en-US" dirty="0"/>
+              <a:t>Check for vulnerabilities when applicable</a:t>
+            </a:r>
+            <a:endParaRPr lang="en-US" dirty="0">
+              <a:cs typeface="Calibri"/>
+            </a:endParaRPr>
+          </a:p>
+          <a:p>
+            <a:r>
+              <a:rPr lang="en-US" dirty="0"/>
+              <a:t>Separate readme with instructions and full documentation of functionality; if sufficiently complex, readme may need to be replaced with a wiki.</a:t>
+            </a:r>
+            <a:endParaRPr lang="en-US" dirty="0">
+              <a:cs typeface="Calibri"/>
+            </a:endParaRPr>
+          </a:p>
+          <a:p>
+            <a:r>
+              <a:rPr lang="en-US" dirty="0"/>
+              <a:t>Basic UX is handled when applicable</a:t>
+            </a:r>
+            <a:endParaRPr lang="en-US" dirty="0">
+              <a:cs typeface="Calibri"/>
+            </a:endParaRPr>
           </a:p>
           <a:p>
             <a:pPr marL="0" indent="0">
               <a:buNone/>
             </a:pPr>
-            <a:r>
-              <a:rPr lang="en-US" b="1" dirty="0" smtClean="0"/>
-              <a:t>Requirements:</a:t>
-            </a:r>
-          </a:p>
-          <a:p>
-            <a:r>
-              <a:rPr lang="en-US" dirty="0" smtClean="0"/>
-              <a:t>Max 200 lines</a:t>
-            </a:r>
-          </a:p>
-          <a:p>
-            <a:r>
-              <a:rPr lang="en-US" dirty="0" smtClean="0"/>
-              <a:t>Single file, self-contained functionality</a:t>
-            </a:r>
-          </a:p>
-          <a:p>
-            <a:r>
-              <a:rPr lang="en-US" dirty="0" smtClean="0"/>
-              <a:t>Basic codestyle, naming conventions</a:t>
-            </a:r>
-          </a:p>
-          <a:p>
-            <a:r>
-              <a:rPr lang="en-US" dirty="0" smtClean="0"/>
-              <a:t>Inline comments explaining complicated business logic (e.g. nested loops)</a:t>
-            </a:r>
-          </a:p>
-          <a:p>
-            <a:r>
-              <a:rPr lang="en-US" dirty="0" smtClean="0"/>
-              <a:t>Basic instructions on how to use the functionality</a:t>
-            </a:r>
-          </a:p>
-          <a:p>
-            <a:r>
-              <a:rPr lang="en-US" dirty="0" smtClean="0"/>
-              <a:t>Git repo</a:t>
-            </a:r>
+            <a:endParaRPr lang="en-US" dirty="0">
+              <a:cs typeface="Calibri"/>
+            </a:endParaRPr>
           </a:p>
           <a:p>
             <a:pPr marL="0" indent="0">
               <a:buNone/>
             </a:pPr>
-            <a:endParaRPr lang="en-US" b="1" dirty="0" smtClean="0"/>
+            <a:r>
+              <a:rPr lang="en-US" b="1" dirty="0"/>
+              <a:t>Maintenance effort:</a:t>
+            </a:r>
+            <a:endParaRPr lang="en-US" b="1" dirty="0">
+              <a:cs typeface="Calibri"/>
+            </a:endParaRPr>
+          </a:p>
+          <a:p>
+            <a:r>
+              <a:rPr lang="en-US" dirty="0"/>
+              <a:t>High, possibly requires external help depending on the level of professionalism expected, especially when specific specialist skills are needed (i.e. when a pen-test needs to be done)</a:t>
+            </a:r>
+            <a:endParaRPr lang="en-US" dirty="0">
+              <a:cs typeface="Calibri"/>
+            </a:endParaRPr>
           </a:p>
           <a:p>
             <a:pPr marL="0" indent="0">
               <a:buNone/>
             </a:pPr>
             <a:r>
-              <a:rPr lang="en-US" b="1" dirty="0" smtClean="0"/>
-              <a:t>Maintenance effort:</a:t>
-            </a:r>
-          </a:p>
-          <a:p>
-            <a:r>
-              <a:rPr lang="en-US" dirty="0" smtClean="0"/>
-              <a:t>Low</a:t>
-            </a:r>
+              <a:rPr lang="en-US" b="1" dirty="0"/>
+              <a:t>Planned future use:</a:t>
+            </a:r>
+            <a:endParaRPr lang="en-US" b="1" dirty="0">
+              <a:cs typeface="Calibri"/>
+            </a:endParaRPr>
+          </a:p>
+          <a:p>
+            <a:r>
+              <a:rPr lang="en-US" dirty="0"/>
+              <a:t>Reuse is expected by the creator as well as by other external to her/his project</a:t>
+            </a:r>
+            <a:endParaRPr lang="en-US" dirty="0">
+              <a:cs typeface="Calibri"/>
+            </a:endParaRPr>
           </a:p>
           <a:p>
             <a:pPr marL="0" indent="0">
               <a:buNone/>
             </a:pPr>
-            <a:endParaRPr lang="en-US" b="1" dirty="0" smtClean="0"/>
-          </a:p>
-          <a:p>
-            <a:pPr marL="0" indent="0">
-              <a:buNone/>
-            </a:pPr>
-            <a:r>
-              <a:rPr lang="en-US" b="1" dirty="0" smtClean="0"/>
-              <a:t>Planned future use:</a:t>
-            </a:r>
-          </a:p>
-          <a:p>
-            <a:r>
-              <a:rPr lang="en-US" dirty="0" smtClean="0"/>
-              <a:t>Reuse is expected by the creator</a:t>
-            </a:r>
-            <a:endParaRPr lang="en-US" dirty="0"/>
+            <a:endParaRPr lang="en-US"/>
           </a:p>
         </p:txBody>
       </p:sp>
     </p:spTree>
     <p:extLst>
       <p:ext uri="{BB962C8B-B14F-4D97-AF65-F5344CB8AC3E}">
-        <p14:creationId xmlns:p14="http://schemas.microsoft.com/office/powerpoint/2010/main" val="2730087503"/>
+        <p14:creationId xmlns:p14="http://schemas.microsoft.com/office/powerpoint/2010/main" val="26091957"/>
       </p:ext>
     </p:extLst>
   </p:cSld>
   <p:clrMapOvr>
     <a:masterClrMapping/>
   </p:clrMapOvr>
+  <p:extLst>
+    <p:ext uri="{6950BFC3-D8DA-4A85-94F7-54DA5524770B}">
+      <p188:commentRel xmlns="" xmlns:p188="http://schemas.microsoft.com/office/powerpoint/2018/8/main" r:id="rId2"/>
+    </p:ext>
+  </p:extLst>
 </p:sld>
 </file>
 
@@ -3567,10 +4788,10 @@
           <a:lstStyle/>
           <a:p>
             <a:r>
-              <a:rPr lang="en-US" b="1" dirty="0" smtClean="0"/>
-              <a:t>Level 3: small internal projects</a:t>
-            </a:r>
-            <a:endParaRPr lang="en-US" b="1" dirty="0"/>
+              <a:rPr lang="en-US" dirty="0" smtClean="0"/>
+              <a:t>Example projects:</a:t>
+            </a:r>
+            <a:endParaRPr lang="nl-NL" dirty="0"/>
           </a:p>
         </p:txBody>
       </p:sp>
@@ -3586,316 +4807,117 @@
         </p:nvSpPr>
         <p:spPr/>
         <p:txBody>
-          <a:bodyPr>
-            <a:normAutofit fontScale="47500" lnSpcReduction="20000"/>
-          </a:bodyPr>
-          <a:lstStyle/>
-          <a:p>
-            <a:pPr marL="0" indent="0">
-              <a:buNone/>
-            </a:pPr>
-            <a:r>
-              <a:rPr lang="en-US" b="1" dirty="0" smtClean="0"/>
-              <a:t>Description:</a:t>
-            </a:r>
-          </a:p>
-          <a:p>
-            <a:pPr marL="0" indent="0">
-              <a:buNone/>
-            </a:pPr>
+          <a:bodyPr/>
+          <a:lstStyle/>
+          <a:p>
             <a:r>
               <a:rPr lang="en-US" dirty="0" smtClean="0"/>
-              <a:t>A small project for internal use, the difference with level 2 is that we have moved from a single, self-contained, file with a single functionality to a bigger project that requires a proper architecture.</a:t>
-            </a:r>
-          </a:p>
-          <a:p>
-            <a:pPr marL="0" indent="0">
-              <a:buNone/>
-            </a:pPr>
-            <a:r>
-              <a:rPr lang="en-US" b="1" dirty="0" smtClean="0"/>
-              <a:t>Requirements:</a:t>
-            </a:r>
+              <a:t>Level 1: </a:t>
+            </a:r>
+          </a:p>
+          <a:p>
+            <a:pPr lvl="1"/>
+            <a:r>
+              <a:rPr lang="nl-NL" dirty="0">
+                <a:hlinkClick r:id="rId2"/>
+              </a:rPr>
+              <a:t>https://</a:t>
+            </a:r>
+            <a:r>
+              <a:rPr lang="nl-NL" dirty="0" smtClean="0">
+                <a:hlinkClick r:id="rId2"/>
+              </a:rPr>
+              <a:t>github.com/MaastrichtU-CDS/level_1_example</a:t>
+            </a:r>
+            <a:endParaRPr lang="nl-NL" dirty="0" smtClean="0"/>
           </a:p>
           <a:p>
             <a:r>
               <a:rPr lang="en-US" dirty="0" smtClean="0"/>
-              <a:t>Organized file-structure with proper architecture and separation of functionalities</a:t>
-            </a:r>
-          </a:p>
-          <a:p>
+              <a:t>Level 2:</a:t>
+            </a:r>
+          </a:p>
+          <a:p>
+            <a:pPr lvl="1"/>
             <a:r>
               <a:rPr lang="en-US" dirty="0" smtClean="0"/>
-              <a:t>Basic codestyle, naming conventions</a:t>
+              <a:t>Someone give me an example</a:t>
             </a:r>
           </a:p>
           <a:p>
             <a:r>
               <a:rPr lang="en-US" dirty="0" smtClean="0"/>
-              <a:t>Inline comments explaining complicated business logic (e.g. nested loops)</a:t>
-            </a:r>
-          </a:p>
-          <a:p>
-            <a:r>
-              <a:rPr lang="en-US" dirty="0" smtClean="0"/>
-              <a:t>Simple test-cases that can be run to check code-functionality, preferably automated unit-tests, coverage may be minimal.</a:t>
-            </a:r>
-          </a:p>
-          <a:p>
-            <a:r>
-              <a:rPr lang="en-US" dirty="0" smtClean="0"/>
-              <a:t>Git repo</a:t>
-            </a:r>
-          </a:p>
-          <a:p>
-            <a:r>
-              <a:rPr lang="en-US" dirty="0" smtClean="0"/>
-              <a:t>Separate readme with instructions</a:t>
-            </a:r>
-          </a:p>
-          <a:p>
-            <a:pPr marL="0" indent="0">
-              <a:buNone/>
-            </a:pPr>
-            <a:endParaRPr lang="en-US" b="1" dirty="0" smtClean="0"/>
-          </a:p>
-          <a:p>
-            <a:pPr marL="0" indent="0">
-              <a:buNone/>
-            </a:pPr>
-            <a:r>
-              <a:rPr lang="en-US" b="1" dirty="0" smtClean="0"/>
-              <a:t>Maintenance effort:</a:t>
-            </a:r>
-          </a:p>
-          <a:p>
-            <a:r>
-              <a:rPr lang="en-US" dirty="0" smtClean="0"/>
-              <a:t>Medium</a:t>
-            </a:r>
-          </a:p>
-          <a:p>
-            <a:pPr marL="0" indent="0">
-              <a:buNone/>
-            </a:pPr>
-            <a:endParaRPr lang="en-US" b="1" dirty="0" smtClean="0"/>
-          </a:p>
-          <a:p>
-            <a:pPr marL="0" indent="0">
-              <a:buNone/>
-            </a:pPr>
-            <a:r>
-              <a:rPr lang="en-US" b="1" dirty="0" smtClean="0"/>
-              <a:t>Planned future use:</a:t>
-            </a:r>
-          </a:p>
-          <a:p>
-            <a:r>
-              <a:rPr lang="en-US" dirty="0" smtClean="0"/>
-              <a:t>Reuse is expected by the creator, others may be interested in reusing it as well</a:t>
-            </a:r>
-            <a:endParaRPr lang="en-US" dirty="0"/>
+              <a:t>Level 3:</a:t>
+            </a:r>
+          </a:p>
+          <a:p>
+            <a:pPr lvl="1"/>
+            <a:r>
+              <a:rPr lang="nl-NL" dirty="0">
+                <a:hlinkClick r:id="rId3"/>
+              </a:rPr>
+              <a:t>https://</a:t>
+            </a:r>
+            <a:r>
+              <a:rPr lang="nl-NL" dirty="0" smtClean="0">
+                <a:hlinkClick r:id="rId3"/>
+              </a:rPr>
+              <a:t>github.com/MaastrichtU-CDS/n-scalar-product-protocol</a:t>
+            </a:r>
+            <a:endParaRPr lang="nl-NL" dirty="0" smtClean="0"/>
+          </a:p>
+          <a:p>
+            <a:pPr lvl="1"/>
+            <a:r>
+              <a:rPr lang="nl-NL" dirty="0">
+                <a:hlinkClick r:id="rId4"/>
+              </a:rPr>
+              <a:t>https://</a:t>
+            </a:r>
+            <a:r>
+              <a:rPr lang="nl-NL" dirty="0" smtClean="0">
+                <a:hlinkClick r:id="rId4"/>
+              </a:rPr>
+              <a:t>github.com/MaastrichtU-CDS/vertibayes</a:t>
+            </a:r>
+            <a:endParaRPr lang="nl-NL" dirty="0" smtClean="0"/>
+          </a:p>
+          <a:p>
+            <a:pPr lvl="1"/>
+            <a:r>
+              <a:rPr lang="nl-NL">
+                <a:hlinkClick r:id="rId5"/>
+              </a:rPr>
+              <a:t>https</a:t>
+            </a:r>
+            <a:r>
+              <a:rPr lang="nl-NL">
+                <a:hlinkClick r:id="rId5"/>
+              </a:rPr>
+              <a:t>://</a:t>
+            </a:r>
+            <a:r>
+              <a:rPr lang="nl-NL" smtClean="0">
+                <a:hlinkClick r:id="rId5"/>
+              </a:rPr>
+              <a:t>github.com/MaastrichtU-CDS/bayesianEnsemble</a:t>
+            </a:r>
+            <a:r>
+              <a:rPr lang="nl-NL" smtClean="0"/>
+              <a:t> </a:t>
+            </a:r>
+            <a:endParaRPr lang="nl-NL" dirty="0" smtClean="0"/>
+          </a:p>
+          <a:p>
+            <a:pPr lvl="1"/>
+            <a:endParaRPr lang="en-US" dirty="0" smtClean="0"/>
           </a:p>
         </p:txBody>
       </p:sp>
     </p:spTree>
     <p:extLst>
       <p:ext uri="{BB962C8B-B14F-4D97-AF65-F5344CB8AC3E}">
-        <p14:creationId xmlns:p14="http://schemas.microsoft.com/office/powerpoint/2010/main" val="3421541061"/>
-      </p:ext>
-    </p:extLst>
-  </p:cSld>
-  <p:clrMapOvr>
-    <a:masterClrMapping/>
-  </p:clrMapOvr>
-</p:sld>
-</file>
-
-<file path=ppt/slides/slide6.xml><?xml version="1.0" encoding="utf-8"?>
-<p:sld xmlns:a="http://schemas.openxmlformats.org/drawingml/2006/main" xmlns:r="http://schemas.openxmlformats.org/officeDocument/2006/relationships" xmlns:p="http://schemas.openxmlformats.org/presentationml/2006/main">
-  <p:cSld>
-    <p:spTree>
-      <p:nvGrpSpPr>
-        <p:cNvPr id="1" name=""/>
-        <p:cNvGrpSpPr/>
-        <p:nvPr/>
-      </p:nvGrpSpPr>
-      <p:grpSpPr>
-        <a:xfrm>
-          <a:off x="0" y="0"/>
-          <a:ext cx="0" cy="0"/>
-          <a:chOff x="0" y="0"/>
-          <a:chExt cx="0" cy="0"/>
-        </a:xfrm>
-      </p:grpSpPr>
-      <p:sp>
-        <p:nvSpPr>
-          <p:cNvPr id="2" name="Title 1"/>
-          <p:cNvSpPr>
-            <a:spLocks noGrp="1"/>
-          </p:cNvSpPr>
-          <p:nvPr>
-            <p:ph type="title"/>
-          </p:nvPr>
-        </p:nvSpPr>
-        <p:spPr/>
-        <p:txBody>
-          <a:bodyPr/>
-          <a:lstStyle/>
-          <a:p>
-            <a:r>
-              <a:rPr lang="en-US" b="1" dirty="0" smtClean="0"/>
-              <a:t>Level 4: full-fledged library with both internal and external use</a:t>
-            </a:r>
-            <a:endParaRPr lang="en-US" b="1" dirty="0"/>
-          </a:p>
-        </p:txBody>
-      </p:sp>
-      <p:sp>
-        <p:nvSpPr>
-          <p:cNvPr id="3" name="Content Placeholder 2"/>
-          <p:cNvSpPr>
-            <a:spLocks noGrp="1"/>
-          </p:cNvSpPr>
-          <p:nvPr>
-            <p:ph idx="1"/>
-          </p:nvPr>
-        </p:nvSpPr>
-        <p:spPr/>
-        <p:txBody>
-          <a:bodyPr>
-            <a:normAutofit fontScale="40000" lnSpcReduction="20000"/>
-          </a:bodyPr>
-          <a:lstStyle/>
-          <a:p>
-            <a:pPr marL="0" indent="0">
-              <a:buNone/>
-            </a:pPr>
-            <a:r>
-              <a:rPr lang="en-US" b="1" dirty="0" smtClean="0"/>
-              <a:t>Description:</a:t>
-            </a:r>
-          </a:p>
-          <a:p>
-            <a:pPr marL="0" indent="0">
-              <a:buNone/>
-            </a:pPr>
-            <a:r>
-              <a:rPr lang="en-US" dirty="0" smtClean="0"/>
-              <a:t>A library that is expected to be reused both internally by the project as well as externally by others.</a:t>
-            </a:r>
-          </a:p>
-          <a:p>
-            <a:pPr marL="0" indent="0">
-              <a:buNone/>
-            </a:pPr>
-            <a:r>
-              <a:rPr lang="en-US" b="1" dirty="0" smtClean="0"/>
-              <a:t>Requirements:</a:t>
-            </a:r>
-          </a:p>
-          <a:p>
-            <a:r>
-              <a:rPr lang="en-US" dirty="0" smtClean="0"/>
-              <a:t>Organized file-structure, separation of functionalities</a:t>
-            </a:r>
-          </a:p>
-          <a:p>
-            <a:r>
-              <a:rPr lang="en-US" dirty="0" smtClean="0"/>
-              <a:t>Basic codestyle, naming conventions</a:t>
-            </a:r>
-          </a:p>
-          <a:p>
-            <a:r>
-              <a:rPr lang="en-US" dirty="0" smtClean="0"/>
-              <a:t>Inline comments explaining complicated business logic (e.g. nested loops)</a:t>
-            </a:r>
-          </a:p>
-          <a:p>
-            <a:r>
-              <a:rPr lang="en-US" dirty="0" smtClean="0"/>
-              <a:t>Automated unit-tests with proper coverage</a:t>
-            </a:r>
-          </a:p>
-          <a:p>
-            <a:r>
-              <a:rPr lang="en-US" dirty="0" smtClean="0"/>
-              <a:t>Git repo</a:t>
-            </a:r>
-          </a:p>
-          <a:p>
-            <a:r>
-              <a:rPr lang="en-US" dirty="0" smtClean="0"/>
-              <a:t>Proper processes for deployment, maintenance, and code-quality have been set in place</a:t>
-            </a:r>
-          </a:p>
-          <a:p>
-            <a:r>
-              <a:rPr lang="en-US" dirty="0" smtClean="0"/>
-              <a:t>Code review by 2nd developer whenever possible</a:t>
-            </a:r>
-          </a:p>
-          <a:p>
-            <a:r>
-              <a:rPr lang="en-US" dirty="0" smtClean="0"/>
-              <a:t>Check for vulnerabilities when applicable</a:t>
-            </a:r>
-          </a:p>
-          <a:p>
-            <a:r>
-              <a:rPr lang="en-US" dirty="0" smtClean="0"/>
-              <a:t>Separate readme with instructions and full documentation of functionality</a:t>
-            </a:r>
-          </a:p>
-          <a:p>
-            <a:r>
-              <a:rPr lang="en-US" dirty="0" smtClean="0"/>
-              <a:t>Basic UX is handled when applicable</a:t>
-            </a:r>
-          </a:p>
-          <a:p>
-            <a:pPr marL="0" indent="0">
-              <a:buNone/>
-            </a:pPr>
-            <a:r>
-              <a:rPr lang="en-US" b="1" dirty="0" smtClean="0"/>
-              <a:t>Maintenance effort:</a:t>
-            </a:r>
-          </a:p>
-          <a:p>
-            <a:r>
-              <a:rPr lang="en-US" dirty="0" smtClean="0"/>
-              <a:t>High, possibly requires external help depending on the level of professionalism expected, especially when specific specialist skills are needed (i.e. when a pen-test needs to be done)</a:t>
-            </a:r>
-          </a:p>
-          <a:p>
-            <a:pPr marL="0" indent="0">
-              <a:buNone/>
-            </a:pPr>
-            <a:r>
-              <a:rPr lang="en-US" b="1" dirty="0" smtClean="0"/>
-              <a:t>Planned future use:</a:t>
-            </a:r>
-          </a:p>
-          <a:p>
-            <a:r>
-              <a:rPr lang="en-US" dirty="0" smtClean="0"/>
-              <a:t>Reuse is expected by the creator as well as by other external to his project</a:t>
-            </a:r>
-          </a:p>
-          <a:p>
-            <a:pPr marL="0" indent="0">
-              <a:buNone/>
-            </a:pPr>
-            <a:endParaRPr lang="en-US" dirty="0"/>
-          </a:p>
-        </p:txBody>
-      </p:sp>
-    </p:spTree>
-    <p:extLst>
-      <p:ext uri="{BB962C8B-B14F-4D97-AF65-F5344CB8AC3E}">
-        <p14:creationId xmlns:p14="http://schemas.microsoft.com/office/powerpoint/2010/main" val="26091957"/>
+        <p14:creationId xmlns:p14="http://schemas.microsoft.com/office/powerpoint/2010/main" val="2030536550"/>
       </p:ext>
     </p:extLst>
   </p:cSld>
@@ -4164,4 +5186,312 @@
     </a:ext>
   </a:extLst>
 </a:theme>
+</file>
+
+<file path=customXml/item1.xml><?xml version="1.0" encoding="utf-8"?>
+<p:properties xmlns:p="http://schemas.microsoft.com/office/2006/metadata/properties" xmlns:xsi="http://www.w3.org/2001/XMLSchema-instance" xmlns:pc="http://schemas.microsoft.com/office/infopath/2007/PartnerControls">
+  <documentManagement>
+    <TaxCatchAll xmlns="89ee1cdf-eea7-41b4-be42-a33c70cea0a6" xsi:nil="true"/>
+    <lcf76f155ced4ddcb4097134ff3c332f xmlns="f07552dd-1c43-4116-999b-42c9c048e8e7">
+      <Terms xmlns="http://schemas.microsoft.com/office/infopath/2007/PartnerControls"/>
+    </lcf76f155ced4ddcb4097134ff3c332f>
+  </documentManagement>
+</p:properties>
+</file>
+
+<file path=customXml/item2.xml><?xml version="1.0" encoding="utf-8"?>
+<ct:contentTypeSchema xmlns:ct="http://schemas.microsoft.com/office/2006/metadata/contentType" xmlns:ma="http://schemas.microsoft.com/office/2006/metadata/properties/metaAttributes" ct:_="" ma:_="" ma:contentTypeName="Document" ma:contentTypeID="0x0101004313D4D0B3DCE442A16492F5C5472198" ma:contentTypeVersion="17" ma:contentTypeDescription="Create a new document." ma:contentTypeScope="" ma:versionID="7ae4d7d2f88cab5fb2f5b0c527ebbcca">
+  <xsd:schema xmlns:xsd="http://www.w3.org/2001/XMLSchema" xmlns:xs="http://www.w3.org/2001/XMLSchema" xmlns:p="http://schemas.microsoft.com/office/2006/metadata/properties" xmlns:ns2="f07552dd-1c43-4116-999b-42c9c048e8e7" xmlns:ns3="b7a78d05-72b7-4525-ba4a-dbc395da44c8" xmlns:ns4="89ee1cdf-eea7-41b4-be42-a33c70cea0a6" targetNamespace="http://schemas.microsoft.com/office/2006/metadata/properties" ma:root="true" ma:fieldsID="638e6667d846717050b5b321c5409b0d" ns2:_="" ns3:_="" ns4:_="">
+    <xsd:import namespace="f07552dd-1c43-4116-999b-42c9c048e8e7"/>
+    <xsd:import namespace="b7a78d05-72b7-4525-ba4a-dbc395da44c8"/>
+    <xsd:import namespace="89ee1cdf-eea7-41b4-be42-a33c70cea0a6"/>
+    <xsd:element name="properties">
+      <xsd:complexType>
+        <xsd:sequence>
+          <xsd:element name="documentManagement">
+            <xsd:complexType>
+              <xsd:all>
+                <xsd:element ref="ns2:MediaServiceMetadata" minOccurs="0"/>
+                <xsd:element ref="ns2:MediaServiceFastMetadata" minOccurs="0"/>
+                <xsd:element ref="ns3:SharedWithUsers" minOccurs="0"/>
+                <xsd:element ref="ns3:SharedWithDetails" minOccurs="0"/>
+                <xsd:element ref="ns2:MediaServiceAutoKeyPoints" minOccurs="0"/>
+                <xsd:element ref="ns2:MediaServiceKeyPoints" minOccurs="0"/>
+                <xsd:element ref="ns2:MediaServiceAutoTags" minOccurs="0"/>
+                <xsd:element ref="ns2:MediaServiceOCR" minOccurs="0"/>
+                <xsd:element ref="ns2:MediaServiceGenerationTime" minOccurs="0"/>
+                <xsd:element ref="ns2:MediaServiceEventHashCode" minOccurs="0"/>
+                <xsd:element ref="ns2:MediaServiceDateTaken" minOccurs="0"/>
+                <xsd:element ref="ns2:MediaLengthInSeconds" minOccurs="0"/>
+                <xsd:element ref="ns4:TaxCatchAll" minOccurs="0"/>
+                <xsd:element ref="ns2:lcf76f155ced4ddcb4097134ff3c332f" minOccurs="0"/>
+              </xsd:all>
+            </xsd:complexType>
+          </xsd:element>
+        </xsd:sequence>
+      </xsd:complexType>
+    </xsd:element>
+  </xsd:schema>
+  <xsd:schema xmlns:xsd="http://www.w3.org/2001/XMLSchema" xmlns:xs="http://www.w3.org/2001/XMLSchema" xmlns:dms="http://schemas.microsoft.com/office/2006/documentManagement/types" xmlns:pc="http://schemas.microsoft.com/office/infopath/2007/PartnerControls" targetNamespace="f07552dd-1c43-4116-999b-42c9c048e8e7" elementFormDefault="qualified">
+    <xsd:import namespace="http://schemas.microsoft.com/office/2006/documentManagement/types"/>
+    <xsd:import namespace="http://schemas.microsoft.com/office/infopath/2007/PartnerControls"/>
+    <xsd:element name="MediaServiceMetadata" ma:index="8" nillable="true" ma:displayName="MediaServiceMetadata" ma:hidden="true" ma:internalName="MediaServiceMetadata" ma:readOnly="true">
+      <xsd:simpleType>
+        <xsd:restriction base="dms:Note"/>
+      </xsd:simpleType>
+    </xsd:element>
+    <xsd:element name="MediaServiceFastMetadata" ma:index="9" nillable="true" ma:displayName="MediaServiceFastMetadata" ma:hidden="true" ma:internalName="MediaServiceFastMetadata" ma:readOnly="true">
+      <xsd:simpleType>
+        <xsd:restriction base="dms:Note"/>
+      </xsd:simpleType>
+    </xsd:element>
+    <xsd:element name="MediaServiceAutoKeyPoints" ma:index="12" nillable="true" ma:displayName="MediaServiceAutoKeyPoints" ma:hidden="true" ma:internalName="MediaServiceAutoKeyPoints" ma:readOnly="true">
+      <xsd:simpleType>
+        <xsd:restriction base="dms:Note"/>
+      </xsd:simpleType>
+    </xsd:element>
+    <xsd:element name="MediaServiceKeyPoints" ma:index="13" nillable="true" ma:displayName="KeyPoints" ma:internalName="MediaServiceKeyPoints" ma:readOnly="true">
+      <xsd:simpleType>
+        <xsd:restriction base="dms:Note">
+          <xsd:maxLength value="255"/>
+        </xsd:restriction>
+      </xsd:simpleType>
+    </xsd:element>
+    <xsd:element name="MediaServiceAutoTags" ma:index="14" nillable="true" ma:displayName="Tags" ma:internalName="MediaServiceAutoTags" ma:readOnly="true">
+      <xsd:simpleType>
+        <xsd:restriction base="dms:Text"/>
+      </xsd:simpleType>
+    </xsd:element>
+    <xsd:element name="MediaServiceOCR" ma:index="15" nillable="true" ma:displayName="Extracted Text" ma:internalName="MediaServiceOCR" ma:readOnly="true">
+      <xsd:simpleType>
+        <xsd:restriction base="dms:Note">
+          <xsd:maxLength value="255"/>
+        </xsd:restriction>
+      </xsd:simpleType>
+    </xsd:element>
+    <xsd:element name="MediaServiceGenerationTime" ma:index="16" nillable="true" ma:displayName="MediaServiceGenerationTime" ma:hidden="true" ma:internalName="MediaServiceGenerationTime" ma:readOnly="true">
+      <xsd:simpleType>
+        <xsd:restriction base="dms:Text"/>
+      </xsd:simpleType>
+    </xsd:element>
+    <xsd:element name="MediaServiceEventHashCode" ma:index="17" nillable="true" ma:displayName="MediaServiceEventHashCode" ma:hidden="true" ma:internalName="MediaServiceEventHashCode" ma:readOnly="true">
+      <xsd:simpleType>
+        <xsd:restriction base="dms:Text"/>
+      </xsd:simpleType>
+    </xsd:element>
+    <xsd:element name="MediaServiceDateTaken" ma:index="18" nillable="true" ma:displayName="MediaServiceDateTaken" ma:hidden="true" ma:internalName="MediaServiceDateTaken" ma:readOnly="true">
+      <xsd:simpleType>
+        <xsd:restriction base="dms:Text"/>
+      </xsd:simpleType>
+    </xsd:element>
+    <xsd:element name="MediaLengthInSeconds" ma:index="19" nillable="true" ma:displayName="Length (seconds)" ma:internalName="MediaLengthInSeconds" ma:readOnly="true">
+      <xsd:simpleType>
+        <xsd:restriction base="dms:Unknown"/>
+      </xsd:simpleType>
+    </xsd:element>
+    <xsd:element name="lcf76f155ced4ddcb4097134ff3c332f" ma:index="22" nillable="true" ma:taxonomy="true" ma:internalName="lcf76f155ced4ddcb4097134ff3c332f" ma:taxonomyFieldName="MediaServiceImageTags" ma:displayName="Image Tags" ma:readOnly="false" ma:fieldId="{5cf76f15-5ced-4ddc-b409-7134ff3c332f}" ma:taxonomyMulti="true" ma:sspId="49434b8a-e39a-4754-9a9b-bed8390d09d6" ma:termSetId="09814cd3-568e-fe90-9814-8d621ff8fb84" ma:anchorId="fba54fb3-c3e1-fe81-a776-ca4b69148c4d" ma:open="true" ma:isKeyword="false">
+      <xsd:complexType>
+        <xsd:sequence>
+          <xsd:element ref="pc:Terms" minOccurs="0" maxOccurs="1"/>
+        </xsd:sequence>
+      </xsd:complexType>
+    </xsd:element>
+  </xsd:schema>
+  <xsd:schema xmlns:xsd="http://www.w3.org/2001/XMLSchema" xmlns:xs="http://www.w3.org/2001/XMLSchema" xmlns:dms="http://schemas.microsoft.com/office/2006/documentManagement/types" xmlns:pc="http://schemas.microsoft.com/office/infopath/2007/PartnerControls" targetNamespace="b7a78d05-72b7-4525-ba4a-dbc395da44c8" elementFormDefault="qualified">
+    <xsd:import namespace="http://schemas.microsoft.com/office/2006/documentManagement/types"/>
+    <xsd:import namespace="http://schemas.microsoft.com/office/infopath/2007/PartnerControls"/>
+    <xsd:element name="SharedWithUsers" ma:index="10" nillable="true" ma:displayName="Shared With" ma:internalName="SharedWithUsers" ma:readOnly="true">
+      <xsd:complexType>
+        <xsd:complexContent>
+          <xsd:extension base="dms:UserMulti">
+            <xsd:sequence>
+              <xsd:element name="UserInfo" minOccurs="0" maxOccurs="unbounded">
+                <xsd:complexType>
+                  <xsd:sequence>
+                    <xsd:element name="DisplayName" type="xsd:string" minOccurs="0"/>
+                    <xsd:element name="AccountId" type="dms:UserId" minOccurs="0" nillable="true"/>
+                    <xsd:element name="AccountType" type="xsd:string" minOccurs="0"/>
+                  </xsd:sequence>
+                </xsd:complexType>
+              </xsd:element>
+            </xsd:sequence>
+          </xsd:extension>
+        </xsd:complexContent>
+      </xsd:complexType>
+    </xsd:element>
+    <xsd:element name="SharedWithDetails" ma:index="11" nillable="true" ma:displayName="Shared With Details" ma:internalName="SharedWithDetails" ma:readOnly="true">
+      <xsd:simpleType>
+        <xsd:restriction base="dms:Note">
+          <xsd:maxLength value="255"/>
+        </xsd:restriction>
+      </xsd:simpleType>
+    </xsd:element>
+  </xsd:schema>
+  <xsd:schema xmlns:xsd="http://www.w3.org/2001/XMLSchema" xmlns:xs="http://www.w3.org/2001/XMLSchema" xmlns:dms="http://schemas.microsoft.com/office/2006/documentManagement/types" xmlns:pc="http://schemas.microsoft.com/office/infopath/2007/PartnerControls" targetNamespace="89ee1cdf-eea7-41b4-be42-a33c70cea0a6" elementFormDefault="qualified">
+    <xsd:import namespace="http://schemas.microsoft.com/office/2006/documentManagement/types"/>
+    <xsd:import namespace="http://schemas.microsoft.com/office/infopath/2007/PartnerControls"/>
+    <xsd:element name="TaxCatchAll" ma:index="20" nillable="true" ma:displayName="Taxonomy Catch All Column" ma:hidden="true" ma:list="{94e7bf1d-f7aa-41ad-8dd3-8737efbb3971}" ma:internalName="TaxCatchAll" ma:showField="CatchAllData" ma:web="b7a78d05-72b7-4525-ba4a-dbc395da44c8">
+      <xsd:complexType>
+        <xsd:complexContent>
+          <xsd:extension base="dms:MultiChoiceLookup">
+            <xsd:sequence>
+              <xsd:element name="Value" type="dms:Lookup" maxOccurs="unbounded" minOccurs="0" nillable="true"/>
+            </xsd:sequence>
+          </xsd:extension>
+        </xsd:complexContent>
+      </xsd:complexType>
+    </xsd:element>
+  </xsd:schema>
+  <xsd:schema xmlns="http://schemas.openxmlformats.org/package/2006/metadata/core-properties" xmlns:xsd="http://www.w3.org/2001/XMLSchema" xmlns:xsi="http://www.w3.org/2001/XMLSchema-instance" xmlns:dc="http://purl.org/dc/elements/1.1/" xmlns:dcterms="http://purl.org/dc/terms/" xmlns:odoc="http://schemas.microsoft.com/internal/obd" targetNamespace="http://schemas.openxmlformats.org/package/2006/metadata/core-properties" elementFormDefault="qualified" attributeFormDefault="unqualified" blockDefault="#all">
+    <xsd:import namespace="http://purl.org/dc/elements/1.1/" schemaLocation="http://dublincore.org/schemas/xmls/qdc/2003/04/02/dc.xsd"/>
+    <xsd:import namespace="http://purl.org/dc/terms/" schemaLocation="http://dublincore.org/schemas/xmls/qdc/2003/04/02/dcterms.xsd"/>
+    <xsd:element name="coreProperties" type="CT_coreProperties"/>
+    <xsd:complexType name="CT_coreProperties">
+      <xsd:all>
+        <xsd:element ref="dc:creator" minOccurs="0" maxOccurs="1"/>
+        <xsd:element ref="dcterms:created" minOccurs="0" maxOccurs="1"/>
+        <xsd:element ref="dc:identifier" minOccurs="0" maxOccurs="1"/>
+        <xsd:element name="contentType" minOccurs="0" maxOccurs="1" type="xsd:string" ma:index="0" ma:displayName="Content Type"/>
+        <xsd:element ref="dc:title" minOccurs="0" maxOccurs="1" ma:index="4" ma:displayName="Title"/>
+        <xsd:element ref="dc:subject" minOccurs="0" maxOccurs="1"/>
+        <xsd:element ref="dc:description" minOccurs="0" maxOccurs="1"/>
+        <xsd:element name="keywords" minOccurs="0" maxOccurs="1" type="xsd:string"/>
+        <xsd:element ref="dc:language" minOccurs="0" maxOccurs="1"/>
+        <xsd:element name="category" minOccurs="0" maxOccurs="1" type="xsd:string"/>
+        <xsd:element name="version" minOccurs="0" maxOccurs="1" type="xsd:string"/>
+        <xsd:element name="revision" minOccurs="0" maxOccurs="1" type="xsd:string">
+          <xsd:annotation>
+            <xsd:documentation>
+                        This value indicates the number of saves or revisions. The application is responsible for updating this value after each revision.
+                    </xsd:documentation>
+          </xsd:annotation>
+        </xsd:element>
+        <xsd:element name="lastModifiedBy" minOccurs="0" maxOccurs="1" type="xsd:string"/>
+        <xsd:element ref="dcterms:modified" minOccurs="0" maxOccurs="1"/>
+        <xsd:element name="contentStatus" minOccurs="0" maxOccurs="1" type="xsd:string"/>
+      </xsd:all>
+    </xsd:complexType>
+  </xsd:schema>
+  <xs:schema xmlns:pc="http://schemas.microsoft.com/office/infopath/2007/PartnerControls" xmlns:xs="http://www.w3.org/2001/XMLSchema" targetNamespace="http://schemas.microsoft.com/office/infopath/2007/PartnerControls" elementFormDefault="qualified" attributeFormDefault="unqualified">
+    <xs:element name="Person">
+      <xs:complexType>
+        <xs:sequence>
+          <xs:element ref="pc:DisplayName" minOccurs="0"/>
+          <xs:element ref="pc:AccountId" minOccurs="0"/>
+          <xs:element ref="pc:AccountType" minOccurs="0"/>
+        </xs:sequence>
+      </xs:complexType>
+    </xs:element>
+    <xs:element name="DisplayName" type="xs:string"/>
+    <xs:element name="AccountId" type="xs:string"/>
+    <xs:element name="AccountType" type="xs:string"/>
+    <xs:element name="BDCAssociatedEntity">
+      <xs:complexType>
+        <xs:sequence>
+          <xs:element ref="pc:BDCEntity" minOccurs="0" maxOccurs="unbounded"/>
+        </xs:sequence>
+        <xs:attribute ref="pc:EntityNamespace"/>
+        <xs:attribute ref="pc:EntityName"/>
+        <xs:attribute ref="pc:SystemInstanceName"/>
+        <xs:attribute ref="pc:AssociationName"/>
+      </xs:complexType>
+    </xs:element>
+    <xs:attribute name="EntityNamespace" type="xs:string"/>
+    <xs:attribute name="EntityName" type="xs:string"/>
+    <xs:attribute name="SystemInstanceName" type="xs:string"/>
+    <xs:attribute name="AssociationName" type="xs:string"/>
+    <xs:element name="BDCEntity">
+      <xs:complexType>
+        <xs:sequence>
+          <xs:element ref="pc:EntityDisplayName" minOccurs="0"/>
+          <xs:element ref="pc:EntityInstanceReference" minOccurs="0"/>
+          <xs:element ref="pc:EntityId1" minOccurs="0"/>
+          <xs:element ref="pc:EntityId2" minOccurs="0"/>
+          <xs:element ref="pc:EntityId3" minOccurs="0"/>
+          <xs:element ref="pc:EntityId4" minOccurs="0"/>
+          <xs:element ref="pc:EntityId5" minOccurs="0"/>
+        </xs:sequence>
+      </xs:complexType>
+    </xs:element>
+    <xs:element name="EntityDisplayName" type="xs:string"/>
+    <xs:element name="EntityInstanceReference" type="xs:string"/>
+    <xs:element name="EntityId1" type="xs:string"/>
+    <xs:element name="EntityId2" type="xs:string"/>
+    <xs:element name="EntityId3" type="xs:string"/>
+    <xs:element name="EntityId4" type="xs:string"/>
+    <xs:element name="EntityId5" type="xs:string"/>
+    <xs:element name="Terms">
+      <xs:complexType>
+        <xs:sequence>
+          <xs:element ref="pc:TermInfo" minOccurs="0" maxOccurs="unbounded"/>
+        </xs:sequence>
+      </xs:complexType>
+    </xs:element>
+    <xs:element name="TermInfo">
+      <xs:complexType>
+        <xs:sequence>
+          <xs:element ref="pc:TermName" minOccurs="0"/>
+          <xs:element ref="pc:TermId" minOccurs="0"/>
+        </xs:sequence>
+      </xs:complexType>
+    </xs:element>
+    <xs:element name="TermName" type="xs:string"/>
+    <xs:element name="TermId" type="xs:string"/>
+  </xs:schema>
+</ct:contentTypeSchema>
+</file>
+
+<file path=customXml/item3.xml><?xml version="1.0" encoding="utf-8"?>
+<?mso-contentType ?>
+<FormTemplates xmlns="http://schemas.microsoft.com/sharepoint/v3/contenttype/forms">
+  <Display>DocumentLibraryForm</Display>
+  <Edit>DocumentLibraryForm</Edit>
+  <New>DocumentLibraryForm</New>
+</FormTemplates>
+</file>
+
+<file path=customXml/itemProps1.xml><?xml version="1.0" encoding="utf-8"?>
+<ds:datastoreItem xmlns:ds="http://schemas.openxmlformats.org/officeDocument/2006/customXml" ds:itemID="{7C91D3B8-4F03-4FDF-B57E-3BBE34C851AE}">
+  <ds:schemaRefs>
+    <ds:schemaRef ds:uri="http://schemas.openxmlformats.org/package/2006/metadata/core-properties"/>
+    <ds:schemaRef ds:uri="http://purl.org/dc/terms/"/>
+    <ds:schemaRef ds:uri="89ee1cdf-eea7-41b4-be42-a33c70cea0a6"/>
+    <ds:schemaRef ds:uri="http://schemas.microsoft.com/office/2006/documentManagement/types"/>
+    <ds:schemaRef ds:uri="b7a78d05-72b7-4525-ba4a-dbc395da44c8"/>
+    <ds:schemaRef ds:uri="http://schemas.microsoft.com/office/infopath/2007/PartnerControls"/>
+    <ds:schemaRef ds:uri="http://purl.org/dc/elements/1.1/"/>
+    <ds:schemaRef ds:uri="http://schemas.microsoft.com/office/2006/metadata/properties"/>
+    <ds:schemaRef ds:uri="f07552dd-1c43-4116-999b-42c9c048e8e7"/>
+    <ds:schemaRef ds:uri="http://www.w3.org/XML/1998/namespace"/>
+    <ds:schemaRef ds:uri="http://purl.org/dc/dcmitype/"/>
+  </ds:schemaRefs>
+</ds:datastoreItem>
+</file>
+
+<file path=customXml/itemProps2.xml><?xml version="1.0" encoding="utf-8"?>
+<ds:datastoreItem xmlns:ds="http://schemas.openxmlformats.org/officeDocument/2006/customXml" ds:itemID="{8E185284-198E-4BA3-B039-3FC04C00F914}">
+  <ds:schemaRefs>
+    <ds:schemaRef ds:uri="89ee1cdf-eea7-41b4-be42-a33c70cea0a6"/>
+    <ds:schemaRef ds:uri="b7a78d05-72b7-4525-ba4a-dbc395da44c8"/>
+    <ds:schemaRef ds:uri="f07552dd-1c43-4116-999b-42c9c048e8e7"/>
+    <ds:schemaRef ds:uri="http://purl.org/dc/elements/1.1/"/>
+    <ds:schemaRef ds:uri="http://purl.org/dc/terms/"/>
+    <ds:schemaRef ds:uri="http://schemas.microsoft.com/internal/obd"/>
+    <ds:schemaRef ds:uri="http://schemas.microsoft.com/office/2006/documentManagement/types"/>
+    <ds:schemaRef ds:uri="http://schemas.microsoft.com/office/2006/metadata/contentType"/>
+    <ds:schemaRef ds:uri="http://schemas.microsoft.com/office/2006/metadata/properties"/>
+    <ds:schemaRef ds:uri="http://schemas.microsoft.com/office/2006/metadata/properties/metaAttributes"/>
+    <ds:schemaRef ds:uri="http://schemas.microsoft.com/office/infopath/2007/PartnerControls"/>
+    <ds:schemaRef ds:uri="http://schemas.openxmlformats.org/package/2006/metadata/core-properties"/>
+    <ds:schemaRef ds:uri="http://www.w3.org/2001/XMLSchema"/>
+  </ds:schemaRefs>
+</ds:datastoreItem>
+</file>
+
+<file path=customXml/itemProps3.xml><?xml version="1.0" encoding="utf-8"?>
+<ds:datastoreItem xmlns:ds="http://schemas.openxmlformats.org/officeDocument/2006/customXml" ds:itemID="{4475C316-DA33-4A45-865B-8D249A4629A4}">
+  <ds:schemaRefs>
+    <ds:schemaRef ds:uri="http://schemas.microsoft.com/sharepoint/v3/contenttype/forms"/>
+  </ds:schemaRefs>
+</ds:datastoreItem>
 </file>
</xml_diff>

<commit_message>
Updated level 2 with a project from another lab, might be correct reference
</commit_message>
<xml_diff>
--- a/General Software Engineering/Levels of Software Projects.pptx
+++ b/General Software Engineering/Levels of Software Projects.pptx
@@ -131,723 +131,12 @@
     <p1510:client id="{082125E5-F61D-4829-9B55-53C54F3237D0}" v="13" dt="2023-02-15T10:55:19.745"/>
     <p1510:client id="{29875D5A-6871-1D66-240D-4D5AB09B6B9A}" v="5" dt="2023-02-16T09:05:07.885"/>
     <p1510:client id="{5EDC057B-B6C5-FC3F-F5E9-55FFC1ED0C5C}" v="16" dt="2023-02-16T09:21:48.449"/>
+    <p1510:client id="{770CE703-0B11-4D8B-A7E3-A0AE25C67DD9}" v="6" dt="2023-03-29T19:53:54.309"/>
     <p1510:client id="{7A2C8AFE-14A3-36FE-EA1E-CFE24650E0FB}" v="115" dt="2023-03-16T13:18:34.413"/>
     <p1510:client id="{A4F7040E-2BF2-62C2-6453-36419E2581B2}" v="3" dt="2023-02-15T13:02:27.843"/>
     <p1510:client id="{C5DEF346-22B5-56BB-18A2-99582CBCA6DE}" v="16" dt="2023-02-16T12:57:34.980"/>
   </p1510:revLst>
 </p1510:revInfo>
-</file>
-
-<file path=ppt/changesInfos/changesInfo1.xml><?xml version="1.0" encoding="utf-8"?>
-<pc:chgInfo xmlns:a="http://schemas.openxmlformats.org/drawingml/2006/main" xmlns:r="http://schemas.openxmlformats.org/officeDocument/2006/relationships" xmlns:ac="http://schemas.microsoft.com/office/drawing/2013/main/command" xmlns:pc="http://schemas.microsoft.com/office/powerpoint/2013/main/command">
-  <pc:docChgLst>
-    <pc:chgData name="Johan van Soest" userId="S::johan.vansoest@maastro.nl::5d43486e-a276-4906-87cf-dbb33a00d581" providerId="AD" clId="Web-{5EDC057B-B6C5-FC3F-F5E9-55FFC1ED0C5C}"/>
-    <pc:docChg chg="mod modSld">
-      <pc:chgData name="Johan van Soest" userId="S::johan.vansoest@maastro.nl::5d43486e-a276-4906-87cf-dbb33a00d581" providerId="AD" clId="Web-{5EDC057B-B6C5-FC3F-F5E9-55FFC1ED0C5C}" dt="2023-02-16T09:21:48.449" v="13"/>
-      <pc:docMkLst>
-        <pc:docMk/>
-      </pc:docMkLst>
-      <pc:sldChg chg="addCm">
-        <pc:chgData name="Johan van Soest" userId="S::johan.vansoest@maastro.nl::5d43486e-a276-4906-87cf-dbb33a00d581" providerId="AD" clId="Web-{5EDC057B-B6C5-FC3F-F5E9-55FFC1ED0C5C}" dt="2023-02-16T09:21:48.449" v="13"/>
-        <pc:sldMkLst>
-          <pc:docMk/>
-          <pc:sldMk cId="2305509078" sldId="257"/>
-        </pc:sldMkLst>
-        <pc:extLst>
-          <p:ext xmlns:p="http://schemas.openxmlformats.org/presentationml/2006/main" uri="{D6D511B9-2390-475A-947B-AFAB55BFBCF1}">
-            <pc226:cmChg xmlns:pc226="http://schemas.microsoft.com/office/powerpoint/2022/06/main/command" chg="add">
-              <pc226:chgData name="Johan van Soest" userId="S::johan.vansoest@maastro.nl::5d43486e-a276-4906-87cf-dbb33a00d581" providerId="AD" clId="Web-{5EDC057B-B6C5-FC3F-F5E9-55FFC1ED0C5C}" dt="2023-02-16T09:21:48.449" v="13"/>
-              <pc2:cmMkLst xmlns:pc2="http://schemas.microsoft.com/office/powerpoint/2019/9/main/command">
-                <pc:docMk/>
-                <pc:sldMk cId="2305509078" sldId="257"/>
-                <pc2:cmMk id="{A59DD9A1-0FBA-41E0-9162-4D0DB987C4FB}"/>
-              </pc2:cmMkLst>
-            </pc226:cmChg>
-          </p:ext>
-        </pc:extLst>
-      </pc:sldChg>
-      <pc:sldChg chg="addCm">
-        <pc:chgData name="Johan van Soest" userId="S::johan.vansoest@maastro.nl::5d43486e-a276-4906-87cf-dbb33a00d581" providerId="AD" clId="Web-{5EDC057B-B6C5-FC3F-F5E9-55FFC1ED0C5C}" dt="2023-02-16T09:17:40.956" v="1"/>
-        <pc:sldMkLst>
-          <pc:docMk/>
-          <pc:sldMk cId="2730087503" sldId="259"/>
-        </pc:sldMkLst>
-        <pc:extLst>
-          <p:ext xmlns:p="http://schemas.openxmlformats.org/presentationml/2006/main" uri="{D6D511B9-2390-475A-947B-AFAB55BFBCF1}">
-            <pc226:cmChg xmlns:pc226="http://schemas.microsoft.com/office/powerpoint/2022/06/main/command" chg="add">
-              <pc226:chgData name="Johan van Soest" userId="S::johan.vansoest@maastro.nl::5d43486e-a276-4906-87cf-dbb33a00d581" providerId="AD" clId="Web-{5EDC057B-B6C5-FC3F-F5E9-55FFC1ED0C5C}" dt="2023-02-16T09:17:40.956" v="1"/>
-              <pc2:cmMkLst xmlns:pc2="http://schemas.microsoft.com/office/powerpoint/2019/9/main/command">
-                <pc:docMk/>
-                <pc:sldMk cId="2730087503" sldId="259"/>
-                <pc2:cmMk id="{330C25A0-FB7F-4192-9E8E-27888CA86C48}"/>
-              </pc2:cmMkLst>
-            </pc226:cmChg>
-          </p:ext>
-        </pc:extLst>
-      </pc:sldChg>
-      <pc:sldChg chg="modSp addCm">
-        <pc:chgData name="Johan van Soest" userId="S::johan.vansoest@maastro.nl::5d43486e-a276-4906-87cf-dbb33a00d581" providerId="AD" clId="Web-{5EDC057B-B6C5-FC3F-F5E9-55FFC1ED0C5C}" dt="2023-02-16T09:19:15.163" v="7" actId="20577"/>
-        <pc:sldMkLst>
-          <pc:docMk/>
-          <pc:sldMk cId="3421541061" sldId="260"/>
-        </pc:sldMkLst>
-        <pc:spChg chg="mod">
-          <ac:chgData name="Johan van Soest" userId="S::johan.vansoest@maastro.nl::5d43486e-a276-4906-87cf-dbb33a00d581" providerId="AD" clId="Web-{5EDC057B-B6C5-FC3F-F5E9-55FFC1ED0C5C}" dt="2023-02-16T09:19:15.163" v="7" actId="20577"/>
-          <ac:spMkLst>
-            <pc:docMk/>
-            <pc:sldMk cId="3421541061" sldId="260"/>
-            <ac:spMk id="2" creationId="{00000000-0000-0000-0000-000000000000}"/>
-          </ac:spMkLst>
-        </pc:spChg>
-        <pc:extLst>
-          <p:ext xmlns:p="http://schemas.openxmlformats.org/presentationml/2006/main" uri="{D6D511B9-2390-475A-947B-AFAB55BFBCF1}">
-            <pc226:cmChg xmlns:pc226="http://schemas.microsoft.com/office/powerpoint/2022/06/main/command" chg="add">
-              <pc226:chgData name="Johan van Soest" userId="S::johan.vansoest@maastro.nl::5d43486e-a276-4906-87cf-dbb33a00d581" providerId="AD" clId="Web-{5EDC057B-B6C5-FC3F-F5E9-55FFC1ED0C5C}" dt="2023-02-16T09:19:07.600" v="2"/>
-              <pc2:cmMkLst xmlns:pc2="http://schemas.microsoft.com/office/powerpoint/2019/9/main/command">
-                <pc:docMk/>
-                <pc:sldMk cId="3421541061" sldId="260"/>
-                <pc2:cmMk id="{67D22CE5-C95A-4416-AE42-0F85FF62E748}"/>
-              </pc2:cmMkLst>
-            </pc226:cmChg>
-          </p:ext>
-        </pc:extLst>
-      </pc:sldChg>
-      <pc:sldChg chg="modSp addCm modCm">
-        <pc:chgData name="Johan van Soest" userId="S::johan.vansoest@maastro.nl::5d43486e-a276-4906-87cf-dbb33a00d581" providerId="AD" clId="Web-{5EDC057B-B6C5-FC3F-F5E9-55FFC1ED0C5C}" dt="2023-02-16T09:21:00.432" v="12"/>
-        <pc:sldMkLst>
-          <pc:docMk/>
-          <pc:sldMk cId="26091957" sldId="261"/>
-        </pc:sldMkLst>
-        <pc:spChg chg="mod">
-          <ac:chgData name="Johan van Soest" userId="S::johan.vansoest@maastro.nl::5d43486e-a276-4906-87cf-dbb33a00d581" providerId="AD" clId="Web-{5EDC057B-B6C5-FC3F-F5E9-55FFC1ED0C5C}" dt="2023-02-16T09:19:24.444" v="10" actId="20577"/>
-          <ac:spMkLst>
-            <pc:docMk/>
-            <pc:sldMk cId="26091957" sldId="261"/>
-            <ac:spMk id="2" creationId="{00000000-0000-0000-0000-000000000000}"/>
-          </ac:spMkLst>
-        </pc:spChg>
-        <pc:extLst>
-          <p:ext xmlns:p="http://schemas.openxmlformats.org/presentationml/2006/main" uri="{D6D511B9-2390-475A-947B-AFAB55BFBCF1}">
-            <pc226:cmChg xmlns:pc226="http://schemas.microsoft.com/office/powerpoint/2022/06/main/command" chg="add">
-              <pc226:chgData name="Johan van Soest" userId="S::johan.vansoest@maastro.nl::5d43486e-a276-4906-87cf-dbb33a00d581" providerId="AD" clId="Web-{5EDC057B-B6C5-FC3F-F5E9-55FFC1ED0C5C}" dt="2023-02-16T09:21:00.432" v="12"/>
-              <pc2:cmMkLst xmlns:pc2="http://schemas.microsoft.com/office/powerpoint/2019/9/main/command">
-                <pc:docMk/>
-                <pc:sldMk cId="26091957" sldId="261"/>
-                <pc2:cmMk id="{0E4B270B-6710-4613-A942-E3E86E83C36E}"/>
-              </pc2:cmMkLst>
-              <pc226:cmRplyChg chg="add">
-                <pc226:chgData name="Johan van Soest" userId="S::johan.vansoest@maastro.nl::5d43486e-a276-4906-87cf-dbb33a00d581" providerId="AD" clId="Web-{5EDC057B-B6C5-FC3F-F5E9-55FFC1ED0C5C}" dt="2023-02-16T09:21:00.432" v="12"/>
-                <pc2:cmRplyMkLst xmlns:pc2="http://schemas.microsoft.com/office/powerpoint/2019/9/main/command">
-                  <pc:docMk/>
-                  <pc:sldMk cId="26091957" sldId="261"/>
-                  <pc2:cmMk id="{0E4B270B-6710-4613-A942-E3E86E83C36E}"/>
-                  <pc2:cmRplyMk id="{2428F1D2-D677-46C5-BA98-4F9EFAD660E0}"/>
-                </pc2:cmRplyMkLst>
-              </pc226:cmRplyChg>
-            </pc226:cmChg>
-          </p:ext>
-        </pc:extLst>
-      </pc:sldChg>
-    </pc:docChg>
-  </pc:docChgLst>
-  <pc:docChgLst>
-    <pc:chgData name="Aiara Lobo Gomes" userId="S::aiara.lobogomes@maastro.nl::ea21328a-303d-4bcd-846f-41db275cad9a" providerId="AD" clId="Web-{082125E5-F61D-4829-9B55-53C54F3237D0}"/>
-    <pc:docChg chg="mod modSld">
-      <pc:chgData name="Aiara Lobo Gomes" userId="S::aiara.lobogomes@maastro.nl::ea21328a-303d-4bcd-846f-41db275cad9a" providerId="AD" clId="Web-{082125E5-F61D-4829-9B55-53C54F3237D0}" dt="2023-02-15T10:55:19.417" v="44" actId="20577"/>
-      <pc:docMkLst>
-        <pc:docMk/>
-      </pc:docMkLst>
-      <pc:sldChg chg="addCm">
-        <pc:chgData name="Aiara Lobo Gomes" userId="S::aiara.lobogomes@maastro.nl::ea21328a-303d-4bcd-846f-41db275cad9a" providerId="AD" clId="Web-{082125E5-F61D-4829-9B55-53C54F3237D0}" dt="2023-02-15T10:48:42.810" v="1"/>
-        <pc:sldMkLst>
-          <pc:docMk/>
-          <pc:sldMk cId="2430399406" sldId="258"/>
-        </pc:sldMkLst>
-        <pc:extLst>
-          <p:ext xmlns:p="http://schemas.openxmlformats.org/presentationml/2006/main" uri="{D6D511B9-2390-475A-947B-AFAB55BFBCF1}">
-            <pc226:cmChg xmlns:pc226="http://schemas.microsoft.com/office/powerpoint/2022/06/main/command" chg="add">
-              <pc226:chgData name="Aiara Lobo Gomes" userId="S::aiara.lobogomes@maastro.nl::ea21328a-303d-4bcd-846f-41db275cad9a" providerId="AD" clId="Web-{082125E5-F61D-4829-9B55-53C54F3237D0}" dt="2023-02-15T10:48:42.810" v="1"/>
-              <pc2:cmMkLst xmlns:pc2="http://schemas.microsoft.com/office/powerpoint/2019/9/main/command">
-                <pc:docMk/>
-                <pc:sldMk cId="2430399406" sldId="258"/>
-                <pc2:cmMk id="{FA93F46C-F03A-437B-883A-E9DFE763400E}"/>
-              </pc2:cmMkLst>
-            </pc226:cmChg>
-          </p:ext>
-        </pc:extLst>
-      </pc:sldChg>
-      <pc:sldChg chg="modSp addCm modCm">
-        <pc:chgData name="Aiara Lobo Gomes" userId="S::aiara.lobogomes@maastro.nl::ea21328a-303d-4bcd-846f-41db275cad9a" providerId="AD" clId="Web-{082125E5-F61D-4829-9B55-53C54F3237D0}" dt="2023-02-15T10:52:10.004" v="20" actId="20577"/>
-        <pc:sldMkLst>
-          <pc:docMk/>
-          <pc:sldMk cId="2730087503" sldId="259"/>
-        </pc:sldMkLst>
-        <pc:spChg chg="mod">
-          <ac:chgData name="Aiara Lobo Gomes" userId="S::aiara.lobogomes@maastro.nl::ea21328a-303d-4bcd-846f-41db275cad9a" providerId="AD" clId="Web-{082125E5-F61D-4829-9B55-53C54F3237D0}" dt="2023-02-15T10:52:10.004" v="20" actId="20577"/>
-          <ac:spMkLst>
-            <pc:docMk/>
-            <pc:sldMk cId="2730087503" sldId="259"/>
-            <ac:spMk id="3" creationId="{00000000-0000-0000-0000-000000000000}"/>
-          </ac:spMkLst>
-        </pc:spChg>
-        <pc:extLst>
-          <p:ext xmlns:p="http://schemas.openxmlformats.org/presentationml/2006/main" uri="{D6D511B9-2390-475A-947B-AFAB55BFBCF1}">
-            <pc226:cmChg xmlns:pc226="http://schemas.microsoft.com/office/powerpoint/2022/06/main/command" chg="add mod">
-              <pc226:chgData name="Aiara Lobo Gomes" userId="S::aiara.lobogomes@maastro.nl::ea21328a-303d-4bcd-846f-41db275cad9a" providerId="AD" clId="Web-{082125E5-F61D-4829-9B55-53C54F3237D0}" dt="2023-02-15T10:52:05.207" v="19" actId="20577"/>
-              <pc2:cmMkLst xmlns:pc2="http://schemas.microsoft.com/office/powerpoint/2019/9/main/command">
-                <pc:docMk/>
-                <pc:sldMk cId="2730087503" sldId="259"/>
-                <pc2:cmMk id="{CC0D42B8-4CC3-442F-AA6C-5448F5A07969}"/>
-              </pc2:cmMkLst>
-            </pc226:cmChg>
-          </p:ext>
-        </pc:extLst>
-      </pc:sldChg>
-      <pc:sldChg chg="modSp addCm modCm">
-        <pc:chgData name="Aiara Lobo Gomes" userId="S::aiara.lobogomes@maastro.nl::ea21328a-303d-4bcd-846f-41db275cad9a" providerId="AD" clId="Web-{082125E5-F61D-4829-9B55-53C54F3237D0}" dt="2023-02-15T10:54:00.836" v="40" actId="20577"/>
-        <pc:sldMkLst>
-          <pc:docMk/>
-          <pc:sldMk cId="3421541061" sldId="260"/>
-        </pc:sldMkLst>
-        <pc:spChg chg="mod">
-          <ac:chgData name="Aiara Lobo Gomes" userId="S::aiara.lobogomes@maastro.nl::ea21328a-303d-4bcd-846f-41db275cad9a" providerId="AD" clId="Web-{082125E5-F61D-4829-9B55-53C54F3237D0}" dt="2023-02-15T10:54:00.836" v="40" actId="20577"/>
-          <ac:spMkLst>
-            <pc:docMk/>
-            <pc:sldMk cId="3421541061" sldId="260"/>
-            <ac:spMk id="3" creationId="{00000000-0000-0000-0000-000000000000}"/>
-          </ac:spMkLst>
-        </pc:spChg>
-        <pc:extLst>
-          <p:ext xmlns:p="http://schemas.openxmlformats.org/presentationml/2006/main" uri="{D6D511B9-2390-475A-947B-AFAB55BFBCF1}">
-            <pc226:cmChg xmlns:pc226="http://schemas.microsoft.com/office/powerpoint/2022/06/main/command" chg="add mod">
-              <pc226:chgData name="Aiara Lobo Gomes" userId="S::aiara.lobogomes@maastro.nl::ea21328a-303d-4bcd-846f-41db275cad9a" providerId="AD" clId="Web-{082125E5-F61D-4829-9B55-53C54F3237D0}" dt="2023-02-15T10:53:59.602" v="39" actId="20577"/>
-              <pc2:cmMkLst xmlns:pc2="http://schemas.microsoft.com/office/powerpoint/2019/9/main/command">
-                <pc:docMk/>
-                <pc:sldMk cId="3421541061" sldId="260"/>
-                <pc2:cmMk id="{ABCC8D7C-2BFC-4A01-B73D-5B468B13EA2D}"/>
-              </pc2:cmMkLst>
-            </pc226:cmChg>
-          </p:ext>
-        </pc:extLst>
-      </pc:sldChg>
-      <pc:sldChg chg="modSp">
-        <pc:chgData name="Aiara Lobo Gomes" userId="S::aiara.lobogomes@maastro.nl::ea21328a-303d-4bcd-846f-41db275cad9a" providerId="AD" clId="Web-{082125E5-F61D-4829-9B55-53C54F3237D0}" dt="2023-02-15T10:55:19.417" v="44" actId="20577"/>
-        <pc:sldMkLst>
-          <pc:docMk/>
-          <pc:sldMk cId="26091957" sldId="261"/>
-        </pc:sldMkLst>
-        <pc:spChg chg="mod">
-          <ac:chgData name="Aiara Lobo Gomes" userId="S::aiara.lobogomes@maastro.nl::ea21328a-303d-4bcd-846f-41db275cad9a" providerId="AD" clId="Web-{082125E5-F61D-4829-9B55-53C54F3237D0}" dt="2023-02-15T10:55:19.417" v="44" actId="20577"/>
-          <ac:spMkLst>
-            <pc:docMk/>
-            <pc:sldMk cId="26091957" sldId="261"/>
-            <ac:spMk id="3" creationId="{00000000-0000-0000-0000-000000000000}"/>
-          </ac:spMkLst>
-        </pc:spChg>
-      </pc:sldChg>
-    </pc:docChg>
-  </pc:docChgLst>
-  <pc:docChgLst>
-    <pc:chgData name="Ralph Brecheisen" userId="S::ralph.brecheisen@maastro.nl::f298dded-971f-4e96-9402-5708bf72887d" providerId="AD" clId="Web-{29875D5A-6871-1D66-240D-4D5AB09B6B9A}"/>
-    <pc:docChg chg="mod">
-      <pc:chgData name="Ralph Brecheisen" userId="S::ralph.brecheisen@maastro.nl::f298dded-971f-4e96-9402-5708bf72887d" providerId="AD" clId="Web-{29875D5A-6871-1D66-240D-4D5AB09B6B9A}" dt="2023-02-16T09:05:07.885" v="4"/>
-      <pc:docMkLst>
-        <pc:docMk/>
-      </pc:docMkLst>
-      <pc:sldChg chg="modCm">
-        <pc:chgData name="Ralph Brecheisen" userId="S::ralph.brecheisen@maastro.nl::f298dded-971f-4e96-9402-5708bf72887d" providerId="AD" clId="Web-{29875D5A-6871-1D66-240D-4D5AB09B6B9A}" dt="2023-02-16T08:27:21.209" v="3"/>
-        <pc:sldMkLst>
-          <pc:docMk/>
-          <pc:sldMk cId="2430399406" sldId="258"/>
-        </pc:sldMkLst>
-        <pc:extLst>
-          <p:ext xmlns:p="http://schemas.openxmlformats.org/presentationml/2006/main" uri="{D6D511B9-2390-475A-947B-AFAB55BFBCF1}">
-            <pc226:cmChg xmlns:pc226="http://schemas.microsoft.com/office/powerpoint/2022/06/main/command" chg="">
-              <pc226:chgData name="Ralph Brecheisen" userId="S::ralph.brecheisen@maastro.nl::f298dded-971f-4e96-9402-5708bf72887d" providerId="AD" clId="Web-{29875D5A-6871-1D66-240D-4D5AB09B6B9A}" dt="2023-02-16T08:27:21.209" v="3"/>
-              <pc2:cmMkLst xmlns:pc2="http://schemas.microsoft.com/office/powerpoint/2019/9/main/command">
-                <pc:docMk/>
-                <pc:sldMk cId="2430399406" sldId="258"/>
-                <pc2:cmMk id="{FA93F46C-F03A-437B-883A-E9DFE763400E}"/>
-              </pc2:cmMkLst>
-              <pc226:cmRplyChg chg="add">
-                <pc226:chgData name="Ralph Brecheisen" userId="S::ralph.brecheisen@maastro.nl::f298dded-971f-4e96-9402-5708bf72887d" providerId="AD" clId="Web-{29875D5A-6871-1D66-240D-4D5AB09B6B9A}" dt="2023-02-16T08:20:31.853" v="1"/>
-                <pc2:cmRplyMkLst xmlns:pc2="http://schemas.microsoft.com/office/powerpoint/2019/9/main/command">
-                  <pc:docMk/>
-                  <pc:sldMk cId="2430399406" sldId="258"/>
-                  <pc2:cmMk id="{FA93F46C-F03A-437B-883A-E9DFE763400E}"/>
-                  <pc2:cmRplyMk id="{2FE12924-1353-4B62-A47E-831DDDB87C17}"/>
-                </pc2:cmRplyMkLst>
-              </pc226:cmRplyChg>
-              <pc226:cmRplyChg chg="add">
-                <pc226:chgData name="Ralph Brecheisen" userId="S::ralph.brecheisen@maastro.nl::f298dded-971f-4e96-9402-5708bf72887d" providerId="AD" clId="Web-{29875D5A-6871-1D66-240D-4D5AB09B6B9A}" dt="2023-02-16T08:27:21.209" v="3"/>
-                <pc2:cmRplyMkLst xmlns:pc2="http://schemas.microsoft.com/office/powerpoint/2019/9/main/command">
-                  <pc:docMk/>
-                  <pc:sldMk cId="2430399406" sldId="258"/>
-                  <pc2:cmMk id="{FA93F46C-F03A-437B-883A-E9DFE763400E}"/>
-                  <pc2:cmRplyMk id="{7A955960-8845-4E97-B9AB-DB4A86861C9D}"/>
-                </pc2:cmRplyMkLst>
-              </pc226:cmRplyChg>
-            </pc226:cmChg>
-          </p:ext>
-        </pc:extLst>
-      </pc:sldChg>
-      <pc:sldChg chg="modCm">
-        <pc:chgData name="Ralph Brecheisen" userId="S::ralph.brecheisen@maastro.nl::f298dded-971f-4e96-9402-5708bf72887d" providerId="AD" clId="Web-{29875D5A-6871-1D66-240D-4D5AB09B6B9A}" dt="2023-02-16T08:25:03.065" v="2"/>
-        <pc:sldMkLst>
-          <pc:docMk/>
-          <pc:sldMk cId="2730087503" sldId="259"/>
-        </pc:sldMkLst>
-        <pc:extLst>
-          <p:ext xmlns:p="http://schemas.openxmlformats.org/presentationml/2006/main" uri="{D6D511B9-2390-475A-947B-AFAB55BFBCF1}">
-            <pc226:cmChg xmlns:pc226="http://schemas.microsoft.com/office/powerpoint/2022/06/main/command" chg="">
-              <pc226:chgData name="Ralph Brecheisen" userId="S::ralph.brecheisen@maastro.nl::f298dded-971f-4e96-9402-5708bf72887d" providerId="AD" clId="Web-{29875D5A-6871-1D66-240D-4D5AB09B6B9A}" dt="2023-02-16T08:25:03.065" v="2"/>
-              <pc2:cmMkLst xmlns:pc2="http://schemas.microsoft.com/office/powerpoint/2019/9/main/command">
-                <pc:docMk/>
-                <pc:sldMk cId="2730087503" sldId="259"/>
-                <pc2:cmMk id="{CC0D42B8-4CC3-442F-AA6C-5448F5A07969}"/>
-              </pc2:cmMkLst>
-              <pc226:cmRplyChg chg="add">
-                <pc226:chgData name="Ralph Brecheisen" userId="S::ralph.brecheisen@maastro.nl::f298dded-971f-4e96-9402-5708bf72887d" providerId="AD" clId="Web-{29875D5A-6871-1D66-240D-4D5AB09B6B9A}" dt="2023-02-16T08:25:03.065" v="2"/>
-                <pc2:cmRplyMkLst xmlns:pc2="http://schemas.microsoft.com/office/powerpoint/2019/9/main/command">
-                  <pc:docMk/>
-                  <pc:sldMk cId="2730087503" sldId="259"/>
-                  <pc2:cmMk id="{CC0D42B8-4CC3-442F-AA6C-5448F5A07969}"/>
-                  <pc2:cmRplyMk id="{01D9701E-6032-4176-98C6-891EB8765AD1}"/>
-                </pc2:cmRplyMkLst>
-              </pc226:cmRplyChg>
-            </pc226:cmChg>
-          </p:ext>
-        </pc:extLst>
-      </pc:sldChg>
-      <pc:sldChg chg="addCm">
-        <pc:chgData name="Ralph Brecheisen" userId="S::ralph.brecheisen@maastro.nl::f298dded-971f-4e96-9402-5708bf72887d" providerId="AD" clId="Web-{29875D5A-6871-1D66-240D-4D5AB09B6B9A}" dt="2023-02-16T09:05:07.885" v="4"/>
-        <pc:sldMkLst>
-          <pc:docMk/>
-          <pc:sldMk cId="26091957" sldId="261"/>
-        </pc:sldMkLst>
-        <pc:extLst>
-          <p:ext xmlns:p="http://schemas.openxmlformats.org/presentationml/2006/main" uri="{D6D511B9-2390-475A-947B-AFAB55BFBCF1}">
-            <pc226:cmChg xmlns:pc226="http://schemas.microsoft.com/office/powerpoint/2022/06/main/command" chg="add">
-              <pc226:chgData name="Ralph Brecheisen" userId="S::ralph.brecheisen@maastro.nl::f298dded-971f-4e96-9402-5708bf72887d" providerId="AD" clId="Web-{29875D5A-6871-1D66-240D-4D5AB09B6B9A}" dt="2023-02-16T09:05:07.885" v="4"/>
-              <pc2:cmMkLst xmlns:pc2="http://schemas.microsoft.com/office/powerpoint/2019/9/main/command">
-                <pc:docMk/>
-                <pc:sldMk cId="26091957" sldId="261"/>
-                <pc2:cmMk id="{F6F54081-1CF3-4166-B33C-D0C7286F711A}"/>
-              </pc2:cmMkLst>
-            </pc226:cmChg>
-          </p:ext>
-        </pc:extLst>
-      </pc:sldChg>
-    </pc:docChg>
-  </pc:docChgLst>
-  <pc:docChgLst>
-    <pc:chgData name="Florian van Daalen" userId="S::florian.vandaalen@maastro.nl::1ac26d17-1f5c-4d44-b06d-8bd5da1f8df2" providerId="AD" clId="Web-{A4F7040E-2BF2-62C2-6453-36419E2581B2}"/>
-    <pc:docChg chg="mod">
-      <pc:chgData name="Florian van Daalen" userId="S::florian.vandaalen@maastro.nl::1ac26d17-1f5c-4d44-b06d-8bd5da1f8df2" providerId="AD" clId="Web-{A4F7040E-2BF2-62C2-6453-36419E2581B2}" dt="2023-02-15T13:02:27.843" v="2"/>
-      <pc:docMkLst>
-        <pc:docMk/>
-      </pc:docMkLst>
-      <pc:sldChg chg="modCm">
-        <pc:chgData name="Florian van Daalen" userId="S::florian.vandaalen@maastro.nl::1ac26d17-1f5c-4d44-b06d-8bd5da1f8df2" providerId="AD" clId="Web-{A4F7040E-2BF2-62C2-6453-36419E2581B2}" dt="2023-02-15T13:00:45.386" v="1"/>
-        <pc:sldMkLst>
-          <pc:docMk/>
-          <pc:sldMk cId="2730087503" sldId="259"/>
-        </pc:sldMkLst>
-        <pc:extLst>
-          <p:ext xmlns:p="http://schemas.openxmlformats.org/presentationml/2006/main" uri="{D6D511B9-2390-475A-947B-AFAB55BFBCF1}">
-            <pc226:cmChg xmlns:pc226="http://schemas.microsoft.com/office/powerpoint/2022/06/main/command" chg="">
-              <pc226:chgData name="Florian van Daalen" userId="S::florian.vandaalen@maastro.nl::1ac26d17-1f5c-4d44-b06d-8bd5da1f8df2" providerId="AD" clId="Web-{A4F7040E-2BF2-62C2-6453-36419E2581B2}" dt="2023-02-15T13:00:45.386" v="1"/>
-              <pc2:cmMkLst xmlns:pc2="http://schemas.microsoft.com/office/powerpoint/2019/9/main/command">
-                <pc:docMk/>
-                <pc:sldMk cId="2730087503" sldId="259"/>
-                <pc2:cmMk id="{CC0D42B8-4CC3-442F-AA6C-5448F5A07969}"/>
-              </pc2:cmMkLst>
-              <pc226:cmRplyChg chg="add">
-                <pc226:chgData name="Florian van Daalen" userId="S::florian.vandaalen@maastro.nl::1ac26d17-1f5c-4d44-b06d-8bd5da1f8df2" providerId="AD" clId="Web-{A4F7040E-2BF2-62C2-6453-36419E2581B2}" dt="2023-02-15T13:00:45.386" v="1"/>
-                <pc2:cmRplyMkLst xmlns:pc2="http://schemas.microsoft.com/office/powerpoint/2019/9/main/command">
-                  <pc:docMk/>
-                  <pc:sldMk cId="2730087503" sldId="259"/>
-                  <pc2:cmMk id="{CC0D42B8-4CC3-442F-AA6C-5448F5A07969}"/>
-                  <pc2:cmRplyMk id="{D40FB1D2-1021-44EA-9928-9E2ABBE53303}"/>
-                </pc2:cmRplyMkLst>
-              </pc226:cmRplyChg>
-            </pc226:cmChg>
-          </p:ext>
-        </pc:extLst>
-      </pc:sldChg>
-      <pc:sldChg chg="modCm">
-        <pc:chgData name="Florian van Daalen" userId="S::florian.vandaalen@maastro.nl::1ac26d17-1f5c-4d44-b06d-8bd5da1f8df2" providerId="AD" clId="Web-{A4F7040E-2BF2-62C2-6453-36419E2581B2}" dt="2023-02-15T13:02:27.843" v="2"/>
-        <pc:sldMkLst>
-          <pc:docMk/>
-          <pc:sldMk cId="3421541061" sldId="260"/>
-        </pc:sldMkLst>
-        <pc:extLst>
-          <p:ext xmlns:p="http://schemas.openxmlformats.org/presentationml/2006/main" uri="{D6D511B9-2390-475A-947B-AFAB55BFBCF1}">
-            <pc226:cmChg xmlns:pc226="http://schemas.microsoft.com/office/powerpoint/2022/06/main/command" chg="">
-              <pc226:chgData name="Florian van Daalen" userId="S::florian.vandaalen@maastro.nl::1ac26d17-1f5c-4d44-b06d-8bd5da1f8df2" providerId="AD" clId="Web-{A4F7040E-2BF2-62C2-6453-36419E2581B2}" dt="2023-02-15T13:02:27.843" v="2"/>
-              <pc2:cmMkLst xmlns:pc2="http://schemas.microsoft.com/office/powerpoint/2019/9/main/command">
-                <pc:docMk/>
-                <pc:sldMk cId="3421541061" sldId="260"/>
-                <pc2:cmMk id="{ABCC8D7C-2BFC-4A01-B73D-5B468B13EA2D}"/>
-              </pc2:cmMkLst>
-              <pc226:cmRplyChg chg="add">
-                <pc226:chgData name="Florian van Daalen" userId="S::florian.vandaalen@maastro.nl::1ac26d17-1f5c-4d44-b06d-8bd5da1f8df2" providerId="AD" clId="Web-{A4F7040E-2BF2-62C2-6453-36419E2581B2}" dt="2023-02-15T13:02:27.843" v="2"/>
-                <pc2:cmRplyMkLst xmlns:pc2="http://schemas.microsoft.com/office/powerpoint/2019/9/main/command">
-                  <pc:docMk/>
-                  <pc:sldMk cId="3421541061" sldId="260"/>
-                  <pc2:cmMk id="{ABCC8D7C-2BFC-4A01-B73D-5B468B13EA2D}"/>
-                  <pc2:cmRplyMk id="{EEEB32D1-EF61-4177-B7D8-FA7C651570EA}"/>
-                </pc2:cmRplyMkLst>
-              </pc226:cmRplyChg>
-            </pc226:cmChg>
-          </p:ext>
-        </pc:extLst>
-      </pc:sldChg>
-    </pc:docChg>
-  </pc:docChgLst>
-  <pc:docChgLst>
-    <pc:chgData name="Florian van Daalen" userId="S::florian.vandaalen@maastro.nl::1ac26d17-1f5c-4d44-b06d-8bd5da1f8df2" providerId="AD" clId="Web-{7A2C8AFE-14A3-36FE-EA1E-CFE24650E0FB}"/>
-    <pc:docChg chg="addSld delSld modSld">
-      <pc:chgData name="Florian van Daalen" userId="S::florian.vandaalen@maastro.nl::1ac26d17-1f5c-4d44-b06d-8bd5da1f8df2" providerId="AD" clId="Web-{7A2C8AFE-14A3-36FE-EA1E-CFE24650E0FB}" dt="2023-03-16T13:18:33.257" v="694" actId="20577"/>
-      <pc:docMkLst>
-        <pc:docMk/>
-      </pc:docMkLst>
-      <pc:sldChg chg="del">
-        <pc:chgData name="Florian van Daalen" userId="S::florian.vandaalen@maastro.nl::1ac26d17-1f5c-4d44-b06d-8bd5da1f8df2" providerId="AD" clId="Web-{7A2C8AFE-14A3-36FE-EA1E-CFE24650E0FB}" dt="2023-03-16T13:06:08.941" v="95"/>
-        <pc:sldMkLst>
-          <pc:docMk/>
-          <pc:sldMk cId="2305509078" sldId="257"/>
-        </pc:sldMkLst>
-      </pc:sldChg>
-      <pc:sldChg chg="modSp addCm delCm modCm">
-        <pc:chgData name="Florian van Daalen" userId="S::florian.vandaalen@maastro.nl::1ac26d17-1f5c-4d44-b06d-8bd5da1f8df2" providerId="AD" clId="Web-{7A2C8AFE-14A3-36FE-EA1E-CFE24650E0FB}" dt="2023-03-16T13:16:33.939" v="547" actId="20577"/>
-        <pc:sldMkLst>
-          <pc:docMk/>
-          <pc:sldMk cId="2430399406" sldId="258"/>
-        </pc:sldMkLst>
-        <pc:spChg chg="mod">
-          <ac:chgData name="Florian van Daalen" userId="S::florian.vandaalen@maastro.nl::1ac26d17-1f5c-4d44-b06d-8bd5da1f8df2" providerId="AD" clId="Web-{7A2C8AFE-14A3-36FE-EA1E-CFE24650E0FB}" dt="2023-03-16T13:16:33.939" v="547" actId="20577"/>
-          <ac:spMkLst>
-            <pc:docMk/>
-            <pc:sldMk cId="2430399406" sldId="258"/>
-            <ac:spMk id="3" creationId="{00000000-0000-0000-0000-000000000000}"/>
-          </ac:spMkLst>
-        </pc:spChg>
-        <pc:extLst>
-          <p:ext xmlns:p="http://schemas.openxmlformats.org/presentationml/2006/main" uri="{D6D511B9-2390-475A-947B-AFAB55BFBCF1}">
-            <pc226:cmChg xmlns:pc226="http://schemas.microsoft.com/office/powerpoint/2022/06/main/command" chg="add del mod">
-              <pc226:chgData name="Florian van Daalen" userId="S::florian.vandaalen@maastro.nl::1ac26d17-1f5c-4d44-b06d-8bd5da1f8df2" providerId="AD" clId="Web-{7A2C8AFE-14A3-36FE-EA1E-CFE24650E0FB}" dt="2023-03-16T13:16:18.485" v="545" actId="20577"/>
-              <pc2:cmMkLst xmlns:pc2="http://schemas.microsoft.com/office/powerpoint/2019/9/main/command">
-                <pc:docMk/>
-                <pc:sldMk cId="2430399406" sldId="258"/>
-                <pc2:cmMk id="{FA93F46C-F03A-437B-883A-E9DFE763400E}"/>
-              </pc2:cmMkLst>
-            </pc226:cmChg>
-          </p:ext>
-        </pc:extLst>
-      </pc:sldChg>
-      <pc:sldChg chg="add del">
-        <pc:chgData name="Florian van Daalen" userId="S::florian.vandaalen@maastro.nl::1ac26d17-1f5c-4d44-b06d-8bd5da1f8df2" providerId="AD" clId="Web-{7A2C8AFE-14A3-36FE-EA1E-CFE24650E0FB}" dt="2023-03-16T13:03:31.699" v="92"/>
-        <pc:sldMkLst>
-          <pc:docMk/>
-          <pc:sldMk cId="2730087503" sldId="259"/>
-        </pc:sldMkLst>
-      </pc:sldChg>
-      <pc:sldChg chg="modSp addCm delCm modCm">
-        <pc:chgData name="Florian van Daalen" userId="S::florian.vandaalen@maastro.nl::1ac26d17-1f5c-4d44-b06d-8bd5da1f8df2" providerId="AD" clId="Web-{7A2C8AFE-14A3-36FE-EA1E-CFE24650E0FB}" dt="2023-03-16T13:17:56.349" v="650" actId="20577"/>
-        <pc:sldMkLst>
-          <pc:docMk/>
-          <pc:sldMk cId="3421541061" sldId="260"/>
-        </pc:sldMkLst>
-        <pc:spChg chg="mod">
-          <ac:chgData name="Florian van Daalen" userId="S::florian.vandaalen@maastro.nl::1ac26d17-1f5c-4d44-b06d-8bd5da1f8df2" providerId="AD" clId="Web-{7A2C8AFE-14A3-36FE-EA1E-CFE24650E0FB}" dt="2023-03-16T13:10:29.969" v="313" actId="20577"/>
-          <ac:spMkLst>
-            <pc:docMk/>
-            <pc:sldMk cId="3421541061" sldId="260"/>
-            <ac:spMk id="2" creationId="{00000000-0000-0000-0000-000000000000}"/>
-          </ac:spMkLst>
-        </pc:spChg>
-        <pc:spChg chg="mod">
-          <ac:chgData name="Florian van Daalen" userId="S::florian.vandaalen@maastro.nl::1ac26d17-1f5c-4d44-b06d-8bd5da1f8df2" providerId="AD" clId="Web-{7A2C8AFE-14A3-36FE-EA1E-CFE24650E0FB}" dt="2023-03-16T13:17:56.349" v="650" actId="20577"/>
-          <ac:spMkLst>
-            <pc:docMk/>
-            <pc:sldMk cId="3421541061" sldId="260"/>
-            <ac:spMk id="3" creationId="{00000000-0000-0000-0000-000000000000}"/>
-          </ac:spMkLst>
-        </pc:spChg>
-        <pc:extLst>
-          <p:ext xmlns:p="http://schemas.openxmlformats.org/presentationml/2006/main" uri="{D6D511B9-2390-475A-947B-AFAB55BFBCF1}">
-            <pc226:cmChg xmlns:pc226="http://schemas.microsoft.com/office/powerpoint/2022/06/main/command" chg="add del mod">
-              <pc226:chgData name="Florian van Daalen" userId="S::florian.vandaalen@maastro.nl::1ac26d17-1f5c-4d44-b06d-8bd5da1f8df2" providerId="AD" clId="Web-{7A2C8AFE-14A3-36FE-EA1E-CFE24650E0FB}" dt="2023-03-16T13:17:50.536" v="648" actId="20577"/>
-              <pc2:cmMkLst xmlns:pc2="http://schemas.microsoft.com/office/powerpoint/2019/9/main/command">
-                <pc:docMk/>
-                <pc:sldMk cId="3421541061" sldId="260"/>
-                <pc2:cmMk id="{ABCC8D7C-2BFC-4A01-B73D-5B468B13EA2D}"/>
-              </pc2:cmMkLst>
-            </pc226:cmChg>
-            <pc226:cmChg xmlns:pc226="http://schemas.microsoft.com/office/powerpoint/2022/06/main/command" chg="add del mod">
-              <pc226:chgData name="Florian van Daalen" userId="S::florian.vandaalen@maastro.nl::1ac26d17-1f5c-4d44-b06d-8bd5da1f8df2" providerId="AD" clId="Web-{7A2C8AFE-14A3-36FE-EA1E-CFE24650E0FB}" dt="2023-03-16T13:12:42.100" v="413"/>
-              <pc2:cmMkLst xmlns:pc2="http://schemas.microsoft.com/office/powerpoint/2019/9/main/command">
-                <pc:docMk/>
-                <pc:sldMk cId="3421541061" sldId="260"/>
-                <pc2:cmMk id="{67D22CE5-C95A-4416-AE42-0F85FF62E748}"/>
-              </pc2:cmMkLst>
-            </pc226:cmChg>
-          </p:ext>
-        </pc:extLst>
-      </pc:sldChg>
-      <pc:sldChg chg="modSp modCm">
-        <pc:chgData name="Florian van Daalen" userId="S::florian.vandaalen@maastro.nl::1ac26d17-1f5c-4d44-b06d-8bd5da1f8df2" providerId="AD" clId="Web-{7A2C8AFE-14A3-36FE-EA1E-CFE24650E0FB}" dt="2023-03-16T13:18:33.257" v="694" actId="20577"/>
-        <pc:sldMkLst>
-          <pc:docMk/>
-          <pc:sldMk cId="26091957" sldId="261"/>
-        </pc:sldMkLst>
-        <pc:spChg chg="mod">
-          <ac:chgData name="Florian van Daalen" userId="S::florian.vandaalen@maastro.nl::1ac26d17-1f5c-4d44-b06d-8bd5da1f8df2" providerId="AD" clId="Web-{7A2C8AFE-14A3-36FE-EA1E-CFE24650E0FB}" dt="2023-03-16T13:03:41.121" v="94" actId="20577"/>
-          <ac:spMkLst>
-            <pc:docMk/>
-            <pc:sldMk cId="26091957" sldId="261"/>
-            <ac:spMk id="2" creationId="{00000000-0000-0000-0000-000000000000}"/>
-          </ac:spMkLst>
-        </pc:spChg>
-        <pc:spChg chg="mod">
-          <ac:chgData name="Florian van Daalen" userId="S::florian.vandaalen@maastro.nl::1ac26d17-1f5c-4d44-b06d-8bd5da1f8df2" providerId="AD" clId="Web-{7A2C8AFE-14A3-36FE-EA1E-CFE24650E0FB}" dt="2023-03-16T13:18:33.257" v="694" actId="20577"/>
-          <ac:spMkLst>
-            <pc:docMk/>
-            <pc:sldMk cId="26091957" sldId="261"/>
-            <ac:spMk id="3" creationId="{00000000-0000-0000-0000-000000000000}"/>
-          </ac:spMkLst>
-        </pc:spChg>
-        <pc:extLst>
-          <p:ext xmlns:p="http://schemas.openxmlformats.org/presentationml/2006/main" uri="{D6D511B9-2390-475A-947B-AFAB55BFBCF1}">
-            <pc226:cmChg xmlns:pc226="http://schemas.microsoft.com/office/powerpoint/2022/06/main/command" chg="mod">
-              <pc226:chgData name="Florian van Daalen" userId="S::florian.vandaalen@maastro.nl::1ac26d17-1f5c-4d44-b06d-8bd5da1f8df2" providerId="AD" clId="Web-{7A2C8AFE-14A3-36FE-EA1E-CFE24650E0FB}" dt="2023-03-16T13:18:33.257" v="694" actId="20577"/>
-              <pc2:cmMkLst xmlns:pc2="http://schemas.microsoft.com/office/powerpoint/2019/9/main/command">
-                <pc:docMk/>
-                <pc:sldMk cId="26091957" sldId="261"/>
-                <pc2:cmMk id="{0E4B270B-6710-4613-A942-E3E86E83C36E}"/>
-              </pc2:cmMkLst>
-            </pc226:cmChg>
-            <pc226:cmChg xmlns:pc226="http://schemas.microsoft.com/office/powerpoint/2022/06/main/command" chg="mod">
-              <pc226:chgData name="Florian van Daalen" userId="S::florian.vandaalen@maastro.nl::1ac26d17-1f5c-4d44-b06d-8bd5da1f8df2" providerId="AD" clId="Web-{7A2C8AFE-14A3-36FE-EA1E-CFE24650E0FB}" dt="2023-03-16T13:13:45.462" v="490"/>
-              <pc2:cmMkLst xmlns:pc2="http://schemas.microsoft.com/office/powerpoint/2019/9/main/command">
-                <pc:docMk/>
-                <pc:sldMk cId="26091957" sldId="261"/>
-                <pc2:cmMk id="{F6F54081-1CF3-4166-B33C-D0C7286F711A}"/>
-              </pc2:cmMkLst>
-            </pc226:cmChg>
-          </p:ext>
-        </pc:extLst>
-      </pc:sldChg>
-    </pc:docChg>
-  </pc:docChgLst>
-  <pc:docChgLst>
-    <pc:chgData name="Florian van Daalen" userId="S::florian.vandaalen@maastro.nl::1ac26d17-1f5c-4d44-b06d-8bd5da1f8df2" providerId="AD" clId="Web-{C5DEF346-22B5-56BB-18A2-99582CBCA6DE}"/>
-    <pc:docChg chg="modSld">
-      <pc:chgData name="Florian van Daalen" userId="S::florian.vandaalen@maastro.nl::1ac26d17-1f5c-4d44-b06d-8bd5da1f8df2" providerId="AD" clId="Web-{C5DEF346-22B5-56BB-18A2-99582CBCA6DE}" dt="2023-02-16T12:57:34.980" v="39"/>
-      <pc:docMkLst>
-        <pc:docMk/>
-      </pc:docMkLst>
-      <pc:sldChg chg="modCm">
-        <pc:chgData name="Florian van Daalen" userId="S::florian.vandaalen@maastro.nl::1ac26d17-1f5c-4d44-b06d-8bd5da1f8df2" providerId="AD" clId="Web-{C5DEF346-22B5-56BB-18A2-99582CBCA6DE}" dt="2023-02-16T12:49:13.761" v="35"/>
-        <pc:sldMkLst>
-          <pc:docMk/>
-          <pc:sldMk cId="2305509078" sldId="257"/>
-        </pc:sldMkLst>
-        <pc:extLst>
-          <p:ext xmlns:p="http://schemas.openxmlformats.org/presentationml/2006/main" uri="{D6D511B9-2390-475A-947B-AFAB55BFBCF1}">
-            <pc226:cmChg xmlns:pc226="http://schemas.microsoft.com/office/powerpoint/2022/06/main/command" chg="">
-              <pc226:chgData name="Florian van Daalen" userId="S::florian.vandaalen@maastro.nl::1ac26d17-1f5c-4d44-b06d-8bd5da1f8df2" providerId="AD" clId="Web-{C5DEF346-22B5-56BB-18A2-99582CBCA6DE}" dt="2023-02-16T12:49:13.761" v="35"/>
-              <pc2:cmMkLst xmlns:pc2="http://schemas.microsoft.com/office/powerpoint/2019/9/main/command">
-                <pc:docMk/>
-                <pc:sldMk cId="2305509078" sldId="257"/>
-                <pc2:cmMk id="{A59DD9A1-0FBA-41E0-9162-4D0DB987C4FB}"/>
-              </pc2:cmMkLst>
-              <pc226:cmRplyChg chg="add">
-                <pc226:chgData name="Florian van Daalen" userId="S::florian.vandaalen@maastro.nl::1ac26d17-1f5c-4d44-b06d-8bd5da1f8df2" providerId="AD" clId="Web-{C5DEF346-22B5-56BB-18A2-99582CBCA6DE}" dt="2023-02-16T12:49:13.761" v="35"/>
-                <pc2:cmRplyMkLst xmlns:pc2="http://schemas.microsoft.com/office/powerpoint/2019/9/main/command">
-                  <pc:docMk/>
-                  <pc:sldMk cId="2305509078" sldId="257"/>
-                  <pc2:cmMk id="{A59DD9A1-0FBA-41E0-9162-4D0DB987C4FB}"/>
-                  <pc2:cmRplyMk id="{9495CF13-03C7-4CEC-B9B8-5949F10AF7BA}"/>
-                </pc2:cmRplyMkLst>
-              </pc226:cmRplyChg>
-            </pc226:cmChg>
-          </p:ext>
-        </pc:extLst>
-      </pc:sldChg>
-      <pc:sldChg chg="modSp modCm">
-        <pc:chgData name="Florian van Daalen" userId="S::florian.vandaalen@maastro.nl::1ac26d17-1f5c-4d44-b06d-8bd5da1f8df2" providerId="AD" clId="Web-{C5DEF346-22B5-56BB-18A2-99582CBCA6DE}" dt="2023-02-16T12:44:13.361" v="22" actId="20577"/>
-        <pc:sldMkLst>
-          <pc:docMk/>
-          <pc:sldMk cId="2430399406" sldId="258"/>
-        </pc:sldMkLst>
-        <pc:spChg chg="mod">
-          <ac:chgData name="Florian van Daalen" userId="S::florian.vandaalen@maastro.nl::1ac26d17-1f5c-4d44-b06d-8bd5da1f8df2" providerId="AD" clId="Web-{C5DEF346-22B5-56BB-18A2-99582CBCA6DE}" dt="2023-02-16T12:44:13.361" v="22" actId="20577"/>
-          <ac:spMkLst>
-            <pc:docMk/>
-            <pc:sldMk cId="2430399406" sldId="258"/>
-            <ac:spMk id="3" creationId="{00000000-0000-0000-0000-000000000000}"/>
-          </ac:spMkLst>
-        </pc:spChg>
-        <pc:extLst>
-          <p:ext xmlns:p="http://schemas.openxmlformats.org/presentationml/2006/main" uri="{D6D511B9-2390-475A-947B-AFAB55BFBCF1}">
-            <pc226:cmChg xmlns:pc226="http://schemas.microsoft.com/office/powerpoint/2022/06/main/command" chg="mod">
-              <pc226:chgData name="Florian van Daalen" userId="S::florian.vandaalen@maastro.nl::1ac26d17-1f5c-4d44-b06d-8bd5da1f8df2" providerId="AD" clId="Web-{C5DEF346-22B5-56BB-18A2-99582CBCA6DE}" dt="2023-02-16T12:44:08.798" v="21" actId="20577"/>
-              <pc2:cmMkLst xmlns:pc2="http://schemas.microsoft.com/office/powerpoint/2019/9/main/command">
-                <pc:docMk/>
-                <pc:sldMk cId="2430399406" sldId="258"/>
-                <pc2:cmMk id="{FA93F46C-F03A-437B-883A-E9DFE763400E}"/>
-              </pc2:cmMkLst>
-              <pc226:cmRplyChg chg="add">
-                <pc226:chgData name="Florian van Daalen" userId="S::florian.vandaalen@maastro.nl::1ac26d17-1f5c-4d44-b06d-8bd5da1f8df2" providerId="AD" clId="Web-{C5DEF346-22B5-56BB-18A2-99582CBCA6DE}" dt="2023-02-16T12:40:22.651" v="0"/>
-                <pc2:cmRplyMkLst xmlns:pc2="http://schemas.microsoft.com/office/powerpoint/2019/9/main/command">
-                  <pc:docMk/>
-                  <pc:sldMk cId="2430399406" sldId="258"/>
-                  <pc2:cmMk id="{FA93F46C-F03A-437B-883A-E9DFE763400E}"/>
-                  <pc2:cmRplyMk id="{CEDD0CAC-0A5E-4E85-A2E4-2B51D8817A75}"/>
-                </pc2:cmRplyMkLst>
-              </pc226:cmRplyChg>
-            </pc226:cmChg>
-          </p:ext>
-        </pc:extLst>
-      </pc:sldChg>
-      <pc:sldChg chg="modSp modCm">
-        <pc:chgData name="Florian van Daalen" userId="S::florian.vandaalen@maastro.nl::1ac26d17-1f5c-4d44-b06d-8bd5da1f8df2" providerId="AD" clId="Web-{C5DEF346-22B5-56BB-18A2-99582CBCA6DE}" dt="2023-02-16T12:49:20.808" v="37" actId="20577"/>
-        <pc:sldMkLst>
-          <pc:docMk/>
-          <pc:sldMk cId="2730087503" sldId="259"/>
-        </pc:sldMkLst>
-        <pc:spChg chg="mod">
-          <ac:chgData name="Florian van Daalen" userId="S::florian.vandaalen@maastro.nl::1ac26d17-1f5c-4d44-b06d-8bd5da1f8df2" providerId="AD" clId="Web-{C5DEF346-22B5-56BB-18A2-99582CBCA6DE}" dt="2023-02-16T12:49:20.808" v="37" actId="20577"/>
-          <ac:spMkLst>
-            <pc:docMk/>
-            <pc:sldMk cId="2730087503" sldId="259"/>
-            <ac:spMk id="3" creationId="{00000000-0000-0000-0000-000000000000}"/>
-          </ac:spMkLst>
-        </pc:spChg>
-        <pc:extLst>
-          <p:ext xmlns:p="http://schemas.openxmlformats.org/presentationml/2006/main" uri="{D6D511B9-2390-475A-947B-AFAB55BFBCF1}">
-            <pc226:cmChg xmlns:pc226="http://schemas.microsoft.com/office/powerpoint/2022/06/main/command" chg="">
-              <pc226:chgData name="Florian van Daalen" userId="S::florian.vandaalen@maastro.nl::1ac26d17-1f5c-4d44-b06d-8bd5da1f8df2" providerId="AD" clId="Web-{C5DEF346-22B5-56BB-18A2-99582CBCA6DE}" dt="2023-02-16T12:42:24.811" v="1"/>
-              <pc2:cmMkLst xmlns:pc2="http://schemas.microsoft.com/office/powerpoint/2019/9/main/command">
-                <pc:docMk/>
-                <pc:sldMk cId="2730087503" sldId="259"/>
-                <pc2:cmMk id="{330C25A0-FB7F-4192-9E8E-27888CA86C48}"/>
-              </pc2:cmMkLst>
-              <pc226:cmRplyChg chg="add">
-                <pc226:chgData name="Florian van Daalen" userId="S::florian.vandaalen@maastro.nl::1ac26d17-1f5c-4d44-b06d-8bd5da1f8df2" providerId="AD" clId="Web-{C5DEF346-22B5-56BB-18A2-99582CBCA6DE}" dt="2023-02-16T12:42:24.811" v="1"/>
-                <pc2:cmRplyMkLst xmlns:pc2="http://schemas.microsoft.com/office/powerpoint/2019/9/main/command">
-                  <pc:docMk/>
-                  <pc:sldMk cId="2730087503" sldId="259"/>
-                  <pc2:cmMk id="{330C25A0-FB7F-4192-9E8E-27888CA86C48}"/>
-                  <pc2:cmRplyMk id="{658AB9C3-F933-4AE0-94E5-838B82F2C77A}"/>
-                </pc2:cmRplyMkLst>
-              </pc226:cmRplyChg>
-            </pc226:cmChg>
-            <pc226:cmChg xmlns:pc226="http://schemas.microsoft.com/office/powerpoint/2022/06/main/command" chg="mod">
-              <pc226:chgData name="Florian van Daalen" userId="S::florian.vandaalen@maastro.nl::1ac26d17-1f5c-4d44-b06d-8bd5da1f8df2" providerId="AD" clId="Web-{C5DEF346-22B5-56BB-18A2-99582CBCA6DE}" dt="2023-02-16T12:44:17.611" v="25" actId="20577"/>
-              <pc2:cmMkLst xmlns:pc2="http://schemas.microsoft.com/office/powerpoint/2019/9/main/command">
-                <pc:docMk/>
-                <pc:sldMk cId="2730087503" sldId="259"/>
-                <pc2:cmMk id="{CC0D42B8-4CC3-442F-AA6C-5448F5A07969}"/>
-              </pc2:cmMkLst>
-              <pc226:cmRplyChg chg="add">
-                <pc226:chgData name="Florian van Daalen" userId="S::florian.vandaalen@maastro.nl::1ac26d17-1f5c-4d44-b06d-8bd5da1f8df2" providerId="AD" clId="Web-{C5DEF346-22B5-56BB-18A2-99582CBCA6DE}" dt="2023-02-16T12:43:43.407" v="2"/>
-                <pc2:cmRplyMkLst xmlns:pc2="http://schemas.microsoft.com/office/powerpoint/2019/9/main/command">
-                  <pc:docMk/>
-                  <pc:sldMk cId="2730087503" sldId="259"/>
-                  <pc2:cmMk id="{CC0D42B8-4CC3-442F-AA6C-5448F5A07969}"/>
-                  <pc2:cmRplyMk id="{8B0FACFD-3549-40C2-BCB9-C43350E05249}"/>
-                </pc2:cmRplyMkLst>
-              </pc226:cmRplyChg>
-            </pc226:cmChg>
-          </p:ext>
-        </pc:extLst>
-      </pc:sldChg>
-      <pc:sldChg chg="modSp modCm">
-        <pc:chgData name="Florian van Daalen" userId="S::florian.vandaalen@maastro.nl::1ac26d17-1f5c-4d44-b06d-8bd5da1f8df2" providerId="AD" clId="Web-{C5DEF346-22B5-56BB-18A2-99582CBCA6DE}" dt="2023-02-16T12:44:24.377" v="30" actId="20577"/>
-        <pc:sldMkLst>
-          <pc:docMk/>
-          <pc:sldMk cId="3421541061" sldId="260"/>
-        </pc:sldMkLst>
-        <pc:spChg chg="mod">
-          <ac:chgData name="Florian van Daalen" userId="S::florian.vandaalen@maastro.nl::1ac26d17-1f5c-4d44-b06d-8bd5da1f8df2" providerId="AD" clId="Web-{C5DEF346-22B5-56BB-18A2-99582CBCA6DE}" dt="2023-02-16T12:44:24.377" v="30" actId="20577"/>
-          <ac:spMkLst>
-            <pc:docMk/>
-            <pc:sldMk cId="3421541061" sldId="260"/>
-            <ac:spMk id="3" creationId="{00000000-0000-0000-0000-000000000000}"/>
-          </ac:spMkLst>
-        </pc:spChg>
-        <pc:extLst>
-          <p:ext xmlns:p="http://schemas.openxmlformats.org/presentationml/2006/main" uri="{D6D511B9-2390-475A-947B-AFAB55BFBCF1}">
-            <pc226:cmChg xmlns:pc226="http://schemas.microsoft.com/office/powerpoint/2022/06/main/command" chg="mod">
-              <pc226:chgData name="Florian van Daalen" userId="S::florian.vandaalen@maastro.nl::1ac26d17-1f5c-4d44-b06d-8bd5da1f8df2" providerId="AD" clId="Web-{C5DEF346-22B5-56BB-18A2-99582CBCA6DE}" dt="2023-02-16T12:44:23.252" v="29" actId="20577"/>
-              <pc2:cmMkLst xmlns:pc2="http://schemas.microsoft.com/office/powerpoint/2019/9/main/command">
-                <pc:docMk/>
-                <pc:sldMk cId="3421541061" sldId="260"/>
-                <pc2:cmMk id="{ABCC8D7C-2BFC-4A01-B73D-5B468B13EA2D}"/>
-              </pc2:cmMkLst>
-            </pc226:cmChg>
-          </p:ext>
-        </pc:extLst>
-      </pc:sldChg>
-      <pc:sldChg chg="modSp modCm">
-        <pc:chgData name="Florian van Daalen" userId="S::florian.vandaalen@maastro.nl::1ac26d17-1f5c-4d44-b06d-8bd5da1f8df2" providerId="AD" clId="Web-{C5DEF346-22B5-56BB-18A2-99582CBCA6DE}" dt="2023-02-16T12:57:34.980" v="39"/>
-        <pc:sldMkLst>
-          <pc:docMk/>
-          <pc:sldMk cId="26091957" sldId="261"/>
-        </pc:sldMkLst>
-        <pc:spChg chg="mod">
-          <ac:chgData name="Florian van Daalen" userId="S::florian.vandaalen@maastro.nl::1ac26d17-1f5c-4d44-b06d-8bd5da1f8df2" providerId="AD" clId="Web-{C5DEF346-22B5-56BB-18A2-99582CBCA6DE}" dt="2023-02-16T12:44:28.768" v="34" actId="20577"/>
-          <ac:spMkLst>
-            <pc:docMk/>
-            <pc:sldMk cId="26091957" sldId="261"/>
-            <ac:spMk id="3" creationId="{00000000-0000-0000-0000-000000000000}"/>
-          </ac:spMkLst>
-        </pc:spChg>
-        <pc:extLst>
-          <p:ext xmlns:p="http://schemas.openxmlformats.org/presentationml/2006/main" uri="{D6D511B9-2390-475A-947B-AFAB55BFBCF1}">
-            <pc226:cmChg xmlns:pc226="http://schemas.microsoft.com/office/powerpoint/2022/06/main/command" chg="mod">
-              <pc226:chgData name="Florian van Daalen" userId="S::florian.vandaalen@maastro.nl::1ac26d17-1f5c-4d44-b06d-8bd5da1f8df2" providerId="AD" clId="Web-{C5DEF346-22B5-56BB-18A2-99582CBCA6DE}" dt="2023-02-16T12:57:34.980" v="39"/>
-              <pc2:cmMkLst xmlns:pc2="http://schemas.microsoft.com/office/powerpoint/2019/9/main/command">
-                <pc:docMk/>
-                <pc:sldMk cId="26091957" sldId="261"/>
-                <pc2:cmMk id="{0E4B270B-6710-4613-A942-E3E86E83C36E}"/>
-              </pc2:cmMkLst>
-              <pc226:cmRplyChg chg="add">
-                <pc226:chgData name="Florian van Daalen" userId="S::florian.vandaalen@maastro.nl::1ac26d17-1f5c-4d44-b06d-8bd5da1f8df2" providerId="AD" clId="Web-{C5DEF346-22B5-56BB-18A2-99582CBCA6DE}" dt="2023-02-16T12:57:34.980" v="39"/>
-                <pc2:cmRplyMkLst xmlns:pc2="http://schemas.microsoft.com/office/powerpoint/2019/9/main/command">
-                  <pc:docMk/>
-                  <pc:sldMk cId="26091957" sldId="261"/>
-                  <pc2:cmMk id="{0E4B270B-6710-4613-A942-E3E86E83C36E}"/>
-                  <pc2:cmRplyMk id="{4F7F2BD1-C6DF-408D-B7E3-3B5C0AC96245}"/>
-                </pc2:cmRplyMkLst>
-              </pc226:cmRplyChg>
-            </pc226:cmChg>
-            <pc226:cmChg xmlns:pc226="http://schemas.microsoft.com/office/powerpoint/2022/06/main/command" chg="">
-              <pc226:chgData name="Florian van Daalen" userId="S::florian.vandaalen@maastro.nl::1ac26d17-1f5c-4d44-b06d-8bd5da1f8df2" providerId="AD" clId="Web-{C5DEF346-22B5-56BB-18A2-99582CBCA6DE}" dt="2023-02-16T12:53:14.269" v="38"/>
-              <pc2:cmMkLst xmlns:pc2="http://schemas.microsoft.com/office/powerpoint/2019/9/main/command">
-                <pc:docMk/>
-                <pc:sldMk cId="26091957" sldId="261"/>
-                <pc2:cmMk id="{F6F54081-1CF3-4166-B33C-D0C7286F711A}"/>
-              </pc2:cmMkLst>
-              <pc226:cmRplyChg chg="add">
-                <pc226:chgData name="Florian van Daalen" userId="S::florian.vandaalen@maastro.nl::1ac26d17-1f5c-4d44-b06d-8bd5da1f8df2" providerId="AD" clId="Web-{C5DEF346-22B5-56BB-18A2-99582CBCA6DE}" dt="2023-02-16T12:53:14.269" v="38"/>
-                <pc2:cmRplyMkLst xmlns:pc2="http://schemas.microsoft.com/office/powerpoint/2019/9/main/command">
-                  <pc:docMk/>
-                  <pc:sldMk cId="26091957" sldId="261"/>
-                  <pc2:cmMk id="{F6F54081-1CF3-4166-B33C-D0C7286F711A}"/>
-                  <pc2:cmRplyMk id="{F6198F11-777F-4F3A-A30B-280B719183AE}"/>
-                </pc2:cmRplyMkLst>
-              </pc226:cmRplyChg>
-            </pc226:cmChg>
-          </p:ext>
-        </pc:extLst>
-      </pc:sldChg>
-    </pc:docChg>
-  </pc:docChgLst>
-</pc:chgInfo>
 </file>
 
 <file path=ppt/comments/modernComment_102_90DCF3AE.xml><?xml version="1.0" encoding="utf-8"?>
@@ -1186,7 +475,7 @@
           <a:p>
             <a:fld id="{E46D095C-D59B-49DA-8F7C-96519F635374}" type="datetimeFigureOut">
               <a:rPr lang="nl-NL" smtClean="0"/>
-              <a:t>20-3-2023</a:t>
+              <a:t>29-3-2023</a:t>
             </a:fld>
             <a:endParaRPr lang="nl-NL"/>
           </a:p>
@@ -1356,7 +645,7 @@
           <a:p>
             <a:fld id="{E46D095C-D59B-49DA-8F7C-96519F635374}" type="datetimeFigureOut">
               <a:rPr lang="nl-NL" smtClean="0"/>
-              <a:t>20-3-2023</a:t>
+              <a:t>29-3-2023</a:t>
             </a:fld>
             <a:endParaRPr lang="nl-NL"/>
           </a:p>
@@ -1536,7 +825,7 @@
           <a:p>
             <a:fld id="{E46D095C-D59B-49DA-8F7C-96519F635374}" type="datetimeFigureOut">
               <a:rPr lang="nl-NL" smtClean="0"/>
-              <a:t>20-3-2023</a:t>
+              <a:t>29-3-2023</a:t>
             </a:fld>
             <a:endParaRPr lang="nl-NL"/>
           </a:p>
@@ -1706,7 +995,7 @@
           <a:p>
             <a:fld id="{E46D095C-D59B-49DA-8F7C-96519F635374}" type="datetimeFigureOut">
               <a:rPr lang="nl-NL" smtClean="0"/>
-              <a:t>20-3-2023</a:t>
+              <a:t>29-3-2023</a:t>
             </a:fld>
             <a:endParaRPr lang="nl-NL"/>
           </a:p>
@@ -1952,7 +1241,7 @@
           <a:p>
             <a:fld id="{E46D095C-D59B-49DA-8F7C-96519F635374}" type="datetimeFigureOut">
               <a:rPr lang="nl-NL" smtClean="0"/>
-              <a:t>20-3-2023</a:t>
+              <a:t>29-3-2023</a:t>
             </a:fld>
             <a:endParaRPr lang="nl-NL"/>
           </a:p>
@@ -2184,7 +1473,7 @@
           <a:p>
             <a:fld id="{E46D095C-D59B-49DA-8F7C-96519F635374}" type="datetimeFigureOut">
               <a:rPr lang="nl-NL" smtClean="0"/>
-              <a:t>20-3-2023</a:t>
+              <a:t>29-3-2023</a:t>
             </a:fld>
             <a:endParaRPr lang="nl-NL"/>
           </a:p>
@@ -2551,7 +1840,7 @@
           <a:p>
             <a:fld id="{E46D095C-D59B-49DA-8F7C-96519F635374}" type="datetimeFigureOut">
               <a:rPr lang="nl-NL" smtClean="0"/>
-              <a:t>20-3-2023</a:t>
+              <a:t>29-3-2023</a:t>
             </a:fld>
             <a:endParaRPr lang="nl-NL"/>
           </a:p>
@@ -2669,7 +1958,7 @@
           <a:p>
             <a:fld id="{E46D095C-D59B-49DA-8F7C-96519F635374}" type="datetimeFigureOut">
               <a:rPr lang="nl-NL" smtClean="0"/>
-              <a:t>20-3-2023</a:t>
+              <a:t>29-3-2023</a:t>
             </a:fld>
             <a:endParaRPr lang="nl-NL"/>
           </a:p>
@@ -2764,7 +2053,7 @@
           <a:p>
             <a:fld id="{E46D095C-D59B-49DA-8F7C-96519F635374}" type="datetimeFigureOut">
               <a:rPr lang="nl-NL" smtClean="0"/>
-              <a:t>20-3-2023</a:t>
+              <a:t>29-3-2023</a:t>
             </a:fld>
             <a:endParaRPr lang="nl-NL"/>
           </a:p>
@@ -3041,7 +2330,7 @@
           <a:p>
             <a:fld id="{E46D095C-D59B-49DA-8F7C-96519F635374}" type="datetimeFigureOut">
               <a:rPr lang="nl-NL" smtClean="0"/>
-              <a:t>20-3-2023</a:t>
+              <a:t>29-3-2023</a:t>
             </a:fld>
             <a:endParaRPr lang="nl-NL"/>
           </a:p>
@@ -3294,7 +2583,7 @@
           <a:p>
             <a:fld id="{E46D095C-D59B-49DA-8F7C-96519F635374}" type="datetimeFigureOut">
               <a:rPr lang="nl-NL" smtClean="0"/>
-              <a:t>20-3-2023</a:t>
+              <a:t>29-3-2023</a:t>
             </a:fld>
             <a:endParaRPr lang="nl-NL"/>
           </a:p>
@@ -3507,7 +2796,7 @@
           <a:p>
             <a:fld id="{E46D095C-D59B-49DA-8F7C-96519F635374}" type="datetimeFigureOut">
               <a:rPr lang="nl-NL" smtClean="0"/>
-              <a:t>20-3-2023</a:t>
+              <a:t>29-3-2023</a:t>
             </a:fld>
             <a:endParaRPr lang="nl-NL"/>
           </a:p>
@@ -4190,7 +3479,7 @@
   </p:clrMapOvr>
   <p:extLst>
     <p:ext uri="{6950BFC3-D8DA-4A85-94F7-54DA5524770B}">
-      <p188:commentRel xmlns:p188="http://schemas.microsoft.com/office/powerpoint/2018/8/main" xmlns="" r:id="rId2"/>
+      <p188:commentRel xmlns:p188="http://schemas.microsoft.com/office/powerpoint/2018/8/main" r:id="rId2"/>
     </p:ext>
   </p:extLst>
 </p:sld>
@@ -4350,16 +3639,8 @@
           </a:p>
           <a:p>
             <a:r>
-              <a:rPr lang="en-US" sz="1000" dirty="0" smtClean="0"/>
-              <a:t>Test-cases </a:t>
-            </a:r>
-            <a:r>
               <a:rPr lang="en-US" sz="1000" dirty="0"/>
-              <a:t>that can be run to check code-functionality, preferably automated unit-tests, </a:t>
-            </a:r>
-            <a:r>
-              <a:rPr lang="en-US" sz="1000" dirty="0" smtClean="0"/>
-              <a:t>more is better, especially for complex code. Include at least 1 example of the happy flow.</a:t>
+              <a:t>Test-cases that can be run to check code-functionality, preferably automated unit-tests, more is better, especially for complex code. Include at least 1 example of the happy flow.</a:t>
             </a:r>
             <a:endParaRPr lang="en-US" sz="600" dirty="0">
               <a:cs typeface="Calibri"/>
@@ -4442,7 +3723,7 @@
           </a:p>
           <a:p>
             <a:r>
-              <a:rPr lang="en-US" sz="1000" smtClean="0"/>
+              <a:rPr lang="en-US" sz="1000"/>
               <a:t>Reuse </a:t>
             </a:r>
             <a:r>
@@ -4465,9 +3746,9 @@
   <p:clrMapOvr>
     <a:masterClrMapping/>
   </p:clrMapOvr>
-  <p:extLst mod="1">
+  <p:extLst>
     <p:ext uri="{6950BFC3-D8DA-4A85-94F7-54DA5524770B}">
-      <p188:commentRel xmlns:p188="http://schemas.microsoft.com/office/powerpoint/2018/8/main" xmlns="" r:id="rId2"/>
+      <p188:commentRel xmlns:p188="http://schemas.microsoft.com/office/powerpoint/2018/8/main" r:id="rId2"/>
     </p:ext>
   </p:extLst>
 </p:sld>
@@ -4749,7 +4030,7 @@
   </p:clrMapOvr>
   <p:extLst>
     <p:ext uri="{6950BFC3-D8DA-4A85-94F7-54DA5524770B}">
-      <p188:commentRel xmlns:p188="http://schemas.microsoft.com/office/powerpoint/2018/8/main" xmlns="" r:id="rId2"/>
+      <p188:commentRel xmlns:p188="http://schemas.microsoft.com/office/powerpoint/2018/8/main" r:id="rId2"/>
     </p:ext>
   </p:extLst>
 </p:sld>
@@ -4788,7 +4069,7 @@
           <a:lstStyle/>
           <a:p>
             <a:r>
-              <a:rPr lang="en-US" dirty="0" smtClean="0"/>
+              <a:rPr lang="en-US" dirty="0"/>
               <a:t>Example projects:</a:t>
             </a:r>
             <a:endParaRPr lang="nl-NL" dirty="0"/>
@@ -4807,11 +4088,13 @@
         </p:nvSpPr>
         <p:spPr/>
         <p:txBody>
-          <a:bodyPr/>
-          <a:lstStyle/>
-          <a:p>
-            <a:r>
-              <a:rPr lang="en-US" dirty="0" smtClean="0"/>
+          <a:bodyPr vert="horz" lIns="91440" tIns="45720" rIns="91440" bIns="45720" rtlCol="0" anchor="t">
+            <a:normAutofit/>
+          </a:bodyPr>
+          <a:lstStyle/>
+          <a:p>
+            <a:r>
+              <a:rPr lang="en-US" dirty="0"/>
               <a:t>Level 1: </a:t>
             </a:r>
           </a:p>
@@ -4821,66 +4104,57 @@
               <a:rPr lang="nl-NL" dirty="0">
                 <a:hlinkClick r:id="rId2"/>
               </a:rPr>
-              <a:t>https://</a:t>
-            </a:r>
-            <a:r>
-              <a:rPr lang="nl-NL" dirty="0" smtClean="0">
-                <a:hlinkClick r:id="rId2"/>
-              </a:rPr>
-              <a:t>github.com/MaastrichtU-CDS/level_1_example</a:t>
-            </a:r>
-            <a:r>
-              <a:rPr lang="nl-NL" dirty="0" smtClean="0"/>
+              <a:t>https://github.com/MaastrichtU-CDS/level_1_example</a:t>
+            </a:r>
+            <a:r>
+              <a:rPr lang="nl-NL" dirty="0"/>
               <a:t> (python)</a:t>
             </a:r>
-            <a:endParaRPr lang="nl-NL" dirty="0" smtClean="0"/>
-          </a:p>
-          <a:p>
-            <a:r>
-              <a:rPr lang="en-US" dirty="0" smtClean="0"/>
+          </a:p>
+          <a:p>
+            <a:r>
+              <a:rPr lang="en-US" dirty="0"/>
               <a:t>Level 2:</a:t>
             </a:r>
           </a:p>
           <a:p>
             <a:pPr lvl="1"/>
             <a:r>
-              <a:rPr lang="en-US" dirty="0" smtClean="0"/>
-              <a:t>Someone give me an example</a:t>
-            </a:r>
-          </a:p>
-          <a:p>
-            <a:r>
-              <a:rPr lang="en-US" dirty="0" smtClean="0"/>
-              <a:t>Level 3:</a:t>
-            </a:r>
-          </a:p>
-          <a:p>
-            <a:pPr lvl="1"/>
-            <a:r>
-              <a:rPr lang="nl-NL" dirty="0">
+              <a:rPr lang="en-US" dirty="0">
+                <a:ea typeface="+mn-lt"/>
+                <a:cs typeface="+mn-lt"/>
                 <a:hlinkClick r:id="rId3"/>
               </a:rPr>
-              <a:t>https://</a:t>
-            </a:r>
-            <a:r>
-              <a:rPr lang="nl-NL" dirty="0" smtClean="0">
-                <a:hlinkClick r:id="rId3"/>
+              <a:t>https://github.com/maastrichtlawtech/graphdoc</a:t>
+            </a:r>
+            <a:r>
+              <a:rPr lang="en-US" dirty="0">
+                <a:ea typeface="+mn-lt"/>
+                <a:cs typeface="+mn-lt"/>
               </a:rPr>
-              <a:t>github.com/MaastrichtU-CDS/n-scalar-product-protocol</a:t>
-            </a:r>
-            <a:r>
-              <a:rPr lang="nl-NL" dirty="0" smtClean="0"/>
               <a:t> (</a:t>
             </a:r>
             <a:r>
-              <a:rPr lang="nl-NL" dirty="0" err="1" smtClean="0"/>
-              <a:t>java</a:t>
-            </a:r>
-            <a:r>
-              <a:rPr lang="nl-NL" dirty="0" smtClean="0"/>
+              <a:rPr lang="en-US" dirty="0" err="1">
+                <a:ea typeface="+mn-lt"/>
+                <a:cs typeface="+mn-lt"/>
+              </a:rPr>
+              <a:t>vue</a:t>
+            </a:r>
+            <a:r>
+              <a:rPr lang="en-US" dirty="0">
+                <a:ea typeface="+mn-lt"/>
+                <a:cs typeface="+mn-lt"/>
+              </a:rPr>
               <a:t>)</a:t>
             </a:r>
-            <a:endParaRPr lang="nl-NL" dirty="0" smtClean="0"/>
+            <a:endParaRPr lang="en-US" dirty="0"/>
+          </a:p>
+          <a:p>
+            <a:r>
+              <a:rPr lang="en-US" dirty="0"/>
+              <a:t>Level 3:</a:t>
+            </a:r>
           </a:p>
           <a:p>
             <a:pPr lvl="1"/>
@@ -4888,35 +4162,20 @@
               <a:rPr lang="nl-NL" dirty="0">
                 <a:hlinkClick r:id="rId4"/>
               </a:rPr>
-              <a:t>https://</a:t>
-            </a:r>
-            <a:r>
-              <a:rPr lang="nl-NL" dirty="0" smtClean="0">
-                <a:hlinkClick r:id="rId4"/>
-              </a:rPr>
-              <a:t>github.com/MaastrichtU-CDS/vertibayes</a:t>
-            </a:r>
-            <a:r>
-              <a:rPr lang="nl-NL" dirty="0" smtClean="0"/>
+              <a:t>https://github.com/MaastrichtU-CDS/n-scalar-product-protocol</a:t>
+            </a:r>
+            <a:r>
+              <a:rPr lang="nl-NL" dirty="0"/>
               <a:t> (</a:t>
             </a:r>
             <a:r>
-              <a:rPr lang="nl-NL" dirty="0" err="1" smtClean="0"/>
+              <a:rPr lang="nl-NL" dirty="0" err="1"/>
               <a:t>java</a:t>
             </a:r>
             <a:r>
-              <a:rPr lang="nl-NL" dirty="0" smtClean="0"/>
-              <a:t> + python </a:t>
-            </a:r>
-            <a:r>
-              <a:rPr lang="nl-NL" dirty="0" err="1" smtClean="0"/>
-              <a:t>wrapper</a:t>
-            </a:r>
-            <a:r>
-              <a:rPr lang="nl-NL" dirty="0" smtClean="0"/>
+              <a:rPr lang="nl-NL" dirty="0"/>
               <a:t>)</a:t>
             </a:r>
-            <a:endParaRPr lang="nl-NL" dirty="0" smtClean="0"/>
           </a:p>
           <a:p>
             <a:pPr lvl="1"/>
@@ -4924,37 +4183,27 @@
               <a:rPr lang="nl-NL" dirty="0">
                 <a:hlinkClick r:id="rId5"/>
               </a:rPr>
-              <a:t>https://</a:t>
-            </a:r>
-            <a:r>
-              <a:rPr lang="nl-NL" dirty="0" smtClean="0">
-                <a:hlinkClick r:id="rId5"/>
-              </a:rPr>
-              <a:t>github.com/MaastrichtU-CDS/bayesianEnsemble</a:t>
-            </a:r>
-            <a:r>
-              <a:rPr lang="nl-NL" dirty="0" smtClean="0"/>
-              <a:t> </a:t>
-            </a:r>
-            <a:r>
-              <a:rPr lang="nl-NL" dirty="0" smtClean="0"/>
+              <a:t>https://github.com/MaastrichtU-CDS/vertibayes</a:t>
+            </a:r>
+            <a:r>
+              <a:rPr lang="nl-NL" dirty="0"/>
               <a:t> (</a:t>
             </a:r>
             <a:r>
-              <a:rPr lang="nl-NL" dirty="0" err="1" smtClean="0"/>
+              <a:rPr lang="nl-NL" dirty="0" err="1"/>
               <a:t>java</a:t>
             </a:r>
             <a:r>
-              <a:rPr lang="nl-NL" dirty="0" smtClean="0"/>
+              <a:rPr lang="nl-NL" dirty="0"/>
               <a:t> + python </a:t>
             </a:r>
             <a:r>
-              <a:rPr lang="nl-NL" dirty="0" err="1" smtClean="0"/>
+              <a:rPr lang="nl-NL" dirty="0" err="1"/>
               <a:t>wrapper</a:t>
             </a:r>
             <a:r>
-              <a:rPr lang="nl-NL" dirty="0" smtClean="0"/>
-              <a:t> )</a:t>
+              <a:rPr lang="nl-NL" dirty="0"/>
+              <a:t>)</a:t>
             </a:r>
           </a:p>
           <a:p>
@@ -4963,35 +4212,53 @@
               <a:rPr lang="nl-NL" dirty="0">
                 <a:hlinkClick r:id="rId6"/>
               </a:rPr>
-              <a:t>https://</a:t>
-            </a:r>
-            <a:r>
-              <a:rPr lang="nl-NL" dirty="0" smtClean="0">
-                <a:hlinkClick r:id="rId6"/>
+              <a:t>https://github.com/MaastrichtU-CDS/bayesianEnsemble</a:t>
+            </a:r>
+            <a:r>
+              <a:rPr lang="nl-NL" dirty="0"/>
+              <a:t>  (</a:t>
+            </a:r>
+            <a:r>
+              <a:rPr lang="nl-NL" dirty="0" err="1"/>
+              <a:t>java</a:t>
+            </a:r>
+            <a:r>
+              <a:rPr lang="nl-NL" dirty="0"/>
+              <a:t> + python </a:t>
+            </a:r>
+            <a:r>
+              <a:rPr lang="nl-NL" dirty="0" err="1"/>
+              <a:t>wrapper</a:t>
+            </a:r>
+            <a:r>
+              <a:rPr lang="nl-NL" dirty="0"/>
+              <a:t> )</a:t>
+            </a:r>
+          </a:p>
+          <a:p>
+            <a:pPr lvl="1"/>
+            <a:r>
+              <a:rPr lang="nl-NL" dirty="0">
+                <a:hlinkClick r:id="rId7"/>
               </a:rPr>
-              <a:t>github.com/CARRIER-project/verticox</a:t>
-            </a:r>
-            <a:r>
-              <a:rPr lang="nl-NL" dirty="0" smtClean="0"/>
+              <a:t>https://github.com/CARRIER-project/verticox</a:t>
+            </a:r>
+            <a:r>
+              <a:rPr lang="nl-NL" dirty="0"/>
               <a:t> (</a:t>
             </a:r>
             <a:r>
-              <a:rPr lang="nl-NL" dirty="0" err="1" smtClean="0"/>
+              <a:rPr lang="nl-NL" dirty="0" err="1"/>
               <a:t>java</a:t>
             </a:r>
             <a:r>
-              <a:rPr lang="nl-NL" dirty="0" smtClean="0"/>
-              <a:t> </a:t>
-            </a:r>
-            <a:r>
-              <a:rPr lang="nl-NL" smtClean="0"/>
-              <a:t>+ python)</a:t>
-            </a:r>
-            <a:endParaRPr lang="nl-NL" dirty="0" smtClean="0"/>
+              <a:rPr lang="nl-NL" dirty="0"/>
+              <a:t> + python)</a:t>
+            </a:r>
           </a:p>
           <a:p>
             <a:pPr lvl="1"/>
-            <a:endParaRPr lang="en-US" dirty="0" smtClean="0"/>
+            <a:endParaRPr lang="en-US" dirty="0"/>
           </a:p>
         </p:txBody>
       </p:sp>
@@ -5270,15 +4537,6 @@
 </file>
 
 <file path=customXml/item1.xml><?xml version="1.0" encoding="utf-8"?>
-<?mso-contentType ?>
-<FormTemplates xmlns="http://schemas.microsoft.com/sharepoint/v3/contenttype/forms">
-  <Display>DocumentLibraryForm</Display>
-  <Edit>DocumentLibraryForm</Edit>
-  <New>DocumentLibraryForm</New>
-</FormTemplates>
-</file>
-
-<file path=customXml/item2.xml><?xml version="1.0" encoding="utf-8"?>
 <ct:contentTypeSchema xmlns:ct="http://schemas.microsoft.com/office/2006/metadata/contentType" xmlns:ma="http://schemas.microsoft.com/office/2006/metadata/properties/metaAttributes" ct:_="" ma:_="" ma:contentTypeName="Document" ma:contentTypeID="0x0101004313D4D0B3DCE442A16492F5C5472198" ma:contentTypeVersion="17" ma:contentTypeDescription="Create a new document." ma:contentTypeScope="" ma:versionID="7ae4d7d2f88cab5fb2f5b0c527ebbcca">
   <xsd:schema xmlns:xsd="http://www.w3.org/2001/XMLSchema" xmlns:xs="http://www.w3.org/2001/XMLSchema" xmlns:p="http://schemas.microsoft.com/office/2006/metadata/properties" xmlns:ns2="f07552dd-1c43-4116-999b-42c9c048e8e7" xmlns:ns3="b7a78d05-72b7-4525-ba4a-dbc395da44c8" xmlns:ns4="89ee1cdf-eea7-41b4-be42-a33c70cea0a6" targetNamespace="http://schemas.microsoft.com/office/2006/metadata/properties" ma:root="true" ma:fieldsID="638e6667d846717050b5b321c5409b0d" ns2:_="" ns3:_="" ns4:_="">
     <xsd:import namespace="f07552dd-1c43-4116-999b-42c9c048e8e7"/>
@@ -5520,6 +4778,15 @@
 </ct:contentTypeSchema>
 </file>
 
+<file path=customXml/item2.xml><?xml version="1.0" encoding="utf-8"?>
+<?mso-contentType ?>
+<FormTemplates xmlns="http://schemas.microsoft.com/sharepoint/v3/contenttype/forms">
+  <Display>DocumentLibraryForm</Display>
+  <Edit>DocumentLibraryForm</Edit>
+  <New>DocumentLibraryForm</New>
+</FormTemplates>
+</file>
+
 <file path=customXml/item3.xml><?xml version="1.0" encoding="utf-8"?>
 <p:properties xmlns:p="http://schemas.microsoft.com/office/2006/metadata/properties" xmlns:xsi="http://www.w3.org/2001/XMLSchema-instance" xmlns:pc="http://schemas.microsoft.com/office/infopath/2007/PartnerControls">
   <documentManagement>
@@ -5532,14 +4799,6 @@
 </file>
 
 <file path=customXml/itemProps1.xml><?xml version="1.0" encoding="utf-8"?>
-<ds:datastoreItem xmlns:ds="http://schemas.openxmlformats.org/officeDocument/2006/customXml" ds:itemID="{4475C316-DA33-4A45-865B-8D249A4629A4}">
-  <ds:schemaRefs>
-    <ds:schemaRef ds:uri="http://schemas.microsoft.com/sharepoint/v3/contenttype/forms"/>
-  </ds:schemaRefs>
-</ds:datastoreItem>
-</file>
-
-<file path=customXml/itemProps2.xml><?xml version="1.0" encoding="utf-8"?>
 <ds:datastoreItem xmlns:ds="http://schemas.openxmlformats.org/officeDocument/2006/customXml" ds:itemID="{8E185284-198E-4BA3-B039-3FC04C00F914}">
   <ds:schemaRefs>
     <ds:schemaRef ds:uri="89ee1cdf-eea7-41b4-be42-a33c70cea0a6"/>
@@ -5555,6 +4814,14 @@
     <ds:schemaRef ds:uri="http://schemas.microsoft.com/office/infopath/2007/PartnerControls"/>
     <ds:schemaRef ds:uri="http://schemas.openxmlformats.org/package/2006/metadata/core-properties"/>
     <ds:schemaRef ds:uri="http://www.w3.org/2001/XMLSchema"/>
+  </ds:schemaRefs>
+</ds:datastoreItem>
+</file>
+
+<file path=customXml/itemProps2.xml><?xml version="1.0" encoding="utf-8"?>
+<ds:datastoreItem xmlns:ds="http://schemas.openxmlformats.org/officeDocument/2006/customXml" ds:itemID="{4475C316-DA33-4A45-865B-8D249A4629A4}">
+  <ds:schemaRefs>
+    <ds:schemaRef ds:uri="http://schemas.microsoft.com/sharepoint/v3/contenttype/forms"/>
   </ds:schemaRefs>
 </ds:datastoreItem>
 </file>

</xml_diff>